<commit_message>
Adding new version. Sending this one to Nick
</commit_message>
<xml_diff>
--- a/Kalman Filter/KALMAN FILTER FIN 2025.pptx
+++ b/Kalman Filter/KALMAN FILTER FIN 2025.pptx
@@ -5,7 +5,7 @@
     <p:sldMasterId id="2147483648" r:id="rId1"/>
   </p:sldMasterIdLst>
   <p:notesMasterIdLst>
-    <p:notesMasterId r:id="rId20"/>
+    <p:notesMasterId r:id="rId21"/>
   </p:notesMasterIdLst>
   <p:sldIdLst>
     <p:sldId id="256" r:id="rId2"/>
@@ -18,14 +18,15 @@
     <p:sldId id="263" r:id="rId9"/>
     <p:sldId id="264" r:id="rId10"/>
     <p:sldId id="276" r:id="rId11"/>
-    <p:sldId id="269" r:id="rId12"/>
-    <p:sldId id="275" r:id="rId13"/>
-    <p:sldId id="266" r:id="rId14"/>
-    <p:sldId id="272" r:id="rId15"/>
-    <p:sldId id="273" r:id="rId16"/>
-    <p:sldId id="274" r:id="rId17"/>
-    <p:sldId id="259" r:id="rId18"/>
-    <p:sldId id="267" r:id="rId19"/>
+    <p:sldId id="277" r:id="rId12"/>
+    <p:sldId id="269" r:id="rId13"/>
+    <p:sldId id="275" r:id="rId14"/>
+    <p:sldId id="266" r:id="rId15"/>
+    <p:sldId id="272" r:id="rId16"/>
+    <p:sldId id="273" r:id="rId17"/>
+    <p:sldId id="274" r:id="rId18"/>
+    <p:sldId id="259" r:id="rId19"/>
+    <p:sldId id="267" r:id="rId20"/>
   </p:sldIdLst>
   <p:sldSz cx="12192000" cy="6858000"/>
   <p:notesSz cx="6858000" cy="9144000"/>
@@ -145,7 +146,7 @@
   <pc:docChgLst>
     <pc:chgData name="Mark Lefevre" userId="cf24bf3785f31a4f" providerId="LiveId" clId="{439518E1-CD2B-481F-9288-2AB5CAFC77EA}"/>
     <pc:docChg chg="undo custSel addSld delSld modSld sldOrd">
-      <pc:chgData name="Mark Lefevre" userId="cf24bf3785f31a4f" providerId="LiveId" clId="{439518E1-CD2B-481F-9288-2AB5CAFC77EA}" dt="2025-03-03T03:04:27.048" v="3174"/>
+      <pc:chgData name="Mark Lefevre" userId="cf24bf3785f31a4f" providerId="LiveId" clId="{439518E1-CD2B-481F-9288-2AB5CAFC77EA}" dt="2025-03-03T03:33:19.747" v="3181" actId="22"/>
       <pc:docMkLst>
         <pc:docMk/>
       </pc:docMkLst>
@@ -405,13 +406,13 @@
         </pc:picChg>
       </pc:sldChg>
       <pc:sldChg chg="addSp delSp modSp new mod ord">
-        <pc:chgData name="Mark Lefevre" userId="cf24bf3785f31a4f" providerId="LiveId" clId="{439518E1-CD2B-481F-9288-2AB5CAFC77EA}" dt="2025-03-03T03:04:27.048" v="3174"/>
+        <pc:chgData name="Mark Lefevre" userId="cf24bf3785f31a4f" providerId="LiveId" clId="{439518E1-CD2B-481F-9288-2AB5CAFC77EA}" dt="2025-03-03T03:31:51.918" v="3177" actId="1076"/>
         <pc:sldMkLst>
           <pc:docMk/>
           <pc:sldMk cId="3990713658" sldId="276"/>
         </pc:sldMkLst>
         <pc:spChg chg="mod">
-          <ac:chgData name="Mark Lefevre" userId="cf24bf3785f31a4f" providerId="LiveId" clId="{439518E1-CD2B-481F-9288-2AB5CAFC77EA}" dt="2025-03-01T04:39:09.548" v="2639" actId="20577"/>
+          <ac:chgData name="Mark Lefevre" userId="cf24bf3785f31a4f" providerId="LiveId" clId="{439518E1-CD2B-481F-9288-2AB5CAFC77EA}" dt="2025-03-03T03:31:51.918" v="3177" actId="1076"/>
           <ac:spMkLst>
             <pc:docMk/>
             <pc:sldMk cId="3990713658" sldId="276"/>
@@ -432,6 +433,53 @@
             <pc:docMk/>
             <pc:sldMk cId="3990713658" sldId="276"/>
             <ac:picMk id="6" creationId="{BDDD33B3-09EC-942E-044B-3262C5A34320}"/>
+          </ac:picMkLst>
+        </pc:picChg>
+      </pc:sldChg>
+      <pc:sldChg chg="addSp delSp modSp new mod">
+        <pc:chgData name="Mark Lefevre" userId="cf24bf3785f31a4f" providerId="LiveId" clId="{439518E1-CD2B-481F-9288-2AB5CAFC77EA}" dt="2025-03-03T03:33:19.747" v="3181" actId="22"/>
+        <pc:sldMkLst>
+          <pc:docMk/>
+          <pc:sldMk cId="3702892664" sldId="277"/>
+        </pc:sldMkLst>
+        <pc:spChg chg="mod">
+          <ac:chgData name="Mark Lefevre" userId="cf24bf3785f31a4f" providerId="LiveId" clId="{439518E1-CD2B-481F-9288-2AB5CAFC77EA}" dt="2025-03-03T03:31:58.189" v="3179" actId="27636"/>
+          <ac:spMkLst>
+            <pc:docMk/>
+            <pc:sldMk cId="3702892664" sldId="277"/>
+            <ac:spMk id="2" creationId="{B5044E97-1E71-6E9E-49F1-30BF1AC721A3}"/>
+          </ac:spMkLst>
+        </pc:spChg>
+        <pc:spChg chg="del">
+          <ac:chgData name="Mark Lefevre" userId="cf24bf3785f31a4f" providerId="LiveId" clId="{439518E1-CD2B-481F-9288-2AB5CAFC77EA}" dt="2025-03-03T03:33:02.830" v="3180" actId="22"/>
+          <ac:spMkLst>
+            <pc:docMk/>
+            <pc:sldMk cId="3702892664" sldId="277"/>
+            <ac:spMk id="3" creationId="{7D4D155F-A40C-A02A-6323-58CAD21A4BE1}"/>
+          </ac:spMkLst>
+        </pc:spChg>
+        <pc:spChg chg="del">
+          <ac:chgData name="Mark Lefevre" userId="cf24bf3785f31a4f" providerId="LiveId" clId="{439518E1-CD2B-481F-9288-2AB5CAFC77EA}" dt="2025-03-03T03:33:19.747" v="3181" actId="22"/>
+          <ac:spMkLst>
+            <pc:docMk/>
+            <pc:sldMk cId="3702892664" sldId="277"/>
+            <ac:spMk id="4" creationId="{862F7645-88E8-2B44-6D17-DD8331475EF7}"/>
+          </ac:spMkLst>
+        </pc:spChg>
+        <pc:picChg chg="add mod ord">
+          <ac:chgData name="Mark Lefevre" userId="cf24bf3785f31a4f" providerId="LiveId" clId="{439518E1-CD2B-481F-9288-2AB5CAFC77EA}" dt="2025-03-03T03:33:02.830" v="3180" actId="22"/>
+          <ac:picMkLst>
+            <pc:docMk/>
+            <pc:sldMk cId="3702892664" sldId="277"/>
+            <ac:picMk id="6" creationId="{3F9B77FE-8B43-D44B-416E-1A1B71BEF625}"/>
+          </ac:picMkLst>
+        </pc:picChg>
+        <pc:picChg chg="add mod ord">
+          <ac:chgData name="Mark Lefevre" userId="cf24bf3785f31a4f" providerId="LiveId" clId="{439518E1-CD2B-481F-9288-2AB5CAFC77EA}" dt="2025-03-03T03:33:19.747" v="3181" actId="22"/>
+          <ac:picMkLst>
+            <pc:docMk/>
+            <pc:sldMk cId="3702892664" sldId="277"/>
+            <ac:picMk id="8" creationId="{F05C1820-58D2-9885-8A9E-A1306D396F83}"/>
           </ac:picMkLst>
         </pc:picChg>
       </pc:sldChg>
@@ -522,7 +570,7 @@
           <a:p>
             <a:fld id="{9F34524B-208E-4470-83DF-9357896802DB}" type="datetimeFigureOut">
               <a:rPr lang="en-US" smtClean="0"/>
-              <a:t>2/28/2025</a:t>
+              <a:t>3/2/2025</a:t>
             </a:fld>
             <a:endParaRPr lang="en-US"/>
           </a:p>
@@ -1033,7 +1081,7 @@
           <a:p>
             <a:fld id="{F011AAC0-AB02-4B64-A809-419AC12897EB}" type="slidenum">
               <a:rPr lang="en-US" smtClean="0"/>
-              <a:t>11</a:t>
+              <a:t>12</a:t>
             </a:fld>
             <a:endParaRPr lang="en-US"/>
           </a:p>
@@ -1236,7 +1284,7 @@
           <a:p>
             <a:fld id="{F011AAC0-AB02-4B64-A809-419AC12897EB}" type="slidenum">
               <a:rPr lang="en-US" smtClean="0"/>
-              <a:t>12</a:t>
+              <a:t>13</a:t>
             </a:fld>
             <a:endParaRPr lang="en-US"/>
           </a:p>
@@ -1347,7 +1395,7 @@
           <a:p>
             <a:fld id="{F011AAC0-AB02-4B64-A809-419AC12897EB}" type="slidenum">
               <a:rPr lang="en-US" smtClean="0"/>
-              <a:t>13</a:t>
+              <a:t>14</a:t>
             </a:fld>
             <a:endParaRPr lang="en-US"/>
           </a:p>
@@ -1458,7 +1506,7 @@
           <a:p>
             <a:fld id="{F011AAC0-AB02-4B64-A809-419AC12897EB}" type="slidenum">
               <a:rPr lang="en-US" smtClean="0"/>
-              <a:t>14</a:t>
+              <a:t>15</a:t>
             </a:fld>
             <a:endParaRPr lang="en-US"/>
           </a:p>
@@ -1569,7 +1617,7 @@
           <a:p>
             <a:fld id="{F011AAC0-AB02-4B64-A809-419AC12897EB}" type="slidenum">
               <a:rPr lang="en-US" smtClean="0"/>
-              <a:t>15</a:t>
+              <a:t>16</a:t>
             </a:fld>
             <a:endParaRPr lang="en-US"/>
           </a:p>
@@ -1692,7 +1740,7 @@
           <a:p>
             <a:fld id="{F011AAC0-AB02-4B64-A809-419AC12897EB}" type="slidenum">
               <a:rPr lang="en-US" smtClean="0"/>
-              <a:t>16</a:t>
+              <a:t>17</a:t>
             </a:fld>
             <a:endParaRPr lang="en-US"/>
           </a:p>
@@ -1810,7 +1858,7 @@
           <a:p>
             <a:fld id="{F011AAC0-AB02-4B64-A809-419AC12897EB}" type="slidenum">
               <a:rPr lang="en-US" smtClean="0"/>
-              <a:t>17</a:t>
+              <a:t>18</a:t>
             </a:fld>
             <a:endParaRPr lang="en-US"/>
           </a:p>
@@ -2002,7 +2050,7 @@
           <a:p>
             <a:fld id="{F011AAC0-AB02-4B64-A809-419AC12897EB}" type="slidenum">
               <a:rPr lang="en-US" smtClean="0"/>
-              <a:t>18</a:t>
+              <a:t>19</a:t>
             </a:fld>
             <a:endParaRPr lang="en-US"/>
           </a:p>
@@ -3674,7 +3722,7 @@
           <a:p>
             <a:fld id="{48A87A34-81AB-432B-8DAE-1953F412C126}" type="datetimeFigureOut">
               <a:rPr lang="en-US" dirty="0"/>
-              <a:t>2/28/2025</a:t>
+              <a:t>3/2/2025</a:t>
             </a:fld>
             <a:endParaRPr lang="en-US" dirty="0"/>
           </a:p>
@@ -3936,7 +3984,7 @@
           <a:p>
             <a:fld id="{48A87A34-81AB-432B-8DAE-1953F412C126}" type="datetimeFigureOut">
               <a:rPr lang="en-US" dirty="0"/>
-              <a:t>2/28/2025</a:t>
+              <a:t>3/2/2025</a:t>
             </a:fld>
             <a:endParaRPr lang="en-US" dirty="0"/>
           </a:p>
@@ -4163,7 +4211,7 @@
             <a:fld id="{48A87A34-81AB-432B-8DAE-1953F412C126}" type="datetimeFigureOut">
               <a:rPr lang="en-US" dirty="0"/>
               <a:pPr/>
-              <a:t>2/28/2025</a:t>
+              <a:t>3/2/2025</a:t>
             </a:fld>
             <a:endParaRPr lang="en-US" dirty="0"/>
           </a:p>
@@ -4469,7 +4517,7 @@
             <a:fld id="{48A87A34-81AB-432B-8DAE-1953F412C126}" type="datetimeFigureOut">
               <a:rPr lang="en-US" dirty="0"/>
               <a:pPr/>
-              <a:t>2/28/2025</a:t>
+              <a:t>3/2/2025</a:t>
             </a:fld>
             <a:endParaRPr lang="en-US" dirty="0"/>
           </a:p>
@@ -4938,7 +4986,7 @@
             <a:fld id="{48A87A34-81AB-432B-8DAE-1953F412C126}" type="datetimeFigureOut">
               <a:rPr lang="en-US" dirty="0"/>
               <a:pPr/>
-              <a:t>2/28/2025</a:t>
+              <a:t>3/2/2025</a:t>
             </a:fld>
             <a:endParaRPr lang="en-US" dirty="0"/>
           </a:p>
@@ -5480,7 +5528,7 @@
           <a:p>
             <a:fld id="{48A87A34-81AB-432B-8DAE-1953F412C126}" type="datetimeFigureOut">
               <a:rPr lang="en-US" dirty="0"/>
-              <a:t>2/28/2025</a:t>
+              <a:t>3/2/2025</a:t>
             </a:fld>
             <a:endParaRPr lang="en-US" dirty="0"/>
           </a:p>
@@ -6249,7 +6297,7 @@
           <a:p>
             <a:fld id="{48A87A34-81AB-432B-8DAE-1953F412C126}" type="datetimeFigureOut">
               <a:rPr lang="en-US" dirty="0"/>
-              <a:t>2/28/2025</a:t>
+              <a:t>3/2/2025</a:t>
             </a:fld>
             <a:endParaRPr lang="en-US" dirty="0"/>
           </a:p>
@@ -6419,7 +6467,7 @@
           <a:p>
             <a:fld id="{48A87A34-81AB-432B-8DAE-1953F412C126}" type="datetimeFigureOut">
               <a:rPr lang="en-US" dirty="0"/>
-              <a:t>2/28/2025</a:t>
+              <a:t>3/2/2025</a:t>
             </a:fld>
             <a:endParaRPr lang="en-US" dirty="0"/>
           </a:p>
@@ -6638,7 +6686,7 @@
             <a:fld id="{48A87A34-81AB-432B-8DAE-1953F412C126}" type="datetimeFigureOut">
               <a:rPr lang="en-US" dirty="0"/>
               <a:pPr/>
-              <a:t>2/28/2025</a:t>
+              <a:t>3/2/2025</a:t>
             </a:fld>
             <a:endParaRPr lang="en-US" dirty="0"/>
           </a:p>
@@ -6813,7 +6861,7 @@
           <a:p>
             <a:fld id="{48A87A34-81AB-432B-8DAE-1953F412C126}" type="datetimeFigureOut">
               <a:rPr lang="en-US" dirty="0"/>
-              <a:t>2/28/2025</a:t>
+              <a:t>3/2/2025</a:t>
             </a:fld>
             <a:endParaRPr lang="en-US" dirty="0"/>
           </a:p>
@@ -7098,7 +7146,7 @@
             <a:fld id="{48A87A34-81AB-432B-8DAE-1953F412C126}" type="datetimeFigureOut">
               <a:rPr lang="en-US" dirty="0"/>
               <a:pPr/>
-              <a:t>2/28/2025</a:t>
+              <a:t>3/2/2025</a:t>
             </a:fld>
             <a:endParaRPr lang="en-US" dirty="0"/>
           </a:p>
@@ -7335,7 +7383,7 @@
           <a:p>
             <a:fld id="{48A87A34-81AB-432B-8DAE-1953F412C126}" type="datetimeFigureOut">
               <a:rPr lang="en-US" dirty="0"/>
-              <a:t>2/28/2025</a:t>
+              <a:t>3/2/2025</a:t>
             </a:fld>
             <a:endParaRPr lang="en-US" dirty="0"/>
           </a:p>
@@ -7709,7 +7757,7 @@
           <a:p>
             <a:fld id="{48A87A34-81AB-432B-8DAE-1953F412C126}" type="datetimeFigureOut">
               <a:rPr lang="en-US" dirty="0"/>
-              <a:t>2/28/2025</a:t>
+              <a:t>3/2/2025</a:t>
             </a:fld>
             <a:endParaRPr lang="en-US" dirty="0"/>
           </a:p>
@@ -7822,7 +7870,7 @@
           <a:p>
             <a:fld id="{48A87A34-81AB-432B-8DAE-1953F412C126}" type="datetimeFigureOut">
               <a:rPr lang="en-US" dirty="0"/>
-              <a:t>2/28/2025</a:t>
+              <a:t>3/2/2025</a:t>
             </a:fld>
             <a:endParaRPr lang="en-US" dirty="0"/>
           </a:p>
@@ -7912,7 +7960,7 @@
           <a:p>
             <a:fld id="{48A87A34-81AB-432B-8DAE-1953F412C126}" type="datetimeFigureOut">
               <a:rPr lang="en-US" dirty="0"/>
-              <a:t>2/28/2025</a:t>
+              <a:t>3/2/2025</a:t>
             </a:fld>
             <a:endParaRPr lang="en-US" dirty="0"/>
           </a:p>
@@ -8156,7 +8204,7 @@
           <a:p>
             <a:fld id="{48A87A34-81AB-432B-8DAE-1953F412C126}" type="datetimeFigureOut">
               <a:rPr lang="en-US" dirty="0"/>
-              <a:t>2/28/2025</a:t>
+              <a:t>3/2/2025</a:t>
             </a:fld>
             <a:endParaRPr lang="en-US" dirty="0"/>
           </a:p>
@@ -8408,7 +8456,7 @@
           <a:p>
             <a:fld id="{48A87A34-81AB-432B-8DAE-1953F412C126}" type="datetimeFigureOut">
               <a:rPr lang="en-US" dirty="0"/>
-              <a:t>2/28/2025</a:t>
+              <a:t>3/2/2025</a:t>
             </a:fld>
             <a:endParaRPr lang="en-US" dirty="0"/>
           </a:p>
@@ -8647,7 +8695,7 @@
             <a:fld id="{48A87A34-81AB-432B-8DAE-1953F412C126}" type="datetimeFigureOut">
               <a:rPr lang="en-US" dirty="0"/>
               <a:pPr/>
-              <a:t>2/28/2025</a:t>
+              <a:t>3/2/2025</a:t>
             </a:fld>
             <a:endParaRPr lang="en-US" dirty="0"/>
           </a:p>
@@ -9246,8 +9294,8 @@
           </a:xfrm>
         </p:spPr>
       </p:pic>
-      <mc:AlternateContent xmlns:mc="http://schemas.openxmlformats.org/markup-compatibility/2006">
-        <mc:Choice xmlns:a14="http://schemas.microsoft.com/office/drawing/2010/main" Requires="a14">
+      <mc:AlternateContent xmlns:mc="http://schemas.openxmlformats.org/markup-compatibility/2006" xmlns:a14="http://schemas.microsoft.com/office/drawing/2010/main">
+        <mc:Choice Requires="a14">
           <p:sp>
             <p:nvSpPr>
               <p:cNvPr id="4" name="Content Placeholder 3">
@@ -9374,7 +9422,6 @@
                 <a:endParaRPr lang="en-US" sz="2000" dirty="0"/>
               </a:p>
               <a:p>
-                <a:pPr/>
                 <a:r>
                   <a:rPr lang="en-US" sz="2000" b="1" i="1" dirty="0"/>
                   <a:t>s</a:t>
@@ -9385,7 +9432,6 @@
                 </a:r>
               </a:p>
               <a:p>
-                <a:pPr/>
                 <a:r>
                   <a:rPr lang="en-US" sz="2000" b="1" i="1" dirty="0"/>
                   <a:t>v</a:t>
@@ -9416,7 +9462,7 @@
             </p:txBody>
           </p:sp>
         </mc:Choice>
-        <mc:Fallback>
+        <mc:Fallback xmlns="">
           <p:sp>
             <p:nvSpPr>
               <p:cNvPr id="4" name="Content Placeholder 3">
@@ -9491,7 +9537,7 @@
           <p:cNvPr id="2" name="Title 1">
             <a:extLst>
               <a:ext uri="{FF2B5EF4-FFF2-40B4-BE49-F238E27FC236}">
-                <a16:creationId xmlns:a16="http://schemas.microsoft.com/office/drawing/2014/main" id="{30102EBE-4894-4054-8001-62CDB0C48B56}"/>
+                <a16:creationId xmlns:a16="http://schemas.microsoft.com/office/drawing/2014/main" id="{B5044E97-1E71-6E9E-49F1-30BF1AC721A3}"/>
               </a:ext>
             </a:extLst>
           </p:cNvPr>
@@ -9518,6 +9564,138 @@
             </a:br>
             <a:r>
               <a:rPr lang="en-US" dirty="0"/>
+              <a:t>Dynamic SPREAD ESTIMATION</a:t>
+            </a:r>
+            <a:br>
+              <a:rPr lang="en-US" dirty="0"/>
+            </a:br>
+            <a:r>
+              <a:rPr lang="en-US" dirty="0"/>
+              <a:t>EURUSD versus USDJPY</a:t>
+            </a:r>
+          </a:p>
+        </p:txBody>
+      </p:sp>
+      <p:pic>
+        <p:nvPicPr>
+          <p:cNvPr id="6" name="Content Placeholder 5">
+            <a:extLst>
+              <a:ext uri="{FF2B5EF4-FFF2-40B4-BE49-F238E27FC236}">
+                <a16:creationId xmlns:a16="http://schemas.microsoft.com/office/drawing/2014/main" id="{3F9B77FE-8B43-D44B-416E-1A1B71BEF625}"/>
+              </a:ext>
+            </a:extLst>
+          </p:cNvPr>
+          <p:cNvPicPr>
+            <a:picLocks noGrp="1" noChangeAspect="1"/>
+          </p:cNvPicPr>
+          <p:nvPr>
+            <p:ph sz="half" idx="1"/>
+          </p:nvPr>
+        </p:nvPicPr>
+        <p:blipFill>
+          <a:blip r:embed="rId2"/>
+          <a:stretch>
+            <a:fillRect/>
+          </a:stretch>
+        </p:blipFill>
+        <p:spPr>
+          <a:xfrm>
+            <a:off x="685800" y="2617868"/>
+            <a:ext cx="5334000" cy="3176426"/>
+          </a:xfrm>
+        </p:spPr>
+      </p:pic>
+      <p:pic>
+        <p:nvPicPr>
+          <p:cNvPr id="8" name="Content Placeholder 7">
+            <a:extLst>
+              <a:ext uri="{FF2B5EF4-FFF2-40B4-BE49-F238E27FC236}">
+                <a16:creationId xmlns:a16="http://schemas.microsoft.com/office/drawing/2014/main" id="{F05C1820-58D2-9885-8A9E-A1306D396F83}"/>
+              </a:ext>
+            </a:extLst>
+          </p:cNvPr>
+          <p:cNvPicPr>
+            <a:picLocks noGrp="1" noChangeAspect="1"/>
+          </p:cNvPicPr>
+          <p:nvPr>
+            <p:ph sz="half" idx="2"/>
+          </p:nvPr>
+        </p:nvPicPr>
+        <p:blipFill>
+          <a:blip r:embed="rId3"/>
+          <a:stretch>
+            <a:fillRect/>
+          </a:stretch>
+        </p:blipFill>
+        <p:spPr>
+          <a:xfrm>
+            <a:off x="6172200" y="2617868"/>
+            <a:ext cx="5334000" cy="3176426"/>
+          </a:xfrm>
+        </p:spPr>
+      </p:pic>
+    </p:spTree>
+    <p:extLst>
+      <p:ext uri="{BB962C8B-B14F-4D97-AF65-F5344CB8AC3E}">
+        <p14:creationId xmlns:p14="http://schemas.microsoft.com/office/powerpoint/2010/main" val="3702892664"/>
+      </p:ext>
+    </p:extLst>
+  </p:cSld>
+  <p:clrMapOvr>
+    <a:masterClrMapping/>
+  </p:clrMapOvr>
+</p:sld>
+</file>
+
+<file path=ppt/slides/slide12.xml><?xml version="1.0" encoding="utf-8"?>
+<p:sld xmlns:a="http://schemas.openxmlformats.org/drawingml/2006/main" xmlns:r="http://schemas.openxmlformats.org/officeDocument/2006/relationships" xmlns:p="http://schemas.openxmlformats.org/presentationml/2006/main">
+  <p:cSld>
+    <p:spTree>
+      <p:nvGrpSpPr>
+        <p:cNvPr id="1" name=""/>
+        <p:cNvGrpSpPr/>
+        <p:nvPr/>
+      </p:nvGrpSpPr>
+      <p:grpSpPr>
+        <a:xfrm>
+          <a:off x="0" y="0"/>
+          <a:ext cx="0" cy="0"/>
+          <a:chOff x="0" y="0"/>
+          <a:chExt cx="0" cy="0"/>
+        </a:xfrm>
+      </p:grpSpPr>
+      <p:sp>
+        <p:nvSpPr>
+          <p:cNvPr id="2" name="Title 1">
+            <a:extLst>
+              <a:ext uri="{FF2B5EF4-FFF2-40B4-BE49-F238E27FC236}">
+                <a16:creationId xmlns:a16="http://schemas.microsoft.com/office/drawing/2014/main" id="{30102EBE-4894-4054-8001-62CDB0C48B56}"/>
+              </a:ext>
+            </a:extLst>
+          </p:cNvPr>
+          <p:cNvSpPr>
+            <a:spLocks noGrp="1"/>
+          </p:cNvSpPr>
+          <p:nvPr>
+            <p:ph type="title"/>
+          </p:nvPr>
+        </p:nvSpPr>
+        <p:spPr/>
+        <p:txBody>
+          <a:bodyPr>
+            <a:normAutofit fontScale="90000"/>
+          </a:bodyPr>
+          <a:lstStyle/>
+          <a:p>
+            <a:r>
+              <a:rPr lang="en-US" dirty="0"/>
+              <a:t>Kalman Filter</a:t>
+            </a:r>
+            <a:br>
+              <a:rPr lang="en-US" dirty="0"/>
+            </a:br>
+            <a:r>
+              <a:rPr lang="en-US" dirty="0"/>
               <a:t>Dynamic Hedge Ratio</a:t>
             </a:r>
             <a:br>
@@ -9530,8 +9708,8 @@
           </a:p>
         </p:txBody>
       </p:sp>
-      <mc:AlternateContent xmlns:mc="http://schemas.openxmlformats.org/markup-compatibility/2006">
-        <mc:Choice xmlns:a14="http://schemas.microsoft.com/office/drawing/2010/main" Requires="a14">
+      <mc:AlternateContent xmlns:mc="http://schemas.openxmlformats.org/markup-compatibility/2006" xmlns:a14="http://schemas.microsoft.com/office/drawing/2010/main">
+        <mc:Choice Requires="a14">
           <p:sp>
             <p:nvSpPr>
               <p:cNvPr id="6" name="Content Placeholder 5">
@@ -9974,7 +10152,7 @@
             </p:txBody>
           </p:sp>
         </mc:Choice>
-        <mc:Fallback>
+        <mc:Fallback xmlns="">
           <p:sp>
             <p:nvSpPr>
               <p:cNvPr id="6" name="Content Placeholder 5">
@@ -10056,7 +10234,7 @@
 </p:sld>
 </file>
 
-<file path=ppt/slides/slide12.xml><?xml version="1.0" encoding="utf-8"?>
+<file path=ppt/slides/slide13.xml><?xml version="1.0" encoding="utf-8"?>
 <p:sld xmlns:a="http://schemas.openxmlformats.org/drawingml/2006/main" xmlns:r="http://schemas.openxmlformats.org/officeDocument/2006/relationships" xmlns:p="http://schemas.openxmlformats.org/presentationml/2006/main">
   <p:cSld>
     <p:spTree>
@@ -10194,538 +10372,6 @@
 </p:sld>
 </file>
 
-<file path=ppt/slides/slide13.xml><?xml version="1.0" encoding="utf-8"?>
-<p:sld xmlns:a="http://schemas.openxmlformats.org/drawingml/2006/main" xmlns:r="http://schemas.openxmlformats.org/officeDocument/2006/relationships" xmlns:p="http://schemas.openxmlformats.org/presentationml/2006/main">
-  <p:cSld>
-    <p:spTree>
-      <p:nvGrpSpPr>
-        <p:cNvPr id="1" name=""/>
-        <p:cNvGrpSpPr/>
-        <p:nvPr/>
-      </p:nvGrpSpPr>
-      <p:grpSpPr>
-        <a:xfrm>
-          <a:off x="0" y="0"/>
-          <a:ext cx="0" cy="0"/>
-          <a:chOff x="0" y="0"/>
-          <a:chExt cx="0" cy="0"/>
-        </a:xfrm>
-      </p:grpSpPr>
-      <p:sp>
-        <p:nvSpPr>
-          <p:cNvPr id="2" name="Title 1">
-            <a:extLst>
-              <a:ext uri="{FF2B5EF4-FFF2-40B4-BE49-F238E27FC236}">
-                <a16:creationId xmlns:a16="http://schemas.microsoft.com/office/drawing/2014/main" id="{4B9E96CB-2365-49E0-BA19-2E007721B06E}"/>
-              </a:ext>
-            </a:extLst>
-          </p:cNvPr>
-          <p:cNvSpPr>
-            <a:spLocks noGrp="1"/>
-          </p:cNvSpPr>
-          <p:nvPr>
-            <p:ph type="title"/>
-          </p:nvPr>
-        </p:nvSpPr>
-        <p:spPr/>
-        <p:txBody>
-          <a:bodyPr/>
-          <a:lstStyle/>
-          <a:p>
-            <a:r>
-              <a:rPr lang="en-US" dirty="0"/>
-              <a:t>q/KDB+ Code</a:t>
-            </a:r>
-          </a:p>
-        </p:txBody>
-      </p:sp>
-      <p:sp>
-        <p:nvSpPr>
-          <p:cNvPr id="3" name="Content Placeholder 2">
-            <a:extLst>
-              <a:ext uri="{FF2B5EF4-FFF2-40B4-BE49-F238E27FC236}">
-                <a16:creationId xmlns:a16="http://schemas.microsoft.com/office/drawing/2014/main" id="{0231F2F8-8A23-4BAD-B906-B29918C223BB}"/>
-              </a:ext>
-            </a:extLst>
-          </p:cNvPr>
-          <p:cNvSpPr>
-            <a:spLocks noGrp="1"/>
-          </p:cNvSpPr>
-          <p:nvPr>
-            <p:ph sz="half" idx="1"/>
-          </p:nvPr>
-        </p:nvSpPr>
-        <p:spPr/>
-        <p:txBody>
-          <a:bodyPr>
-            <a:noAutofit/>
-          </a:bodyPr>
-          <a:lstStyle/>
-          <a:p>
-            <a:pPr marL="0" indent="0">
-              <a:buNone/>
-            </a:pPr>
-            <a:r>
-              <a:rPr lang="en-US" sz="1200" dirty="0">
-                <a:latin typeface="Courier New" panose="02070309020205020404" pitchFamily="49" charset="0"/>
-                <a:cs typeface="Courier New" panose="02070309020205020404" pitchFamily="49" charset="0"/>
-              </a:rPr>
-              <a:t>/ Constants</a:t>
-            </a:r>
-          </a:p>
-          <a:p>
-            <a:pPr marL="0" indent="0">
-              <a:buNone/>
-            </a:pPr>
-            <a:r>
-              <a:rPr lang="en-US" sz="1200" dirty="0">
-                <a:latin typeface="Courier New" panose="02070309020205020404" pitchFamily="49" charset="0"/>
-                <a:cs typeface="Courier New" panose="02070309020205020404" pitchFamily="49" charset="0"/>
-              </a:rPr>
-              <a:t>g:9.81;  / gravity m/s^2</a:t>
-            </a:r>
-          </a:p>
-          <a:p>
-            <a:pPr marL="0" indent="0">
-              <a:buNone/>
-            </a:pPr>
-            <a:endParaRPr lang="en-US" sz="1200" dirty="0">
-              <a:latin typeface="Courier New" panose="02070309020205020404" pitchFamily="49" charset="0"/>
-              <a:cs typeface="Courier New" panose="02070309020205020404" pitchFamily="49" charset="0"/>
-            </a:endParaRPr>
-          </a:p>
-          <a:p>
-            <a:pPr marL="0" indent="0">
-              <a:buNone/>
-            </a:pPr>
-            <a:r>
-              <a:rPr lang="en-US" sz="1200" dirty="0">
-                <a:latin typeface="Courier New" panose="02070309020205020404" pitchFamily="49" charset="0"/>
-                <a:cs typeface="Courier New" panose="02070309020205020404" pitchFamily="49" charset="0"/>
-              </a:rPr>
-              <a:t>/ Time steps</a:t>
-            </a:r>
-          </a:p>
-          <a:p>
-            <a:pPr marL="0" indent="0">
-              <a:buNone/>
-            </a:pPr>
-            <a:r>
-              <a:rPr lang="en-US" sz="1200" dirty="0">
-                <a:latin typeface="Courier New" panose="02070309020205020404" pitchFamily="49" charset="0"/>
-                <a:cs typeface="Courier New" panose="02070309020205020404" pitchFamily="49" charset="0"/>
-              </a:rPr>
-              <a:t>dt:0.1;</a:t>
-            </a:r>
-          </a:p>
-          <a:p>
-            <a:pPr marL="0" indent="0">
-              <a:buNone/>
-            </a:pPr>
-            <a:r>
-              <a:rPr lang="en-US" sz="1200" dirty="0">
-                <a:latin typeface="Courier New" panose="02070309020205020404" pitchFamily="49" charset="0"/>
-                <a:cs typeface="Courier New" panose="02070309020205020404" pitchFamily="49" charset="0"/>
-              </a:rPr>
-              <a:t>/ [b]</a:t>
-            </a:r>
-            <a:r>
-              <a:rPr lang="en-US" sz="1200" dirty="0" err="1">
-                <a:latin typeface="Courier New" panose="02070309020205020404" pitchFamily="49" charset="0"/>
-                <a:cs typeface="Courier New" panose="02070309020205020404" pitchFamily="49" charset="0"/>
-              </a:rPr>
-              <a:t>egin</a:t>
-            </a:r>
-            <a:r>
-              <a:rPr lang="en-US" sz="1200" dirty="0">
-                <a:latin typeface="Courier New" panose="02070309020205020404" pitchFamily="49" charset="0"/>
-                <a:cs typeface="Courier New" panose="02070309020205020404" pitchFamily="49" charset="0"/>
-              </a:rPr>
-              <a:t>; [e]</a:t>
-            </a:r>
-            <a:r>
-              <a:rPr lang="en-US" sz="1200" dirty="0" err="1">
-                <a:latin typeface="Courier New" panose="02070309020205020404" pitchFamily="49" charset="0"/>
-                <a:cs typeface="Courier New" panose="02070309020205020404" pitchFamily="49" charset="0"/>
-              </a:rPr>
-              <a:t>nd</a:t>
-            </a:r>
-            <a:r>
-              <a:rPr lang="en-US" sz="1200" dirty="0">
-                <a:latin typeface="Courier New" panose="02070309020205020404" pitchFamily="49" charset="0"/>
-                <a:cs typeface="Courier New" panose="02070309020205020404" pitchFamily="49" charset="0"/>
-              </a:rPr>
-              <a:t>; [s]</a:t>
-            </a:r>
-            <a:r>
-              <a:rPr lang="en-US" sz="1200" dirty="0" err="1">
-                <a:latin typeface="Courier New" panose="02070309020205020404" pitchFamily="49" charset="0"/>
-                <a:cs typeface="Courier New" panose="02070309020205020404" pitchFamily="49" charset="0"/>
-              </a:rPr>
-              <a:t>tep</a:t>
-            </a:r>
-            <a:endParaRPr lang="en-US" sz="1200" dirty="0">
-              <a:latin typeface="Courier New" panose="02070309020205020404" pitchFamily="49" charset="0"/>
-              <a:cs typeface="Courier New" panose="02070309020205020404" pitchFamily="49" charset="0"/>
-            </a:endParaRPr>
-          </a:p>
-          <a:p>
-            <a:pPr marL="0" indent="0">
-              <a:buNone/>
-            </a:pPr>
-            <a:r>
-              <a:rPr lang="en-US" sz="1200" dirty="0" err="1">
-                <a:latin typeface="Courier New" panose="02070309020205020404" pitchFamily="49" charset="0"/>
-                <a:cs typeface="Courier New" panose="02070309020205020404" pitchFamily="49" charset="0"/>
-              </a:rPr>
-              <a:t>arange</a:t>
-            </a:r>
-            <a:r>
-              <a:rPr lang="en-US" sz="1200" dirty="0">
-                <a:latin typeface="Courier New" panose="02070309020205020404" pitchFamily="49" charset="0"/>
-                <a:cs typeface="Courier New" panose="02070309020205020404" pitchFamily="49" charset="0"/>
-              </a:rPr>
-              <a:t>:{[</a:t>
-            </a:r>
-            <a:r>
-              <a:rPr lang="en-US" sz="1200" dirty="0" err="1">
-                <a:latin typeface="Courier New" panose="02070309020205020404" pitchFamily="49" charset="0"/>
-                <a:cs typeface="Courier New" panose="02070309020205020404" pitchFamily="49" charset="0"/>
-              </a:rPr>
-              <a:t>b;e;s</a:t>
-            </a:r>
-            <a:r>
-              <a:rPr lang="en-US" sz="1200" dirty="0">
-                <a:latin typeface="Courier New" panose="02070309020205020404" pitchFamily="49" charset="0"/>
-                <a:cs typeface="Courier New" panose="02070309020205020404" pitchFamily="49" charset="0"/>
-              </a:rPr>
-              <a:t>] </a:t>
-            </a:r>
-            <a:r>
-              <a:rPr lang="en-US" sz="1200" dirty="0" err="1">
-                <a:latin typeface="Courier New" panose="02070309020205020404" pitchFamily="49" charset="0"/>
-                <a:cs typeface="Courier New" panose="02070309020205020404" pitchFamily="49" charset="0"/>
-              </a:rPr>
-              <a:t>b+s</a:t>
-            </a:r>
-            <a:r>
-              <a:rPr lang="en-US" sz="1200" dirty="0">
-                <a:latin typeface="Courier New" panose="02070309020205020404" pitchFamily="49" charset="0"/>
-                <a:cs typeface="Courier New" panose="02070309020205020404" pitchFamily="49" charset="0"/>
-              </a:rPr>
-              <a:t>*</a:t>
-            </a:r>
-            <a:r>
-              <a:rPr lang="en-US" sz="1200" dirty="0" err="1">
-                <a:latin typeface="Courier New" panose="02070309020205020404" pitchFamily="49" charset="0"/>
-                <a:cs typeface="Courier New" panose="02070309020205020404" pitchFamily="49" charset="0"/>
-              </a:rPr>
-              <a:t>til</a:t>
-            </a:r>
-            <a:r>
-              <a:rPr lang="en-US" sz="1200" dirty="0">
-                <a:latin typeface="Courier New" panose="02070309020205020404" pitchFamily="49" charset="0"/>
-                <a:cs typeface="Courier New" panose="02070309020205020404" pitchFamily="49" charset="0"/>
-              </a:rPr>
-              <a:t> "j"$-[</a:t>
-            </a:r>
-            <a:r>
-              <a:rPr lang="en-US" sz="1200" dirty="0" err="1">
-                <a:latin typeface="Courier New" panose="02070309020205020404" pitchFamily="49" charset="0"/>
-                <a:cs typeface="Courier New" panose="02070309020205020404" pitchFamily="49" charset="0"/>
-              </a:rPr>
-              <a:t>e;b</a:t>
-            </a:r>
-            <a:r>
-              <a:rPr lang="en-US" sz="1200" dirty="0">
-                <a:latin typeface="Courier New" panose="02070309020205020404" pitchFamily="49" charset="0"/>
-                <a:cs typeface="Courier New" panose="02070309020205020404" pitchFamily="49" charset="0"/>
-              </a:rPr>
-              <a:t>]%s};</a:t>
-            </a:r>
-          </a:p>
-          <a:p>
-            <a:pPr marL="0" indent="0">
-              <a:buNone/>
-            </a:pPr>
-            <a:r>
-              <a:rPr lang="en-US" sz="1200" dirty="0" err="1">
-                <a:latin typeface="Courier New" panose="02070309020205020404" pitchFamily="49" charset="0"/>
-                <a:cs typeface="Courier New" panose="02070309020205020404" pitchFamily="49" charset="0"/>
-              </a:rPr>
-              <a:t>times:arange</a:t>
-            </a:r>
-            <a:r>
-              <a:rPr lang="en-US" sz="1200" dirty="0">
-                <a:latin typeface="Courier New" panose="02070309020205020404" pitchFamily="49" charset="0"/>
-                <a:cs typeface="Courier New" panose="02070309020205020404" pitchFamily="49" charset="0"/>
-              </a:rPr>
-              <a:t>[0;10;dt];</a:t>
-            </a:r>
-          </a:p>
-          <a:p>
-            <a:pPr marL="0" indent="0">
-              <a:buNone/>
-            </a:pPr>
-            <a:endParaRPr lang="en-US" sz="1200" dirty="0">
-              <a:latin typeface="Courier New" panose="02070309020205020404" pitchFamily="49" charset="0"/>
-              <a:cs typeface="Courier New" panose="02070309020205020404" pitchFamily="49" charset="0"/>
-            </a:endParaRPr>
-          </a:p>
-          <a:p>
-            <a:pPr marL="0" indent="0">
-              <a:buNone/>
-            </a:pPr>
-            <a:r>
-              <a:rPr lang="en-US" sz="1200" dirty="0">
-                <a:latin typeface="Courier New" panose="02070309020205020404" pitchFamily="49" charset="0"/>
-                <a:cs typeface="Courier New" panose="02070309020205020404" pitchFamily="49" charset="0"/>
-              </a:rPr>
-              <a:t>/ Initial conditions</a:t>
-            </a:r>
-          </a:p>
-          <a:p>
-            <a:pPr marL="0" indent="0">
-              <a:buNone/>
-            </a:pPr>
-            <a:r>
-              <a:rPr lang="en-US" sz="1200" dirty="0">
-                <a:latin typeface="Courier New" panose="02070309020205020404" pitchFamily="49" charset="0"/>
-                <a:cs typeface="Courier New" panose="02070309020205020404" pitchFamily="49" charset="0"/>
-              </a:rPr>
-              <a:t>x0:0; y0:0; vx0:50; vy0:50; / pos in m; vel in m/s</a:t>
-            </a:r>
-          </a:p>
-          <a:p>
-            <a:pPr marL="0" indent="0">
-              <a:buNone/>
-            </a:pPr>
-            <a:endParaRPr lang="en-US" sz="1200" dirty="0">
-              <a:latin typeface="Courier New" panose="02070309020205020404" pitchFamily="49" charset="0"/>
-              <a:cs typeface="Courier New" panose="02070309020205020404" pitchFamily="49" charset="0"/>
-            </a:endParaRPr>
-          </a:p>
-          <a:p>
-            <a:pPr marL="0" indent="0">
-              <a:buNone/>
-            </a:pPr>
-            <a:endParaRPr lang="en-US" sz="1200" dirty="0">
-              <a:latin typeface="Courier New" panose="02070309020205020404" pitchFamily="49" charset="0"/>
-              <a:cs typeface="Courier New" panose="02070309020205020404" pitchFamily="49" charset="0"/>
-            </a:endParaRPr>
-          </a:p>
-        </p:txBody>
-      </p:sp>
-      <p:sp>
-        <p:nvSpPr>
-          <p:cNvPr id="4" name="Content Placeholder 3">
-            <a:extLst>
-              <a:ext uri="{FF2B5EF4-FFF2-40B4-BE49-F238E27FC236}">
-                <a16:creationId xmlns:a16="http://schemas.microsoft.com/office/drawing/2014/main" id="{68634F60-5796-438E-808B-D52176E542F6}"/>
-              </a:ext>
-            </a:extLst>
-          </p:cNvPr>
-          <p:cNvSpPr>
-            <a:spLocks noGrp="1"/>
-          </p:cNvSpPr>
-          <p:nvPr>
-            <p:ph sz="half" idx="2"/>
-          </p:nvPr>
-        </p:nvSpPr>
-        <p:spPr/>
-        <p:txBody>
-          <a:bodyPr>
-            <a:noAutofit/>
-          </a:bodyPr>
-          <a:lstStyle/>
-          <a:p>
-            <a:pPr marL="0" indent="0">
-              <a:buNone/>
-            </a:pPr>
-            <a:r>
-              <a:rPr lang="en-US" sz="1200" dirty="0">
-                <a:latin typeface="Courier New" panose="02070309020205020404" pitchFamily="49" charset="0"/>
-                <a:cs typeface="Courier New" panose="02070309020205020404" pitchFamily="49" charset="0"/>
-              </a:rPr>
-              <a:t>/ Actual trajectory</a:t>
-            </a:r>
-          </a:p>
-          <a:p>
-            <a:pPr marL="0" indent="0">
-              <a:buNone/>
-            </a:pPr>
-            <a:r>
-              <a:rPr lang="en-US" sz="1200" dirty="0" err="1">
-                <a:latin typeface="Courier New" panose="02070309020205020404" pitchFamily="49" charset="0"/>
-                <a:cs typeface="Courier New" panose="02070309020205020404" pitchFamily="49" charset="0"/>
-              </a:rPr>
-              <a:t>atraj</a:t>
-            </a:r>
-            <a:r>
-              <a:rPr lang="en-US" sz="1200" dirty="0">
-                <a:latin typeface="Courier New" panose="02070309020205020404" pitchFamily="49" charset="0"/>
-                <a:cs typeface="Courier New" panose="02070309020205020404" pitchFamily="49" charset="0"/>
-              </a:rPr>
-              <a:t>:{[g;x0;y0;vx0;vy0;t]</a:t>
-            </a:r>
-          </a:p>
-          <a:p>
-            <a:pPr marL="0" indent="0">
-              <a:buNone/>
-            </a:pPr>
-            <a:r>
-              <a:rPr lang="en-US" sz="1200" dirty="0">
-                <a:latin typeface="Courier New" panose="02070309020205020404" pitchFamily="49" charset="0"/>
-                <a:cs typeface="Courier New" panose="02070309020205020404" pitchFamily="49" charset="0"/>
-              </a:rPr>
-              <a:t>  x:x0+vx0*t;               / x pos</a:t>
-            </a:r>
-          </a:p>
-          <a:p>
-            <a:pPr marL="0" indent="0">
-              <a:buNone/>
-            </a:pPr>
-            <a:r>
-              <a:rPr lang="en-US" sz="1200" dirty="0">
-                <a:latin typeface="Courier New" panose="02070309020205020404" pitchFamily="49" charset="0"/>
-                <a:cs typeface="Courier New" panose="02070309020205020404" pitchFamily="49" charset="0"/>
-              </a:rPr>
-              <a:t>  y:-[y0+vy0*t;0.5*g*t*t];  / y pos y0+vy0*t-0.5*g*t^2</a:t>
-            </a:r>
-          </a:p>
-          <a:p>
-            <a:pPr marL="0" indent="0">
-              <a:buNone/>
-            </a:pPr>
-            <a:r>
-              <a:rPr lang="en-US" sz="1200" dirty="0">
-                <a:latin typeface="Courier New" panose="02070309020205020404" pitchFamily="49" charset="0"/>
-                <a:cs typeface="Courier New" panose="02070309020205020404" pitchFamily="49" charset="0"/>
-              </a:rPr>
-              <a:t>  vx:vx0;                   / x vel (no air resistance)</a:t>
-            </a:r>
-          </a:p>
-          <a:p>
-            <a:pPr marL="0" indent="0">
-              <a:buNone/>
-            </a:pPr>
-            <a:r>
-              <a:rPr lang="en-US" sz="1200" dirty="0">
-                <a:latin typeface="Courier New" panose="02070309020205020404" pitchFamily="49" charset="0"/>
-                <a:cs typeface="Courier New" panose="02070309020205020404" pitchFamily="49" charset="0"/>
-              </a:rPr>
-              <a:t>  vy:vy0-g*t;               / y vel (gravity but no air res)</a:t>
-            </a:r>
-          </a:p>
-          <a:p>
-            <a:pPr marL="0" indent="0">
-              <a:buNone/>
-            </a:pPr>
-            <a:r>
-              <a:rPr lang="en-US" sz="1200" dirty="0">
-                <a:latin typeface="Courier New" panose="02070309020205020404" pitchFamily="49" charset="0"/>
-                <a:cs typeface="Courier New" panose="02070309020205020404" pitchFamily="49" charset="0"/>
-              </a:rPr>
-              <a:t>  (</a:t>
-            </a:r>
-            <a:r>
-              <a:rPr lang="en-US" sz="1200" dirty="0" err="1">
-                <a:latin typeface="Courier New" panose="02070309020205020404" pitchFamily="49" charset="0"/>
-                <a:cs typeface="Courier New" panose="02070309020205020404" pitchFamily="49" charset="0"/>
-              </a:rPr>
-              <a:t>x;y;vx;vy</a:t>
-            </a:r>
-            <a:r>
-              <a:rPr lang="en-US" sz="1200" dirty="0">
-                <a:latin typeface="Courier New" panose="02070309020205020404" pitchFamily="49" charset="0"/>
-                <a:cs typeface="Courier New" panose="02070309020205020404" pitchFamily="49" charset="0"/>
-              </a:rPr>
-              <a:t>)};</a:t>
-            </a:r>
-          </a:p>
-          <a:p>
-            <a:pPr marL="0" indent="0">
-              <a:buNone/>
-            </a:pPr>
-            <a:r>
-              <a:rPr lang="en-US" sz="1200" dirty="0" err="1">
-                <a:latin typeface="Courier New" panose="02070309020205020404" pitchFamily="49" charset="0"/>
-                <a:cs typeface="Courier New" panose="02070309020205020404" pitchFamily="49" charset="0"/>
-              </a:rPr>
-              <a:t>act_traj:atraj</a:t>
-            </a:r>
-            <a:r>
-              <a:rPr lang="en-US" sz="1200" dirty="0">
-                <a:latin typeface="Courier New" panose="02070309020205020404" pitchFamily="49" charset="0"/>
-                <a:cs typeface="Courier New" panose="02070309020205020404" pitchFamily="49" charset="0"/>
-              </a:rPr>
-              <a:t>[g;x0;y0;vx0;vy0;];</a:t>
-            </a:r>
-          </a:p>
-          <a:p>
-            <a:pPr marL="0" indent="0">
-              <a:buNone/>
-            </a:pPr>
-            <a:endParaRPr lang="en-US" sz="1200" dirty="0">
-              <a:latin typeface="Courier New" panose="02070309020205020404" pitchFamily="49" charset="0"/>
-              <a:cs typeface="Courier New" panose="02070309020205020404" pitchFamily="49" charset="0"/>
-            </a:endParaRPr>
-          </a:p>
-          <a:p>
-            <a:pPr marL="0" indent="0">
-              <a:buNone/>
-            </a:pPr>
-            <a:r>
-              <a:rPr lang="en-US" sz="1200" dirty="0">
-                <a:latin typeface="Courier New" panose="02070309020205020404" pitchFamily="49" charset="0"/>
-                <a:cs typeface="Courier New" panose="02070309020205020404" pitchFamily="49" charset="0"/>
-              </a:rPr>
-              <a:t>/ Simulate actual trajectory</a:t>
-            </a:r>
-          </a:p>
-          <a:p>
-            <a:pPr marL="0" indent="0">
-              <a:buNone/>
-            </a:pPr>
-            <a:r>
-              <a:rPr lang="en-US" sz="1200" dirty="0" err="1">
-                <a:latin typeface="Courier New" panose="02070309020205020404" pitchFamily="49" charset="0"/>
-                <a:cs typeface="Courier New" panose="02070309020205020404" pitchFamily="49" charset="0"/>
-              </a:rPr>
-              <a:t>true_traj:act_traj</a:t>
-            </a:r>
-            <a:r>
-              <a:rPr lang="en-US" sz="1200" dirty="0">
-                <a:latin typeface="Courier New" panose="02070309020205020404" pitchFamily="49" charset="0"/>
-                <a:cs typeface="Courier New" panose="02070309020205020404" pitchFamily="49" charset="0"/>
-              </a:rPr>
-              <a:t>[times];  / use the projection</a:t>
-            </a:r>
-          </a:p>
-          <a:p>
-            <a:pPr marL="0" indent="0">
-              <a:buNone/>
-            </a:pPr>
-            <a:endParaRPr lang="en-US" sz="1200" dirty="0">
-              <a:latin typeface="Courier New" panose="02070309020205020404" pitchFamily="49" charset="0"/>
-              <a:cs typeface="Courier New" panose="02070309020205020404" pitchFamily="49" charset="0"/>
-            </a:endParaRPr>
-          </a:p>
-        </p:txBody>
-      </p:sp>
-    </p:spTree>
-    <p:extLst>
-      <p:ext uri="{BB962C8B-B14F-4D97-AF65-F5344CB8AC3E}">
-        <p14:creationId xmlns:p14="http://schemas.microsoft.com/office/powerpoint/2010/main" val="2496925664"/>
-      </p:ext>
-    </p:extLst>
-  </p:cSld>
-  <p:clrMapOvr>
-    <a:masterClrMapping/>
-  </p:clrMapOvr>
-</p:sld>
-</file>
-
 <file path=ppt/slides/slide14.xml><?xml version="1.0" encoding="utf-8"?>
 <p:sld xmlns:a="http://schemas.openxmlformats.org/drawingml/2006/main" xmlns:r="http://schemas.openxmlformats.org/officeDocument/2006/relationships" xmlns:p="http://schemas.openxmlformats.org/presentationml/2006/main">
   <p:cSld>
@@ -10802,6 +10448,538 @@
                 <a:latin typeface="Courier New" panose="02070309020205020404" pitchFamily="49" charset="0"/>
                 <a:cs typeface="Courier New" panose="02070309020205020404" pitchFamily="49" charset="0"/>
               </a:rPr>
+              <a:t>/ Constants</a:t>
+            </a:r>
+          </a:p>
+          <a:p>
+            <a:pPr marL="0" indent="0">
+              <a:buNone/>
+            </a:pPr>
+            <a:r>
+              <a:rPr lang="en-US" sz="1200" dirty="0">
+                <a:latin typeface="Courier New" panose="02070309020205020404" pitchFamily="49" charset="0"/>
+                <a:cs typeface="Courier New" panose="02070309020205020404" pitchFamily="49" charset="0"/>
+              </a:rPr>
+              <a:t>g:9.81;  / gravity m/s^2</a:t>
+            </a:r>
+          </a:p>
+          <a:p>
+            <a:pPr marL="0" indent="0">
+              <a:buNone/>
+            </a:pPr>
+            <a:endParaRPr lang="en-US" sz="1200" dirty="0">
+              <a:latin typeface="Courier New" panose="02070309020205020404" pitchFamily="49" charset="0"/>
+              <a:cs typeface="Courier New" panose="02070309020205020404" pitchFamily="49" charset="0"/>
+            </a:endParaRPr>
+          </a:p>
+          <a:p>
+            <a:pPr marL="0" indent="0">
+              <a:buNone/>
+            </a:pPr>
+            <a:r>
+              <a:rPr lang="en-US" sz="1200" dirty="0">
+                <a:latin typeface="Courier New" panose="02070309020205020404" pitchFamily="49" charset="0"/>
+                <a:cs typeface="Courier New" panose="02070309020205020404" pitchFamily="49" charset="0"/>
+              </a:rPr>
+              <a:t>/ Time steps</a:t>
+            </a:r>
+          </a:p>
+          <a:p>
+            <a:pPr marL="0" indent="0">
+              <a:buNone/>
+            </a:pPr>
+            <a:r>
+              <a:rPr lang="en-US" sz="1200" dirty="0">
+                <a:latin typeface="Courier New" panose="02070309020205020404" pitchFamily="49" charset="0"/>
+                <a:cs typeface="Courier New" panose="02070309020205020404" pitchFamily="49" charset="0"/>
+              </a:rPr>
+              <a:t>dt:0.1;</a:t>
+            </a:r>
+          </a:p>
+          <a:p>
+            <a:pPr marL="0" indent="0">
+              <a:buNone/>
+            </a:pPr>
+            <a:r>
+              <a:rPr lang="en-US" sz="1200" dirty="0">
+                <a:latin typeface="Courier New" panose="02070309020205020404" pitchFamily="49" charset="0"/>
+                <a:cs typeface="Courier New" panose="02070309020205020404" pitchFamily="49" charset="0"/>
+              </a:rPr>
+              <a:t>/ [b]</a:t>
+            </a:r>
+            <a:r>
+              <a:rPr lang="en-US" sz="1200" dirty="0" err="1">
+                <a:latin typeface="Courier New" panose="02070309020205020404" pitchFamily="49" charset="0"/>
+                <a:cs typeface="Courier New" panose="02070309020205020404" pitchFamily="49" charset="0"/>
+              </a:rPr>
+              <a:t>egin</a:t>
+            </a:r>
+            <a:r>
+              <a:rPr lang="en-US" sz="1200" dirty="0">
+                <a:latin typeface="Courier New" panose="02070309020205020404" pitchFamily="49" charset="0"/>
+                <a:cs typeface="Courier New" panose="02070309020205020404" pitchFamily="49" charset="0"/>
+              </a:rPr>
+              <a:t>; [e]</a:t>
+            </a:r>
+            <a:r>
+              <a:rPr lang="en-US" sz="1200" dirty="0" err="1">
+                <a:latin typeface="Courier New" panose="02070309020205020404" pitchFamily="49" charset="0"/>
+                <a:cs typeface="Courier New" panose="02070309020205020404" pitchFamily="49" charset="0"/>
+              </a:rPr>
+              <a:t>nd</a:t>
+            </a:r>
+            <a:r>
+              <a:rPr lang="en-US" sz="1200" dirty="0">
+                <a:latin typeface="Courier New" panose="02070309020205020404" pitchFamily="49" charset="0"/>
+                <a:cs typeface="Courier New" panose="02070309020205020404" pitchFamily="49" charset="0"/>
+              </a:rPr>
+              <a:t>; [s]</a:t>
+            </a:r>
+            <a:r>
+              <a:rPr lang="en-US" sz="1200" dirty="0" err="1">
+                <a:latin typeface="Courier New" panose="02070309020205020404" pitchFamily="49" charset="0"/>
+                <a:cs typeface="Courier New" panose="02070309020205020404" pitchFamily="49" charset="0"/>
+              </a:rPr>
+              <a:t>tep</a:t>
+            </a:r>
+            <a:endParaRPr lang="en-US" sz="1200" dirty="0">
+              <a:latin typeface="Courier New" panose="02070309020205020404" pitchFamily="49" charset="0"/>
+              <a:cs typeface="Courier New" panose="02070309020205020404" pitchFamily="49" charset="0"/>
+            </a:endParaRPr>
+          </a:p>
+          <a:p>
+            <a:pPr marL="0" indent="0">
+              <a:buNone/>
+            </a:pPr>
+            <a:r>
+              <a:rPr lang="en-US" sz="1200" dirty="0" err="1">
+                <a:latin typeface="Courier New" panose="02070309020205020404" pitchFamily="49" charset="0"/>
+                <a:cs typeface="Courier New" panose="02070309020205020404" pitchFamily="49" charset="0"/>
+              </a:rPr>
+              <a:t>arange</a:t>
+            </a:r>
+            <a:r>
+              <a:rPr lang="en-US" sz="1200" dirty="0">
+                <a:latin typeface="Courier New" panose="02070309020205020404" pitchFamily="49" charset="0"/>
+                <a:cs typeface="Courier New" panose="02070309020205020404" pitchFamily="49" charset="0"/>
+              </a:rPr>
+              <a:t>:{[</a:t>
+            </a:r>
+            <a:r>
+              <a:rPr lang="en-US" sz="1200" dirty="0" err="1">
+                <a:latin typeface="Courier New" panose="02070309020205020404" pitchFamily="49" charset="0"/>
+                <a:cs typeface="Courier New" panose="02070309020205020404" pitchFamily="49" charset="0"/>
+              </a:rPr>
+              <a:t>b;e;s</a:t>
+            </a:r>
+            <a:r>
+              <a:rPr lang="en-US" sz="1200" dirty="0">
+                <a:latin typeface="Courier New" panose="02070309020205020404" pitchFamily="49" charset="0"/>
+                <a:cs typeface="Courier New" panose="02070309020205020404" pitchFamily="49" charset="0"/>
+              </a:rPr>
+              <a:t>] </a:t>
+            </a:r>
+            <a:r>
+              <a:rPr lang="en-US" sz="1200" dirty="0" err="1">
+                <a:latin typeface="Courier New" panose="02070309020205020404" pitchFamily="49" charset="0"/>
+                <a:cs typeface="Courier New" panose="02070309020205020404" pitchFamily="49" charset="0"/>
+              </a:rPr>
+              <a:t>b+s</a:t>
+            </a:r>
+            <a:r>
+              <a:rPr lang="en-US" sz="1200" dirty="0">
+                <a:latin typeface="Courier New" panose="02070309020205020404" pitchFamily="49" charset="0"/>
+                <a:cs typeface="Courier New" panose="02070309020205020404" pitchFamily="49" charset="0"/>
+              </a:rPr>
+              <a:t>*</a:t>
+            </a:r>
+            <a:r>
+              <a:rPr lang="en-US" sz="1200" dirty="0" err="1">
+                <a:latin typeface="Courier New" panose="02070309020205020404" pitchFamily="49" charset="0"/>
+                <a:cs typeface="Courier New" panose="02070309020205020404" pitchFamily="49" charset="0"/>
+              </a:rPr>
+              <a:t>til</a:t>
+            </a:r>
+            <a:r>
+              <a:rPr lang="en-US" sz="1200" dirty="0">
+                <a:latin typeface="Courier New" panose="02070309020205020404" pitchFamily="49" charset="0"/>
+                <a:cs typeface="Courier New" panose="02070309020205020404" pitchFamily="49" charset="0"/>
+              </a:rPr>
+              <a:t> "j"$-[</a:t>
+            </a:r>
+            <a:r>
+              <a:rPr lang="en-US" sz="1200" dirty="0" err="1">
+                <a:latin typeface="Courier New" panose="02070309020205020404" pitchFamily="49" charset="0"/>
+                <a:cs typeface="Courier New" panose="02070309020205020404" pitchFamily="49" charset="0"/>
+              </a:rPr>
+              <a:t>e;b</a:t>
+            </a:r>
+            <a:r>
+              <a:rPr lang="en-US" sz="1200" dirty="0">
+                <a:latin typeface="Courier New" panose="02070309020205020404" pitchFamily="49" charset="0"/>
+                <a:cs typeface="Courier New" panose="02070309020205020404" pitchFamily="49" charset="0"/>
+              </a:rPr>
+              <a:t>]%s};</a:t>
+            </a:r>
+          </a:p>
+          <a:p>
+            <a:pPr marL="0" indent="0">
+              <a:buNone/>
+            </a:pPr>
+            <a:r>
+              <a:rPr lang="en-US" sz="1200" dirty="0" err="1">
+                <a:latin typeface="Courier New" panose="02070309020205020404" pitchFamily="49" charset="0"/>
+                <a:cs typeface="Courier New" panose="02070309020205020404" pitchFamily="49" charset="0"/>
+              </a:rPr>
+              <a:t>times:arange</a:t>
+            </a:r>
+            <a:r>
+              <a:rPr lang="en-US" sz="1200" dirty="0">
+                <a:latin typeface="Courier New" panose="02070309020205020404" pitchFamily="49" charset="0"/>
+                <a:cs typeface="Courier New" panose="02070309020205020404" pitchFamily="49" charset="0"/>
+              </a:rPr>
+              <a:t>[0;10;dt];</a:t>
+            </a:r>
+          </a:p>
+          <a:p>
+            <a:pPr marL="0" indent="0">
+              <a:buNone/>
+            </a:pPr>
+            <a:endParaRPr lang="en-US" sz="1200" dirty="0">
+              <a:latin typeface="Courier New" panose="02070309020205020404" pitchFamily="49" charset="0"/>
+              <a:cs typeface="Courier New" panose="02070309020205020404" pitchFamily="49" charset="0"/>
+            </a:endParaRPr>
+          </a:p>
+          <a:p>
+            <a:pPr marL="0" indent="0">
+              <a:buNone/>
+            </a:pPr>
+            <a:r>
+              <a:rPr lang="en-US" sz="1200" dirty="0">
+                <a:latin typeface="Courier New" panose="02070309020205020404" pitchFamily="49" charset="0"/>
+                <a:cs typeface="Courier New" panose="02070309020205020404" pitchFamily="49" charset="0"/>
+              </a:rPr>
+              <a:t>/ Initial conditions</a:t>
+            </a:r>
+          </a:p>
+          <a:p>
+            <a:pPr marL="0" indent="0">
+              <a:buNone/>
+            </a:pPr>
+            <a:r>
+              <a:rPr lang="en-US" sz="1200" dirty="0">
+                <a:latin typeface="Courier New" panose="02070309020205020404" pitchFamily="49" charset="0"/>
+                <a:cs typeface="Courier New" panose="02070309020205020404" pitchFamily="49" charset="0"/>
+              </a:rPr>
+              <a:t>x0:0; y0:0; vx0:50; vy0:50; / pos in m; vel in m/s</a:t>
+            </a:r>
+          </a:p>
+          <a:p>
+            <a:pPr marL="0" indent="0">
+              <a:buNone/>
+            </a:pPr>
+            <a:endParaRPr lang="en-US" sz="1200" dirty="0">
+              <a:latin typeface="Courier New" panose="02070309020205020404" pitchFamily="49" charset="0"/>
+              <a:cs typeface="Courier New" panose="02070309020205020404" pitchFamily="49" charset="0"/>
+            </a:endParaRPr>
+          </a:p>
+          <a:p>
+            <a:pPr marL="0" indent="0">
+              <a:buNone/>
+            </a:pPr>
+            <a:endParaRPr lang="en-US" sz="1200" dirty="0">
+              <a:latin typeface="Courier New" panose="02070309020205020404" pitchFamily="49" charset="0"/>
+              <a:cs typeface="Courier New" panose="02070309020205020404" pitchFamily="49" charset="0"/>
+            </a:endParaRPr>
+          </a:p>
+        </p:txBody>
+      </p:sp>
+      <p:sp>
+        <p:nvSpPr>
+          <p:cNvPr id="4" name="Content Placeholder 3">
+            <a:extLst>
+              <a:ext uri="{FF2B5EF4-FFF2-40B4-BE49-F238E27FC236}">
+                <a16:creationId xmlns:a16="http://schemas.microsoft.com/office/drawing/2014/main" id="{68634F60-5796-438E-808B-D52176E542F6}"/>
+              </a:ext>
+            </a:extLst>
+          </p:cNvPr>
+          <p:cNvSpPr>
+            <a:spLocks noGrp="1"/>
+          </p:cNvSpPr>
+          <p:nvPr>
+            <p:ph sz="half" idx="2"/>
+          </p:nvPr>
+        </p:nvSpPr>
+        <p:spPr/>
+        <p:txBody>
+          <a:bodyPr>
+            <a:noAutofit/>
+          </a:bodyPr>
+          <a:lstStyle/>
+          <a:p>
+            <a:pPr marL="0" indent="0">
+              <a:buNone/>
+            </a:pPr>
+            <a:r>
+              <a:rPr lang="en-US" sz="1200" dirty="0">
+                <a:latin typeface="Courier New" panose="02070309020205020404" pitchFamily="49" charset="0"/>
+                <a:cs typeface="Courier New" panose="02070309020205020404" pitchFamily="49" charset="0"/>
+              </a:rPr>
+              <a:t>/ Actual trajectory</a:t>
+            </a:r>
+          </a:p>
+          <a:p>
+            <a:pPr marL="0" indent="0">
+              <a:buNone/>
+            </a:pPr>
+            <a:r>
+              <a:rPr lang="en-US" sz="1200" dirty="0" err="1">
+                <a:latin typeface="Courier New" panose="02070309020205020404" pitchFamily="49" charset="0"/>
+                <a:cs typeface="Courier New" panose="02070309020205020404" pitchFamily="49" charset="0"/>
+              </a:rPr>
+              <a:t>atraj</a:t>
+            </a:r>
+            <a:r>
+              <a:rPr lang="en-US" sz="1200" dirty="0">
+                <a:latin typeface="Courier New" panose="02070309020205020404" pitchFamily="49" charset="0"/>
+                <a:cs typeface="Courier New" panose="02070309020205020404" pitchFamily="49" charset="0"/>
+              </a:rPr>
+              <a:t>:{[g;x0;y0;vx0;vy0;t]</a:t>
+            </a:r>
+          </a:p>
+          <a:p>
+            <a:pPr marL="0" indent="0">
+              <a:buNone/>
+            </a:pPr>
+            <a:r>
+              <a:rPr lang="en-US" sz="1200" dirty="0">
+                <a:latin typeface="Courier New" panose="02070309020205020404" pitchFamily="49" charset="0"/>
+                <a:cs typeface="Courier New" panose="02070309020205020404" pitchFamily="49" charset="0"/>
+              </a:rPr>
+              <a:t>  x:x0+vx0*t;               / x pos</a:t>
+            </a:r>
+          </a:p>
+          <a:p>
+            <a:pPr marL="0" indent="0">
+              <a:buNone/>
+            </a:pPr>
+            <a:r>
+              <a:rPr lang="en-US" sz="1200" dirty="0">
+                <a:latin typeface="Courier New" panose="02070309020205020404" pitchFamily="49" charset="0"/>
+                <a:cs typeface="Courier New" panose="02070309020205020404" pitchFamily="49" charset="0"/>
+              </a:rPr>
+              <a:t>  y:-[y0+vy0*t;0.5*g*t*t];  / y pos y0+vy0*t-0.5*g*t^2</a:t>
+            </a:r>
+          </a:p>
+          <a:p>
+            <a:pPr marL="0" indent="0">
+              <a:buNone/>
+            </a:pPr>
+            <a:r>
+              <a:rPr lang="en-US" sz="1200" dirty="0">
+                <a:latin typeface="Courier New" panose="02070309020205020404" pitchFamily="49" charset="0"/>
+                <a:cs typeface="Courier New" panose="02070309020205020404" pitchFamily="49" charset="0"/>
+              </a:rPr>
+              <a:t>  vx:vx0;                   / x vel (no air resistance)</a:t>
+            </a:r>
+          </a:p>
+          <a:p>
+            <a:pPr marL="0" indent="0">
+              <a:buNone/>
+            </a:pPr>
+            <a:r>
+              <a:rPr lang="en-US" sz="1200" dirty="0">
+                <a:latin typeface="Courier New" panose="02070309020205020404" pitchFamily="49" charset="0"/>
+                <a:cs typeface="Courier New" panose="02070309020205020404" pitchFamily="49" charset="0"/>
+              </a:rPr>
+              <a:t>  vy:vy0-g*t;               / y vel (gravity but no air res)</a:t>
+            </a:r>
+          </a:p>
+          <a:p>
+            <a:pPr marL="0" indent="0">
+              <a:buNone/>
+            </a:pPr>
+            <a:r>
+              <a:rPr lang="en-US" sz="1200" dirty="0">
+                <a:latin typeface="Courier New" panose="02070309020205020404" pitchFamily="49" charset="0"/>
+                <a:cs typeface="Courier New" panose="02070309020205020404" pitchFamily="49" charset="0"/>
+              </a:rPr>
+              <a:t>  (</a:t>
+            </a:r>
+            <a:r>
+              <a:rPr lang="en-US" sz="1200" dirty="0" err="1">
+                <a:latin typeface="Courier New" panose="02070309020205020404" pitchFamily="49" charset="0"/>
+                <a:cs typeface="Courier New" panose="02070309020205020404" pitchFamily="49" charset="0"/>
+              </a:rPr>
+              <a:t>x;y;vx;vy</a:t>
+            </a:r>
+            <a:r>
+              <a:rPr lang="en-US" sz="1200" dirty="0">
+                <a:latin typeface="Courier New" panose="02070309020205020404" pitchFamily="49" charset="0"/>
+                <a:cs typeface="Courier New" panose="02070309020205020404" pitchFamily="49" charset="0"/>
+              </a:rPr>
+              <a:t>)};</a:t>
+            </a:r>
+          </a:p>
+          <a:p>
+            <a:pPr marL="0" indent="0">
+              <a:buNone/>
+            </a:pPr>
+            <a:r>
+              <a:rPr lang="en-US" sz="1200" dirty="0" err="1">
+                <a:latin typeface="Courier New" panose="02070309020205020404" pitchFamily="49" charset="0"/>
+                <a:cs typeface="Courier New" panose="02070309020205020404" pitchFamily="49" charset="0"/>
+              </a:rPr>
+              <a:t>act_traj:atraj</a:t>
+            </a:r>
+            <a:r>
+              <a:rPr lang="en-US" sz="1200" dirty="0">
+                <a:latin typeface="Courier New" panose="02070309020205020404" pitchFamily="49" charset="0"/>
+                <a:cs typeface="Courier New" panose="02070309020205020404" pitchFamily="49" charset="0"/>
+              </a:rPr>
+              <a:t>[g;x0;y0;vx0;vy0;];</a:t>
+            </a:r>
+          </a:p>
+          <a:p>
+            <a:pPr marL="0" indent="0">
+              <a:buNone/>
+            </a:pPr>
+            <a:endParaRPr lang="en-US" sz="1200" dirty="0">
+              <a:latin typeface="Courier New" panose="02070309020205020404" pitchFamily="49" charset="0"/>
+              <a:cs typeface="Courier New" panose="02070309020205020404" pitchFamily="49" charset="0"/>
+            </a:endParaRPr>
+          </a:p>
+          <a:p>
+            <a:pPr marL="0" indent="0">
+              <a:buNone/>
+            </a:pPr>
+            <a:r>
+              <a:rPr lang="en-US" sz="1200" dirty="0">
+                <a:latin typeface="Courier New" panose="02070309020205020404" pitchFamily="49" charset="0"/>
+                <a:cs typeface="Courier New" panose="02070309020205020404" pitchFamily="49" charset="0"/>
+              </a:rPr>
+              <a:t>/ Simulate actual trajectory</a:t>
+            </a:r>
+          </a:p>
+          <a:p>
+            <a:pPr marL="0" indent="0">
+              <a:buNone/>
+            </a:pPr>
+            <a:r>
+              <a:rPr lang="en-US" sz="1200" dirty="0" err="1">
+                <a:latin typeface="Courier New" panose="02070309020205020404" pitchFamily="49" charset="0"/>
+                <a:cs typeface="Courier New" panose="02070309020205020404" pitchFamily="49" charset="0"/>
+              </a:rPr>
+              <a:t>true_traj:act_traj</a:t>
+            </a:r>
+            <a:r>
+              <a:rPr lang="en-US" sz="1200" dirty="0">
+                <a:latin typeface="Courier New" panose="02070309020205020404" pitchFamily="49" charset="0"/>
+                <a:cs typeface="Courier New" panose="02070309020205020404" pitchFamily="49" charset="0"/>
+              </a:rPr>
+              <a:t>[times];  / use the projection</a:t>
+            </a:r>
+          </a:p>
+          <a:p>
+            <a:pPr marL="0" indent="0">
+              <a:buNone/>
+            </a:pPr>
+            <a:endParaRPr lang="en-US" sz="1200" dirty="0">
+              <a:latin typeface="Courier New" panose="02070309020205020404" pitchFamily="49" charset="0"/>
+              <a:cs typeface="Courier New" panose="02070309020205020404" pitchFamily="49" charset="0"/>
+            </a:endParaRPr>
+          </a:p>
+        </p:txBody>
+      </p:sp>
+    </p:spTree>
+    <p:extLst>
+      <p:ext uri="{BB962C8B-B14F-4D97-AF65-F5344CB8AC3E}">
+        <p14:creationId xmlns:p14="http://schemas.microsoft.com/office/powerpoint/2010/main" val="2496925664"/>
+      </p:ext>
+    </p:extLst>
+  </p:cSld>
+  <p:clrMapOvr>
+    <a:masterClrMapping/>
+  </p:clrMapOvr>
+</p:sld>
+</file>
+
+<file path=ppt/slides/slide15.xml><?xml version="1.0" encoding="utf-8"?>
+<p:sld xmlns:a="http://schemas.openxmlformats.org/drawingml/2006/main" xmlns:r="http://schemas.openxmlformats.org/officeDocument/2006/relationships" xmlns:p="http://schemas.openxmlformats.org/presentationml/2006/main">
+  <p:cSld>
+    <p:spTree>
+      <p:nvGrpSpPr>
+        <p:cNvPr id="1" name=""/>
+        <p:cNvGrpSpPr/>
+        <p:nvPr/>
+      </p:nvGrpSpPr>
+      <p:grpSpPr>
+        <a:xfrm>
+          <a:off x="0" y="0"/>
+          <a:ext cx="0" cy="0"/>
+          <a:chOff x="0" y="0"/>
+          <a:chExt cx="0" cy="0"/>
+        </a:xfrm>
+      </p:grpSpPr>
+      <p:sp>
+        <p:nvSpPr>
+          <p:cNvPr id="2" name="Title 1">
+            <a:extLst>
+              <a:ext uri="{FF2B5EF4-FFF2-40B4-BE49-F238E27FC236}">
+                <a16:creationId xmlns:a16="http://schemas.microsoft.com/office/drawing/2014/main" id="{4B9E96CB-2365-49E0-BA19-2E007721B06E}"/>
+              </a:ext>
+            </a:extLst>
+          </p:cNvPr>
+          <p:cNvSpPr>
+            <a:spLocks noGrp="1"/>
+          </p:cNvSpPr>
+          <p:nvPr>
+            <p:ph type="title"/>
+          </p:nvPr>
+        </p:nvSpPr>
+        <p:spPr/>
+        <p:txBody>
+          <a:bodyPr/>
+          <a:lstStyle/>
+          <a:p>
+            <a:r>
+              <a:rPr lang="en-US" dirty="0"/>
+              <a:t>q/KDB+ Code</a:t>
+            </a:r>
+          </a:p>
+        </p:txBody>
+      </p:sp>
+      <p:sp>
+        <p:nvSpPr>
+          <p:cNvPr id="3" name="Content Placeholder 2">
+            <a:extLst>
+              <a:ext uri="{FF2B5EF4-FFF2-40B4-BE49-F238E27FC236}">
+                <a16:creationId xmlns:a16="http://schemas.microsoft.com/office/drawing/2014/main" id="{0231F2F8-8A23-4BAD-B906-B29918C223BB}"/>
+              </a:ext>
+            </a:extLst>
+          </p:cNvPr>
+          <p:cNvSpPr>
+            <a:spLocks noGrp="1"/>
+          </p:cNvSpPr>
+          <p:nvPr>
+            <p:ph sz="half" idx="1"/>
+          </p:nvPr>
+        </p:nvSpPr>
+        <p:spPr/>
+        <p:txBody>
+          <a:bodyPr>
+            <a:noAutofit/>
+          </a:bodyPr>
+          <a:lstStyle/>
+          <a:p>
+            <a:pPr marL="0" indent="0">
+              <a:buNone/>
+            </a:pPr>
+            <a:r>
+              <a:rPr lang="en-US" sz="1200" dirty="0">
+                <a:latin typeface="Courier New" panose="02070309020205020404" pitchFamily="49" charset="0"/>
+                <a:cs typeface="Courier New" panose="02070309020205020404" pitchFamily="49" charset="0"/>
+              </a:rPr>
               <a:t>/ Simulate measurements</a:t>
             </a:r>
           </a:p>
@@ -11232,7 +11410,7 @@
 </p:sld>
 </file>
 
-<file path=ppt/slides/slide15.xml><?xml version="1.0" encoding="utf-8"?>
+<file path=ppt/slides/slide16.xml><?xml version="1.0" encoding="utf-8"?>
 <p:sld xmlns:a="http://schemas.openxmlformats.org/drawingml/2006/main" xmlns:r="http://schemas.openxmlformats.org/officeDocument/2006/relationships" xmlns:p="http://schemas.openxmlformats.org/presentationml/2006/main">
   <p:cSld>
     <p:spTree>
@@ -11923,7 +12101,7 @@
 </p:sld>
 </file>
 
-<file path=ppt/slides/slide16.xml><?xml version="1.0" encoding="utf-8"?>
+<file path=ppt/slides/slide17.xml><?xml version="1.0" encoding="utf-8"?>
 <p:sld xmlns:a="http://schemas.openxmlformats.org/drawingml/2006/main" xmlns:r="http://schemas.openxmlformats.org/officeDocument/2006/relationships" xmlns:p="http://schemas.openxmlformats.org/presentationml/2006/main">
   <p:cSld>
     <p:spTree>
@@ -12650,7 +12828,7 @@
 </p:sld>
 </file>
 
-<file path=ppt/slides/slide17.xml><?xml version="1.0" encoding="utf-8"?>
+<file path=ppt/slides/slide18.xml><?xml version="1.0" encoding="utf-8"?>
 <p:sld xmlns:a="http://schemas.openxmlformats.org/drawingml/2006/main" xmlns:r="http://schemas.openxmlformats.org/officeDocument/2006/relationships" xmlns:p="http://schemas.openxmlformats.org/presentationml/2006/main" show="0">
   <p:cSld>
     <p:spTree>
@@ -12865,7 +13043,7 @@
 </p:sld>
 </file>
 
-<file path=ppt/slides/slide18.xml><?xml version="1.0" encoding="utf-8"?>
+<file path=ppt/slides/slide19.xml><?xml version="1.0" encoding="utf-8"?>
 <p:sld xmlns:a="http://schemas.openxmlformats.org/drawingml/2006/main" xmlns:r="http://schemas.openxmlformats.org/officeDocument/2006/relationships" xmlns:p="http://schemas.openxmlformats.org/presentationml/2006/main">
   <p:cSld>
     <p:spTree>
@@ -13575,8 +13753,8 @@
           </a:p>
         </p:txBody>
       </p:sp>
-      <mc:AlternateContent xmlns:mc="http://schemas.openxmlformats.org/markup-compatibility/2006">
-        <mc:Choice xmlns:a14="http://schemas.microsoft.com/office/drawing/2010/main" Requires="a14">
+      <mc:AlternateContent xmlns:mc="http://schemas.openxmlformats.org/markup-compatibility/2006" xmlns:a14="http://schemas.microsoft.com/office/drawing/2010/main">
+        <mc:Choice Requires="a14">
           <p:sp>
             <p:nvSpPr>
               <p:cNvPr id="9" name="Content Placeholder 8">
@@ -13921,7 +14099,7 @@
             </p:txBody>
           </p:sp>
         </mc:Choice>
-        <mc:Fallback>
+        <mc:Fallback xmlns="">
           <p:sp>
             <p:nvSpPr>
               <p:cNvPr id="9" name="Content Placeholder 8">

</xml_diff>

<commit_message>
Update the Kalmn Filter code
</commit_message>
<xml_diff>
--- a/Kalman Filter/KALMAN FILTER FIN 2025.pptx
+++ b/Kalman Filter/KALMAN FILTER FIN 2025.pptx
@@ -5,7 +5,7 @@
     <p:sldMasterId id="2147483648" r:id="rId1"/>
   </p:sldMasterIdLst>
   <p:notesMasterIdLst>
-    <p:notesMasterId r:id="rId21"/>
+    <p:notesMasterId r:id="rId20"/>
   </p:notesMasterIdLst>
   <p:sldIdLst>
     <p:sldId id="256" r:id="rId2"/>
@@ -24,9 +24,8 @@
     <p:sldId id="266" r:id="rId15"/>
     <p:sldId id="272" r:id="rId16"/>
     <p:sldId id="273" r:id="rId17"/>
-    <p:sldId id="274" r:id="rId18"/>
-    <p:sldId id="259" r:id="rId19"/>
-    <p:sldId id="267" r:id="rId20"/>
+    <p:sldId id="259" r:id="rId18"/>
+    <p:sldId id="267" r:id="rId19"/>
   </p:sldIdLst>
   <p:sldSz cx="12192000" cy="6858000"/>
   <p:notesSz cx="6858000" cy="9144000"/>
@@ -570,7 +569,7 @@
           <a:p>
             <a:fld id="{9F34524B-208E-4470-83DF-9357896802DB}" type="datetimeFigureOut">
               <a:rPr lang="en-US" smtClean="0"/>
-              <a:t>3/3/25</a:t>
+              <a:t>3/6/25</a:t>
             </a:fld>
             <a:endParaRPr lang="en-US"/>
           </a:p>
@@ -1349,7 +1348,7 @@
           <a:p>
             <a:r>
               <a:rPr lang="en-US" dirty="0"/>
-              <a:t>Over the next four slides, I will show the q code to implement a Kalman Filter for a simple ballistic target.</a:t>
+              <a:t>Over the next three slides, I will show the q code to implement a Kalman Filter for the simple spread estimation.</a:t>
             </a:r>
           </a:p>
           <a:p>
@@ -1361,19 +1360,21 @@
           <a:p>
             <a:r>
               <a:rPr lang="en-US" dirty="0"/>
-              <a:t>The left hand side establishes some constants, time steps and initial conditions.</a:t>
-            </a:r>
-          </a:p>
-          <a:p>
-            <a:r>
-              <a:rPr lang="en-US" dirty="0"/>
-              <a:t>The right hand side defines a generic function to compute the actual trajectory given a time.</a:t>
-            </a:r>
-          </a:p>
-          <a:p>
-            <a:r>
-              <a:rPr lang="en-US" dirty="0"/>
-              <a:t>It then defines a projection for these specific initial conditions. It then simulates the actual trajectory for the all the times.</a:t>
+              <a:t>The left hand side reads in some market data from CSV files, joins them and calculates the spread.</a:t>
+            </a:r>
+          </a:p>
+          <a:p>
+            <a:r>
+              <a:rPr lang="en-US" dirty="0"/>
+              <a:t>The right hand side defines the </a:t>
+            </a:r>
+            <a:r>
+              <a:rPr lang="en-US" dirty="0" err="1"/>
+              <a:t>x_est</a:t>
+            </a:r>
+            <a:r>
+              <a:rPr lang="en-US" dirty="0"/>
+              <a:t>, the state vector estimate, and several matrices used in the Kalman filter.</a:t>
             </a:r>
           </a:p>
         </p:txBody>
@@ -1460,31 +1461,29 @@
           <a:p>
             <a:r>
               <a:rPr lang="en-US" dirty="0"/>
-              <a:t>The code on the left hand side defines some noise parameters and computes a times series of noisy measurements.</a:t>
-            </a:r>
-          </a:p>
-          <a:p>
-            <a:r>
-              <a:rPr lang="en-US" dirty="0"/>
-              <a:t>The measurement noise is normally distributed.</a:t>
-            </a:r>
-          </a:p>
-          <a:p>
-            <a:r>
-              <a:rPr lang="en-US" dirty="0"/>
-              <a:t>I take advantage of the Box Muller algorithm for computing pairs of standard normally distributed variables from uniform draws.</a:t>
-            </a:r>
-          </a:p>
-          <a:p>
-            <a:r>
-              <a:rPr lang="en-US" dirty="0"/>
-              <a:t>Once the standard derivations are properly scaled, it is added to the true state.</a:t>
-            </a:r>
-          </a:p>
-          <a:p>
-            <a:r>
-              <a:rPr lang="en-US" dirty="0"/>
-              <a:t>On the right hand side, I define a function from the q phrasebook and set up some initializations.</a:t>
+              <a:t>The left hand side is the definition of the </a:t>
+            </a:r>
+            <a:r>
+              <a:rPr lang="en-US" dirty="0" err="1"/>
+              <a:t>predictState</a:t>
+            </a:r>
+            <a:r>
+              <a:rPr lang="en-US" dirty="0"/>
+              <a:t> function.</a:t>
+            </a:r>
+          </a:p>
+          <a:p>
+            <a:r>
+              <a:rPr lang="en-US" dirty="0"/>
+              <a:t>The right hand side is the Kalman Gain function. There is a matrix inversion operation. q/</a:t>
+            </a:r>
+            <a:r>
+              <a:rPr lang="en-US" dirty="0" err="1"/>
+              <a:t>kdb</a:t>
+            </a:r>
+            <a:r>
+              <a:rPr lang="en-US" dirty="0"/>
+              <a:t> uses the LU decomposition technique so it is robust in this use case.</a:t>
             </a:r>
           </a:p>
         </p:txBody>
@@ -1589,7 +1588,21 @@
           <a:p>
             <a:r>
               <a:rPr lang="en-US" dirty="0"/>
-              <a:t>This slide contains the meat of the Kalman Filter. There are two basic steps in the Kalman Filter: prediction and update. There is a third function defined here for computing the Kalman Gain which I factored out for maintainability.</a:t>
+              <a:t>This final code slide has the update function on the left hand side.</a:t>
+            </a:r>
+          </a:p>
+          <a:p>
+            <a:r>
+              <a:rPr lang="en-US" dirty="0"/>
+              <a:t>The right hand side sets up some variables and then iterates over each time step. The final two lines simply write out </a:t>
+            </a:r>
+            <a:r>
+              <a:rPr lang="en-US"/>
+              <a:t>the results</a:t>
+            </a:r>
+            <a:r>
+              <a:rPr lang="en-US" dirty="0"/>
+              <a:t>.</a:t>
             </a:r>
           </a:p>
         </p:txBody>
@@ -1641,13 +1654,7 @@
   <p:cSld>
     <p:spTree>
       <p:nvGrpSpPr>
-        <p:cNvPr id="1" name="">
-          <a:extLst>
-            <a:ext uri="{FF2B5EF4-FFF2-40B4-BE49-F238E27FC236}">
-              <a16:creationId xmlns:a16="http://schemas.microsoft.com/office/drawing/2014/main" id="{EE279BB8-6A51-C074-8D3C-697C24DB0C68}"/>
-            </a:ext>
-          </a:extLst>
-        </p:cNvPr>
+        <p:cNvPr id="1" name=""/>
         <p:cNvGrpSpPr/>
         <p:nvPr/>
       </p:nvGrpSpPr>
@@ -1661,13 +1668,7 @@
       </p:grpSpPr>
       <p:sp>
         <p:nvSpPr>
-          <p:cNvPr id="2" name="Slide Image Placeholder 1">
-            <a:extLst>
-              <a:ext uri="{FF2B5EF4-FFF2-40B4-BE49-F238E27FC236}">
-                <a16:creationId xmlns:a16="http://schemas.microsoft.com/office/drawing/2014/main" id="{42F2F720-3392-F849-F212-E046CE522BB0}"/>
-              </a:ext>
-            </a:extLst>
-          </p:cNvPr>
+          <p:cNvPr id="2" name="Slide Image Placeholder 1"/>
           <p:cNvSpPr>
             <a:spLocks noGrp="1" noRot="1" noChangeAspect="1"/>
           </p:cNvSpPr>
@@ -1679,13 +1680,7 @@
       </p:sp>
       <p:sp>
         <p:nvSpPr>
-          <p:cNvPr id="3" name="Notes Placeholder 2">
-            <a:extLst>
-              <a:ext uri="{FF2B5EF4-FFF2-40B4-BE49-F238E27FC236}">
-                <a16:creationId xmlns:a16="http://schemas.microsoft.com/office/drawing/2014/main" id="{A6C471DC-7D46-5E38-023A-45FDBE6DF489}"/>
-              </a:ext>
-            </a:extLst>
-          </p:cNvPr>
+          <p:cNvPr id="3" name="Notes Placeholder 2"/>
           <p:cNvSpPr>
             <a:spLocks noGrp="1"/>
           </p:cNvSpPr>
@@ -1699,33 +1694,46 @@
           <a:lstStyle/>
           <a:p>
             <a:r>
-              <a:rPr lang="en-US" dirty="0"/>
-              <a:t>Once all the initialization and function definitions are complete, we want to run the Kalman Filter over the measured values. Although good q programmers avoid loops, I thought it would be clearer to iterate over time using a while loop.</a:t>
-            </a:r>
-          </a:p>
-          <a:p>
-            <a:r>
-              <a:rPr lang="en-US" dirty="0"/>
-              <a:t>The right hand side creates a bunch of tables, joins them together sideways and writes out a data.csv.</a:t>
-            </a:r>
-          </a:p>
-          <a:p>
-            <a:r>
-              <a:rPr lang="en-US" dirty="0"/>
-              <a:t>In a previous iteration of this presentation I used Excel to graph the results, but am now using matplotlib in Python</a:t>
-            </a:r>
+              <a:rPr lang="en-US" b="1" dirty="0"/>
+              <a:t>Notes for Finance:</a:t>
+            </a:r>
+          </a:p>
+          <a:p>
+            <a:pPr>
+              <a:buFont typeface="Arial" panose="020B0604020202020204" pitchFamily="34" charset="0"/>
+              <a:buChar char="•"/>
+            </a:pPr>
+            <a:r>
+              <a:rPr lang="en-US" b="1" dirty="0"/>
+              <a:t>Applications in Finance</a:t>
+            </a:r>
+            <a:r>
+              <a:rPr lang="en-US" dirty="0"/>
+              <a:t>: These extended filters are often applied to model more complex, non-linear processes, such as asset price predictions, option pricing, and managing risk in portfolios.</a:t>
+            </a:r>
+          </a:p>
+          <a:p>
+            <a:pPr>
+              <a:buFont typeface="Arial" panose="020B0604020202020204" pitchFamily="34" charset="0"/>
+              <a:buChar char="•"/>
+            </a:pPr>
+            <a:r>
+              <a:rPr lang="en-US" b="1" dirty="0"/>
+              <a:t>Non-linear Dynamics</a:t>
+            </a:r>
+            <a:r>
+              <a:rPr lang="en-US" dirty="0"/>
+              <a:t>: Many financial systems are inherently non-linear, which makes filters like the EKF and UKF essential tools in more sophisticated modeling.</a:t>
+            </a:r>
+          </a:p>
+          <a:p>
+            <a:endParaRPr lang="en-US" dirty="0"/>
           </a:p>
         </p:txBody>
       </p:sp>
       <p:sp>
         <p:nvSpPr>
-          <p:cNvPr id="4" name="Slide Number Placeholder 3">
-            <a:extLst>
-              <a:ext uri="{FF2B5EF4-FFF2-40B4-BE49-F238E27FC236}">
-                <a16:creationId xmlns:a16="http://schemas.microsoft.com/office/drawing/2014/main" id="{073BA8D5-31F8-F9BB-78B1-7D005B947C68}"/>
-              </a:ext>
-            </a:extLst>
-          </p:cNvPr>
+          <p:cNvPr id="4" name="Slide Number Placeholder 3"/>
           <p:cNvSpPr>
             <a:spLocks noGrp="1"/>
           </p:cNvSpPr>
@@ -1749,7 +1757,7 @@
     </p:spTree>
     <p:extLst>
       <p:ext uri="{BB962C8B-B14F-4D97-AF65-F5344CB8AC3E}">
-        <p14:creationId xmlns:p14="http://schemas.microsoft.com/office/powerpoint/2010/main" val="3714274123"/>
+        <p14:creationId xmlns:p14="http://schemas.microsoft.com/office/powerpoint/2010/main" val="2483520408"/>
       </p:ext>
     </p:extLst>
   </p:cSld>
@@ -1804,40 +1812,114 @@
           <a:lstStyle/>
           <a:p>
             <a:r>
-              <a:rPr lang="en-US" b="1" dirty="0"/>
-              <a:t>Notes for Finance:</a:t>
-            </a:r>
-          </a:p>
-          <a:p>
-            <a:pPr>
-              <a:buFont typeface="Arial" panose="020B0604020202020204" pitchFamily="34" charset="0"/>
-              <a:buChar char="•"/>
+              <a:rPr lang="en-US" dirty="0"/>
+              <a:t>It is optimal if:</a:t>
+            </a:r>
+          </a:p>
+          <a:p>
+            <a:pPr marL="228600" indent="-228600">
+              <a:buAutoNum type="arabicPeriod"/>
             </a:pPr>
             <a:r>
-              <a:rPr lang="en-US" b="1" dirty="0"/>
-              <a:t>Applications in Finance</a:t>
-            </a:r>
-            <a:r>
-              <a:rPr lang="en-US" dirty="0"/>
-              <a:t>: These extended filters are often applied to model more complex, non-linear processes, such as asset price predictions, option pricing, and managing risk in portfolios.</a:t>
-            </a:r>
-          </a:p>
-          <a:p>
-            <a:pPr>
-              <a:buFont typeface="Arial" panose="020B0604020202020204" pitchFamily="34" charset="0"/>
-              <a:buChar char="•"/>
+              <a:rPr lang="en-US" dirty="0"/>
+              <a:t>Model perfectly matches the real system</a:t>
+            </a:r>
+          </a:p>
+          <a:p>
+            <a:pPr marL="228600" indent="-228600">
+              <a:buAutoNum type="arabicPeriod"/>
             </a:pPr>
             <a:r>
-              <a:rPr lang="en-US" b="1" dirty="0"/>
-              <a:t>Non-linear Dynamics</a:t>
-            </a:r>
-            <a:r>
-              <a:rPr lang="en-US" dirty="0"/>
-              <a:t>: Many financial systems are inherently non-linear, which makes filters like the EKF and UKF essential tools in more sophisticated modeling.</a:t>
-            </a:r>
-          </a:p>
-          <a:p>
+              <a:rPr lang="en-US" dirty="0"/>
+              <a:t>Noises are uncorrelated and white</a:t>
+            </a:r>
+          </a:p>
+          <a:p>
+            <a:pPr marL="228600" indent="-228600">
+              <a:buAutoNum type="arabicPeriod"/>
+            </a:pPr>
+            <a:r>
+              <a:rPr lang="en-US" dirty="0"/>
+              <a:t>Covariances of white noise are known</a:t>
+            </a:r>
+          </a:p>
+          <a:p>
+            <a:pPr marL="228600" indent="-228600">
+              <a:buAutoNum type="arabicPeriod"/>
+            </a:pPr>
             <a:endParaRPr lang="en-US" dirty="0"/>
+          </a:p>
+          <a:p>
+            <a:pPr marL="0" indent="0">
+              <a:buNone/>
+            </a:pPr>
+            <a:r>
+              <a:rPr lang="en-US" dirty="0"/>
+              <a:t>Robust</a:t>
+            </a:r>
+          </a:p>
+          <a:p>
+            <a:pPr marL="0" indent="0">
+              <a:buNone/>
+            </a:pPr>
+            <a:r>
+              <a:rPr lang="en-US" dirty="0"/>
+              <a:t>-Stable given common conditions and forgiving in many way</a:t>
+            </a:r>
+          </a:p>
+          <a:p>
+            <a:pPr marL="0" indent="0">
+              <a:buNone/>
+            </a:pPr>
+            <a:endParaRPr lang="en-US" dirty="0"/>
+          </a:p>
+          <a:p>
+            <a:r>
+              <a:rPr lang="en-US" dirty="0"/>
+              <a:t>Give special thanks to</a:t>
+            </a:r>
+          </a:p>
+          <a:p>
+            <a:r>
+              <a:rPr lang="en-US" dirty="0"/>
+              <a:t>Dr. Chris </a:t>
+            </a:r>
+            <a:r>
+              <a:rPr lang="en-US" dirty="0" err="1"/>
+              <a:t>Kubelek</a:t>
+            </a:r>
+            <a:r>
+              <a:rPr lang="en-US" dirty="0"/>
+              <a:t> for inspiring my initial interest in Kalman Filters</a:t>
+            </a:r>
+          </a:p>
+          <a:p>
+            <a:r>
+              <a:rPr lang="en-US" dirty="0"/>
+              <a:t>Dr. </a:t>
+            </a:r>
+            <a:r>
+              <a:rPr lang="en-US" dirty="0" err="1"/>
+              <a:t>Hizuru</a:t>
+            </a:r>
+            <a:r>
+              <a:rPr lang="en-US" dirty="0"/>
+              <a:t> Konishi for being a fantastic sempai and mentor at MUFG Bank</a:t>
+            </a:r>
+          </a:p>
+          <a:p>
+            <a:r>
+              <a:rPr lang="en-US" dirty="0"/>
+              <a:t>Dr. Laurent </a:t>
+            </a:r>
+            <a:r>
+              <a:rPr lang="en-US" dirty="0" err="1"/>
+              <a:t>Calvet</a:t>
+            </a:r>
+            <a:r>
+              <a:rPr lang="en-US" dirty="0"/>
+              <a:t> at EDHEC</a:t>
+            </a:r>
           </a:p>
         </p:txBody>
       </p:sp>
@@ -1859,198 +1941,6 @@
             <a:fld id="{F011AAC0-AB02-4B64-A809-419AC12897EB}" type="slidenum">
               <a:rPr lang="en-US" smtClean="0"/>
               <a:t>18</a:t>
-            </a:fld>
-            <a:endParaRPr lang="en-US"/>
-          </a:p>
-        </p:txBody>
-      </p:sp>
-    </p:spTree>
-    <p:extLst>
-      <p:ext uri="{BB962C8B-B14F-4D97-AF65-F5344CB8AC3E}">
-        <p14:creationId xmlns:p14="http://schemas.microsoft.com/office/powerpoint/2010/main" val="2483520408"/>
-      </p:ext>
-    </p:extLst>
-  </p:cSld>
-  <p:clrMapOvr>
-    <a:masterClrMapping/>
-  </p:clrMapOvr>
-</p:notes>
-</file>
-
-<file path=ppt/notesSlides/notesSlide17.xml><?xml version="1.0" encoding="utf-8"?>
-<p:notes xmlns:a="http://schemas.openxmlformats.org/drawingml/2006/main" xmlns:r="http://schemas.openxmlformats.org/officeDocument/2006/relationships" xmlns:p="http://schemas.openxmlformats.org/presentationml/2006/main">
-  <p:cSld>
-    <p:spTree>
-      <p:nvGrpSpPr>
-        <p:cNvPr id="1" name=""/>
-        <p:cNvGrpSpPr/>
-        <p:nvPr/>
-      </p:nvGrpSpPr>
-      <p:grpSpPr>
-        <a:xfrm>
-          <a:off x="0" y="0"/>
-          <a:ext cx="0" cy="0"/>
-          <a:chOff x="0" y="0"/>
-          <a:chExt cx="0" cy="0"/>
-        </a:xfrm>
-      </p:grpSpPr>
-      <p:sp>
-        <p:nvSpPr>
-          <p:cNvPr id="2" name="Slide Image Placeholder 1"/>
-          <p:cNvSpPr>
-            <a:spLocks noGrp="1" noRot="1" noChangeAspect="1"/>
-          </p:cNvSpPr>
-          <p:nvPr>
-            <p:ph type="sldImg"/>
-          </p:nvPr>
-        </p:nvSpPr>
-        <p:spPr/>
-      </p:sp>
-      <p:sp>
-        <p:nvSpPr>
-          <p:cNvPr id="3" name="Notes Placeholder 2"/>
-          <p:cNvSpPr>
-            <a:spLocks noGrp="1"/>
-          </p:cNvSpPr>
-          <p:nvPr>
-            <p:ph type="body" idx="1"/>
-          </p:nvPr>
-        </p:nvSpPr>
-        <p:spPr/>
-        <p:txBody>
-          <a:bodyPr/>
-          <a:lstStyle/>
-          <a:p>
-            <a:r>
-              <a:rPr lang="en-US" dirty="0"/>
-              <a:t>It is optimal if:</a:t>
-            </a:r>
-          </a:p>
-          <a:p>
-            <a:pPr marL="228600" indent="-228600">
-              <a:buAutoNum type="arabicPeriod"/>
-            </a:pPr>
-            <a:r>
-              <a:rPr lang="en-US" dirty="0"/>
-              <a:t>Model perfectly matches the real system</a:t>
-            </a:r>
-          </a:p>
-          <a:p>
-            <a:pPr marL="228600" indent="-228600">
-              <a:buAutoNum type="arabicPeriod"/>
-            </a:pPr>
-            <a:r>
-              <a:rPr lang="en-US" dirty="0"/>
-              <a:t>Noises are uncorrelated and white</a:t>
-            </a:r>
-          </a:p>
-          <a:p>
-            <a:pPr marL="228600" indent="-228600">
-              <a:buAutoNum type="arabicPeriod"/>
-            </a:pPr>
-            <a:r>
-              <a:rPr lang="en-US" dirty="0"/>
-              <a:t>Covariances of white noise are known</a:t>
-            </a:r>
-          </a:p>
-          <a:p>
-            <a:pPr marL="228600" indent="-228600">
-              <a:buAutoNum type="arabicPeriod"/>
-            </a:pPr>
-            <a:endParaRPr lang="en-US" dirty="0"/>
-          </a:p>
-          <a:p>
-            <a:pPr marL="0" indent="0">
-              <a:buNone/>
-            </a:pPr>
-            <a:r>
-              <a:rPr lang="en-US" dirty="0"/>
-              <a:t>Robust</a:t>
-            </a:r>
-          </a:p>
-          <a:p>
-            <a:pPr marL="0" indent="0">
-              <a:buNone/>
-            </a:pPr>
-            <a:r>
-              <a:rPr lang="en-US" dirty="0"/>
-              <a:t>-Stable given common conditions and forgiving in many way</a:t>
-            </a:r>
-          </a:p>
-          <a:p>
-            <a:pPr marL="0" indent="0">
-              <a:buNone/>
-            </a:pPr>
-            <a:endParaRPr lang="en-US" dirty="0"/>
-          </a:p>
-          <a:p>
-            <a:r>
-              <a:rPr lang="en-US" dirty="0"/>
-              <a:t>Give special thanks to</a:t>
-            </a:r>
-          </a:p>
-          <a:p>
-            <a:r>
-              <a:rPr lang="en-US" dirty="0"/>
-              <a:t>Dr. Chris </a:t>
-            </a:r>
-            <a:r>
-              <a:rPr lang="en-US" dirty="0" err="1"/>
-              <a:t>Kubelek</a:t>
-            </a:r>
-            <a:r>
-              <a:rPr lang="en-US" dirty="0"/>
-              <a:t> for inspiring my initial interest in Kalman Filters</a:t>
-            </a:r>
-          </a:p>
-          <a:p>
-            <a:r>
-              <a:rPr lang="en-US" dirty="0"/>
-              <a:t>Dr. </a:t>
-            </a:r>
-            <a:r>
-              <a:rPr lang="en-US" dirty="0" err="1"/>
-              <a:t>Hizuru</a:t>
-            </a:r>
-            <a:r>
-              <a:rPr lang="en-US" dirty="0"/>
-              <a:t> Konishi for being a fantastic sempai and mentor at MUFG Bank</a:t>
-            </a:r>
-          </a:p>
-          <a:p>
-            <a:r>
-              <a:rPr lang="en-US" dirty="0"/>
-              <a:t>Dr. Laurent </a:t>
-            </a:r>
-            <a:r>
-              <a:rPr lang="en-US" dirty="0" err="1"/>
-              <a:t>Calvet</a:t>
-            </a:r>
-            <a:r>
-              <a:rPr lang="en-US" dirty="0"/>
-              <a:t> at EDHEC</a:t>
-            </a:r>
-          </a:p>
-        </p:txBody>
-      </p:sp>
-      <p:sp>
-        <p:nvSpPr>
-          <p:cNvPr id="4" name="Slide Number Placeholder 3"/>
-          <p:cNvSpPr>
-            <a:spLocks noGrp="1"/>
-          </p:cNvSpPr>
-          <p:nvPr>
-            <p:ph type="sldNum" sz="quarter" idx="5"/>
-          </p:nvPr>
-        </p:nvSpPr>
-        <p:spPr/>
-        <p:txBody>
-          <a:bodyPr/>
-          <a:lstStyle/>
-          <a:p>
-            <a:fld id="{F011AAC0-AB02-4B64-A809-419AC12897EB}" type="slidenum">
-              <a:rPr lang="en-US" smtClean="0"/>
-              <a:t>19</a:t>
             </a:fld>
             <a:endParaRPr lang="en-US"/>
           </a:p>
@@ -3722,7 +3612,7 @@
           <a:p>
             <a:fld id="{48A87A34-81AB-432B-8DAE-1953F412C126}" type="datetimeFigureOut">
               <a:rPr lang="en-US" dirty="0"/>
-              <a:t>3/3/25</a:t>
+              <a:t>3/6/25</a:t>
             </a:fld>
             <a:endParaRPr lang="en-US" dirty="0"/>
           </a:p>
@@ -3984,7 +3874,7 @@
           <a:p>
             <a:fld id="{48A87A34-81AB-432B-8DAE-1953F412C126}" type="datetimeFigureOut">
               <a:rPr lang="en-US" dirty="0"/>
-              <a:t>3/3/25</a:t>
+              <a:t>3/6/25</a:t>
             </a:fld>
             <a:endParaRPr lang="en-US" dirty="0"/>
           </a:p>
@@ -4211,7 +4101,7 @@
             <a:fld id="{48A87A34-81AB-432B-8DAE-1953F412C126}" type="datetimeFigureOut">
               <a:rPr lang="en-US" dirty="0"/>
               <a:pPr/>
-              <a:t>3/3/25</a:t>
+              <a:t>3/6/25</a:t>
             </a:fld>
             <a:endParaRPr lang="en-US" dirty="0"/>
           </a:p>
@@ -4517,7 +4407,7 @@
             <a:fld id="{48A87A34-81AB-432B-8DAE-1953F412C126}" type="datetimeFigureOut">
               <a:rPr lang="en-US" dirty="0"/>
               <a:pPr/>
-              <a:t>3/3/25</a:t>
+              <a:t>3/6/25</a:t>
             </a:fld>
             <a:endParaRPr lang="en-US" dirty="0"/>
           </a:p>
@@ -4986,7 +4876,7 @@
             <a:fld id="{48A87A34-81AB-432B-8DAE-1953F412C126}" type="datetimeFigureOut">
               <a:rPr lang="en-US" dirty="0"/>
               <a:pPr/>
-              <a:t>3/3/25</a:t>
+              <a:t>3/6/25</a:t>
             </a:fld>
             <a:endParaRPr lang="en-US" dirty="0"/>
           </a:p>
@@ -5528,7 +5418,7 @@
           <a:p>
             <a:fld id="{48A87A34-81AB-432B-8DAE-1953F412C126}" type="datetimeFigureOut">
               <a:rPr lang="en-US" dirty="0"/>
-              <a:t>3/3/25</a:t>
+              <a:t>3/6/25</a:t>
             </a:fld>
             <a:endParaRPr lang="en-US" dirty="0"/>
           </a:p>
@@ -6297,7 +6187,7 @@
           <a:p>
             <a:fld id="{48A87A34-81AB-432B-8DAE-1953F412C126}" type="datetimeFigureOut">
               <a:rPr lang="en-US" dirty="0"/>
-              <a:t>3/3/25</a:t>
+              <a:t>3/6/25</a:t>
             </a:fld>
             <a:endParaRPr lang="en-US" dirty="0"/>
           </a:p>
@@ -6467,7 +6357,7 @@
           <a:p>
             <a:fld id="{48A87A34-81AB-432B-8DAE-1953F412C126}" type="datetimeFigureOut">
               <a:rPr lang="en-US" dirty="0"/>
-              <a:t>3/3/25</a:t>
+              <a:t>3/6/25</a:t>
             </a:fld>
             <a:endParaRPr lang="en-US" dirty="0"/>
           </a:p>
@@ -6686,7 +6576,7 @@
             <a:fld id="{48A87A34-81AB-432B-8DAE-1953F412C126}" type="datetimeFigureOut">
               <a:rPr lang="en-US" dirty="0"/>
               <a:pPr/>
-              <a:t>3/3/25</a:t>
+              <a:t>3/6/25</a:t>
             </a:fld>
             <a:endParaRPr lang="en-US" dirty="0"/>
           </a:p>
@@ -6861,7 +6751,7 @@
           <a:p>
             <a:fld id="{48A87A34-81AB-432B-8DAE-1953F412C126}" type="datetimeFigureOut">
               <a:rPr lang="en-US" dirty="0"/>
-              <a:t>3/3/25</a:t>
+              <a:t>3/6/25</a:t>
             </a:fld>
             <a:endParaRPr lang="en-US" dirty="0"/>
           </a:p>
@@ -7146,7 +7036,7 @@
             <a:fld id="{48A87A34-81AB-432B-8DAE-1953F412C126}" type="datetimeFigureOut">
               <a:rPr lang="en-US" dirty="0"/>
               <a:pPr/>
-              <a:t>3/3/25</a:t>
+              <a:t>3/6/25</a:t>
             </a:fld>
             <a:endParaRPr lang="en-US" dirty="0"/>
           </a:p>
@@ -7383,7 +7273,7 @@
           <a:p>
             <a:fld id="{48A87A34-81AB-432B-8DAE-1953F412C126}" type="datetimeFigureOut">
               <a:rPr lang="en-US" dirty="0"/>
-              <a:t>3/3/25</a:t>
+              <a:t>3/6/25</a:t>
             </a:fld>
             <a:endParaRPr lang="en-US" dirty="0"/>
           </a:p>
@@ -7757,7 +7647,7 @@
           <a:p>
             <a:fld id="{48A87A34-81AB-432B-8DAE-1953F412C126}" type="datetimeFigureOut">
               <a:rPr lang="en-US" dirty="0"/>
-              <a:t>3/3/25</a:t>
+              <a:t>3/6/25</a:t>
             </a:fld>
             <a:endParaRPr lang="en-US" dirty="0"/>
           </a:p>
@@ -7870,7 +7760,7 @@
           <a:p>
             <a:fld id="{48A87A34-81AB-432B-8DAE-1953F412C126}" type="datetimeFigureOut">
               <a:rPr lang="en-US" dirty="0"/>
-              <a:t>3/3/25</a:t>
+              <a:t>3/6/25</a:t>
             </a:fld>
             <a:endParaRPr lang="en-US" dirty="0"/>
           </a:p>
@@ -7960,7 +7850,7 @@
           <a:p>
             <a:fld id="{48A87A34-81AB-432B-8DAE-1953F412C126}" type="datetimeFigureOut">
               <a:rPr lang="en-US" dirty="0"/>
-              <a:t>3/3/25</a:t>
+              <a:t>3/6/25</a:t>
             </a:fld>
             <a:endParaRPr lang="en-US" dirty="0"/>
           </a:p>
@@ -8204,7 +8094,7 @@
           <a:p>
             <a:fld id="{48A87A34-81AB-432B-8DAE-1953F412C126}" type="datetimeFigureOut">
               <a:rPr lang="en-US" dirty="0"/>
-              <a:t>3/3/25</a:t>
+              <a:t>3/6/25</a:t>
             </a:fld>
             <a:endParaRPr lang="en-US" dirty="0"/>
           </a:p>
@@ -8456,7 +8346,7 @@
           <a:p>
             <a:fld id="{48A87A34-81AB-432B-8DAE-1953F412C126}" type="datetimeFigureOut">
               <a:rPr lang="en-US" dirty="0"/>
-              <a:t>3/3/25</a:t>
+              <a:t>3/6/25</a:t>
             </a:fld>
             <a:endParaRPr lang="en-US" dirty="0"/>
           </a:p>
@@ -8695,7 +8585,7 @@
             <a:fld id="{48A87A34-81AB-432B-8DAE-1953F412C126}" type="datetimeFigureOut">
               <a:rPr lang="en-US" dirty="0"/>
               <a:pPr/>
-              <a:t>3/3/25</a:t>
+              <a:t>3/6/25</a:t>
             </a:fld>
             <a:endParaRPr lang="en-US" dirty="0"/>
           </a:p>
@@ -10448,29 +10338,22 @@
                 <a:latin typeface="Courier New" panose="02070309020205020404" pitchFamily="49" charset="0"/>
                 <a:cs typeface="Courier New" panose="02070309020205020404" pitchFamily="49" charset="0"/>
               </a:rPr>
-              <a:t>/ Constants</a:t>
-            </a:r>
-          </a:p>
-          <a:p>
-            <a:pPr marL="0" indent="0">
-              <a:buNone/>
-            </a:pPr>
+              <a:t>/system "</a:t>
+            </a:r>
+            <a:r>
+              <a:rPr lang="en-US" sz="1200" dirty="0" err="1">
+                <a:latin typeface="Courier New" panose="02070309020205020404" pitchFamily="49" charset="0"/>
+                <a:cs typeface="Courier New" panose="02070309020205020404" pitchFamily="49" charset="0"/>
+              </a:rPr>
+              <a:t>dir</a:t>
+            </a:r>
             <a:r>
               <a:rPr lang="en-US" sz="1200" dirty="0">
                 <a:latin typeface="Courier New" panose="02070309020205020404" pitchFamily="49" charset="0"/>
                 <a:cs typeface="Courier New" panose="02070309020205020404" pitchFamily="49" charset="0"/>
               </a:rPr>
-              <a:t>g:9.81;  / gravity m/s^2</a:t>
-            </a:r>
-          </a:p>
-          <a:p>
-            <a:pPr marL="0" indent="0">
-              <a:buNone/>
-            </a:pPr>
-            <a:endParaRPr lang="en-US" sz="1200" dirty="0">
-              <a:latin typeface="Courier New" panose="02070309020205020404" pitchFamily="49" charset="0"/>
-              <a:cs typeface="Courier New" panose="02070309020205020404" pitchFamily="49" charset="0"/>
-            </a:endParaRPr>
+              <a:t> *.csv"</a:t>
+            </a:r>
           </a:p>
           <a:p>
             <a:pPr marL="0" indent="0">
@@ -10481,71 +10364,114 @@
                 <a:latin typeface="Courier New" panose="02070309020205020404" pitchFamily="49" charset="0"/>
                 <a:cs typeface="Courier New" panose="02070309020205020404" pitchFamily="49" charset="0"/>
               </a:rPr>
-              <a:t>/ Time steps</a:t>
-            </a:r>
-          </a:p>
-          <a:p>
-            <a:pPr marL="0" indent="0">
-              <a:buNone/>
-            </a:pPr>
+              <a:t>tab1:1!("</a:t>
+            </a:r>
+            <a:r>
+              <a:rPr lang="en-US" sz="1200" dirty="0" err="1">
+                <a:latin typeface="Courier New" panose="02070309020205020404" pitchFamily="49" charset="0"/>
+                <a:cs typeface="Courier New" panose="02070309020205020404" pitchFamily="49" charset="0"/>
+              </a:rPr>
+              <a:t>DF";enlist</a:t>
+            </a:r>
             <a:r>
               <a:rPr lang="en-US" sz="1200" dirty="0">
                 <a:latin typeface="Courier New" panose="02070309020205020404" pitchFamily="49" charset="0"/>
                 <a:cs typeface="Courier New" panose="02070309020205020404" pitchFamily="49" charset="0"/>
               </a:rPr>
-              <a:t>dt:0.1;</a:t>
-            </a:r>
-          </a:p>
-          <a:p>
-            <a:pPr marL="0" indent="0">
-              <a:buNone/>
-            </a:pPr>
+              <a:t> csv) 0: `:</a:t>
+            </a:r>
+            <a:r>
+              <a:rPr lang="en-US" sz="1200" dirty="0" err="1">
+                <a:latin typeface="Courier New" panose="02070309020205020404" pitchFamily="49" charset="0"/>
+                <a:cs typeface="Courier New" panose="02070309020205020404" pitchFamily="49" charset="0"/>
+              </a:rPr>
+              <a:t>EURUSD.csv</a:t>
+            </a:r>
             <a:r>
               <a:rPr lang="en-US" sz="1200" dirty="0">
                 <a:latin typeface="Courier New" panose="02070309020205020404" pitchFamily="49" charset="0"/>
                 <a:cs typeface="Courier New" panose="02070309020205020404" pitchFamily="49" charset="0"/>
               </a:rPr>
-              <a:t>/ [b]</a:t>
+              <a:t>;</a:t>
+            </a:r>
+          </a:p>
+          <a:p>
+            <a:pPr marL="0" indent="0">
+              <a:buNone/>
+            </a:pPr>
+            <a:r>
+              <a:rPr lang="en-US" sz="1200" dirty="0">
+                <a:latin typeface="Courier New" panose="02070309020205020404" pitchFamily="49" charset="0"/>
+                <a:cs typeface="Courier New" panose="02070309020205020404" pitchFamily="49" charset="0"/>
+              </a:rPr>
+              <a:t>tab2:1!("</a:t>
             </a:r>
             <a:r>
               <a:rPr lang="en-US" sz="1200" dirty="0" err="1">
                 <a:latin typeface="Courier New" panose="02070309020205020404" pitchFamily="49" charset="0"/>
                 <a:cs typeface="Courier New" panose="02070309020205020404" pitchFamily="49" charset="0"/>
               </a:rPr>
-              <a:t>egin</a:t>
+              <a:t>DF";enlist</a:t>
             </a:r>
             <a:r>
               <a:rPr lang="en-US" sz="1200" dirty="0">
                 <a:latin typeface="Courier New" panose="02070309020205020404" pitchFamily="49" charset="0"/>
                 <a:cs typeface="Courier New" panose="02070309020205020404" pitchFamily="49" charset="0"/>
               </a:rPr>
-              <a:t>; [e]</a:t>
+              <a:t> csv) 0: `:</a:t>
             </a:r>
             <a:r>
               <a:rPr lang="en-US" sz="1200" dirty="0" err="1">
                 <a:latin typeface="Courier New" panose="02070309020205020404" pitchFamily="49" charset="0"/>
                 <a:cs typeface="Courier New" panose="02070309020205020404" pitchFamily="49" charset="0"/>
               </a:rPr>
-              <a:t>nd</a:t>
+              <a:t>USDJPY.csv</a:t>
             </a:r>
             <a:r>
               <a:rPr lang="en-US" sz="1200" dirty="0">
                 <a:latin typeface="Courier New" panose="02070309020205020404" pitchFamily="49" charset="0"/>
                 <a:cs typeface="Courier New" panose="02070309020205020404" pitchFamily="49" charset="0"/>
               </a:rPr>
-              <a:t>; [s]</a:t>
+              <a:t>;</a:t>
+            </a:r>
+          </a:p>
+          <a:p>
+            <a:pPr marL="0" indent="0">
+              <a:buNone/>
+            </a:pPr>
+            <a:r>
+              <a:rPr lang="en-US" sz="1200" dirty="0">
+                <a:latin typeface="Courier New" panose="02070309020205020404" pitchFamily="49" charset="0"/>
+                <a:cs typeface="Courier New" panose="02070309020205020404" pitchFamily="49" charset="0"/>
+              </a:rPr>
+              <a:t>fxrates:tab1 </a:t>
             </a:r>
             <a:r>
               <a:rPr lang="en-US" sz="1200" dirty="0" err="1">
                 <a:latin typeface="Courier New" panose="02070309020205020404" pitchFamily="49" charset="0"/>
                 <a:cs typeface="Courier New" panose="02070309020205020404" pitchFamily="49" charset="0"/>
               </a:rPr>
-              <a:t>tep</a:t>
-            </a:r>
-            <a:endParaRPr lang="en-US" sz="1200" dirty="0">
-              <a:latin typeface="Courier New" panose="02070309020205020404" pitchFamily="49" charset="0"/>
-              <a:cs typeface="Courier New" panose="02070309020205020404" pitchFamily="49" charset="0"/>
-            </a:endParaRPr>
+              <a:t>lj</a:t>
+            </a:r>
+            <a:r>
+              <a:rPr lang="en-US" sz="1200" dirty="0">
+                <a:latin typeface="Courier New" panose="02070309020205020404" pitchFamily="49" charset="0"/>
+                <a:cs typeface="Courier New" panose="02070309020205020404" pitchFamily="49" charset="0"/>
+              </a:rPr>
+              <a:t> tab2;</a:t>
+            </a:r>
+          </a:p>
+          <a:p>
+            <a:pPr marL="0" indent="0">
+              <a:buNone/>
+            </a:pPr>
+            <a:r>
+              <a:rPr lang="en-US" sz="1200" dirty="0">
+                <a:latin typeface="Courier New" panose="02070309020205020404" pitchFamily="49" charset="0"/>
+                <a:cs typeface="Courier New" panose="02070309020205020404" pitchFamily="49" charset="0"/>
+              </a:rPr>
+              <a:t>/ Calculate the spread</a:t>
+            </a:r>
           </a:p>
           <a:p>
             <a:pPr marL="0" indent="0">
@@ -10556,122 +10482,66 @@
                 <a:latin typeface="Courier New" panose="02070309020205020404" pitchFamily="49" charset="0"/>
                 <a:cs typeface="Courier New" panose="02070309020205020404" pitchFamily="49" charset="0"/>
               </a:rPr>
-              <a:t>arange</a:t>
+              <a:t>spread:value</a:t>
             </a:r>
             <a:r>
               <a:rPr lang="en-US" sz="1200" dirty="0">
                 <a:latin typeface="Courier New" panose="02070309020205020404" pitchFamily="49" charset="0"/>
                 <a:cs typeface="Courier New" panose="02070309020205020404" pitchFamily="49" charset="0"/>
               </a:rPr>
-              <a:t>:{[</a:t>
+              <a:t> (-/) each </a:t>
             </a:r>
             <a:r>
               <a:rPr lang="en-US" sz="1200" dirty="0" err="1">
                 <a:latin typeface="Courier New" panose="02070309020205020404" pitchFamily="49" charset="0"/>
                 <a:cs typeface="Courier New" panose="02070309020205020404" pitchFamily="49" charset="0"/>
               </a:rPr>
-              <a:t>b;e;s</a:t>
+              <a:t>fxrates</a:t>
             </a:r>
             <a:r>
               <a:rPr lang="en-US" sz="1200" dirty="0">
                 <a:latin typeface="Courier New" panose="02070309020205020404" pitchFamily="49" charset="0"/>
                 <a:cs typeface="Courier New" panose="02070309020205020404" pitchFamily="49" charset="0"/>
               </a:rPr>
-              <a:t>] </a:t>
+              <a:t>;</a:t>
+            </a:r>
+          </a:p>
+          <a:p>
+            <a:pPr marL="0" indent="0">
+              <a:buNone/>
+            </a:pPr>
+            <a:r>
+              <a:rPr lang="en-US" sz="1200" dirty="0">
+                <a:latin typeface="Courier New" panose="02070309020205020404" pitchFamily="49" charset="0"/>
+                <a:cs typeface="Courier New" panose="02070309020205020404" pitchFamily="49" charset="0"/>
+              </a:rPr>
+              <a:t>/ Need correlation for pairs trading to work well</a:t>
+            </a:r>
+          </a:p>
+          <a:p>
+            <a:pPr marL="0" indent="0">
+              <a:buNone/>
+            </a:pPr>
+            <a:r>
+              <a:rPr lang="en-US" sz="1200" dirty="0">
+                <a:latin typeface="Courier New" panose="02070309020205020404" pitchFamily="49" charset="0"/>
+                <a:cs typeface="Courier New" panose="02070309020205020404" pitchFamily="49" charset="0"/>
+              </a:rPr>
+              <a:t>value[tab1][last cols tab1] </a:t>
             </a:r>
             <a:r>
               <a:rPr lang="en-US" sz="1200" dirty="0" err="1">
                 <a:latin typeface="Courier New" panose="02070309020205020404" pitchFamily="49" charset="0"/>
                 <a:cs typeface="Courier New" panose="02070309020205020404" pitchFamily="49" charset="0"/>
               </a:rPr>
-              <a:t>b+s</a:t>
+              <a:t>cor</a:t>
             </a:r>
             <a:r>
               <a:rPr lang="en-US" sz="1200" dirty="0">
                 <a:latin typeface="Courier New" panose="02070309020205020404" pitchFamily="49" charset="0"/>
                 <a:cs typeface="Courier New" panose="02070309020205020404" pitchFamily="49" charset="0"/>
               </a:rPr>
-              <a:t>*</a:t>
-            </a:r>
-            <a:r>
-              <a:rPr lang="en-US" sz="1200" dirty="0" err="1">
-                <a:latin typeface="Courier New" panose="02070309020205020404" pitchFamily="49" charset="0"/>
-                <a:cs typeface="Courier New" panose="02070309020205020404" pitchFamily="49" charset="0"/>
-              </a:rPr>
-              <a:t>til</a:t>
-            </a:r>
-            <a:r>
-              <a:rPr lang="en-US" sz="1200" dirty="0">
-                <a:latin typeface="Courier New" panose="02070309020205020404" pitchFamily="49" charset="0"/>
-                <a:cs typeface="Courier New" panose="02070309020205020404" pitchFamily="49" charset="0"/>
-              </a:rPr>
-              <a:t> "j"$-[</a:t>
-            </a:r>
-            <a:r>
-              <a:rPr lang="en-US" sz="1200" dirty="0" err="1">
-                <a:latin typeface="Courier New" panose="02070309020205020404" pitchFamily="49" charset="0"/>
-                <a:cs typeface="Courier New" panose="02070309020205020404" pitchFamily="49" charset="0"/>
-              </a:rPr>
-              <a:t>e;b</a:t>
-            </a:r>
-            <a:r>
-              <a:rPr lang="en-US" sz="1200" dirty="0">
-                <a:latin typeface="Courier New" panose="02070309020205020404" pitchFamily="49" charset="0"/>
-                <a:cs typeface="Courier New" panose="02070309020205020404" pitchFamily="49" charset="0"/>
-              </a:rPr>
-              <a:t>]%s};</a:t>
-            </a:r>
-          </a:p>
-          <a:p>
-            <a:pPr marL="0" indent="0">
-              <a:buNone/>
-            </a:pPr>
-            <a:r>
-              <a:rPr lang="en-US" sz="1200" dirty="0" err="1">
-                <a:latin typeface="Courier New" panose="02070309020205020404" pitchFamily="49" charset="0"/>
-                <a:cs typeface="Courier New" panose="02070309020205020404" pitchFamily="49" charset="0"/>
-              </a:rPr>
-              <a:t>times:arange</a:t>
-            </a:r>
-            <a:r>
-              <a:rPr lang="en-US" sz="1200" dirty="0">
-                <a:latin typeface="Courier New" panose="02070309020205020404" pitchFamily="49" charset="0"/>
-                <a:cs typeface="Courier New" panose="02070309020205020404" pitchFamily="49" charset="0"/>
-              </a:rPr>
-              <a:t>[0;10;dt];</a:t>
-            </a:r>
-          </a:p>
-          <a:p>
-            <a:pPr marL="0" indent="0">
-              <a:buNone/>
-            </a:pPr>
-            <a:endParaRPr lang="en-US" sz="1200" dirty="0">
-              <a:latin typeface="Courier New" panose="02070309020205020404" pitchFamily="49" charset="0"/>
-              <a:cs typeface="Courier New" panose="02070309020205020404" pitchFamily="49" charset="0"/>
-            </a:endParaRPr>
-          </a:p>
-          <a:p>
-            <a:pPr marL="0" indent="0">
-              <a:buNone/>
-            </a:pPr>
-            <a:r>
-              <a:rPr lang="en-US" sz="1200" dirty="0">
-                <a:latin typeface="Courier New" panose="02070309020205020404" pitchFamily="49" charset="0"/>
-                <a:cs typeface="Courier New" panose="02070309020205020404" pitchFamily="49" charset="0"/>
-              </a:rPr>
-              <a:t>/ Initial conditions</a:t>
-            </a:r>
-          </a:p>
-          <a:p>
-            <a:pPr marL="0" indent="0">
-              <a:buNone/>
-            </a:pPr>
-            <a:r>
-              <a:rPr lang="en-US" sz="1200" dirty="0">
-                <a:latin typeface="Courier New" panose="02070309020205020404" pitchFamily="49" charset="0"/>
-                <a:cs typeface="Courier New" panose="02070309020205020404" pitchFamily="49" charset="0"/>
-              </a:rPr>
-              <a:t>x0:0; y0:0; vx0:50; vy0:50; / pos in m; vel in m/s</a:t>
+              <a:t> value[tab2][last cols tab2];</a:t>
             </a:r>
           </a:p>
           <a:p>
@@ -10725,7 +10595,19 @@
                 <a:latin typeface="Courier New" panose="02070309020205020404" pitchFamily="49" charset="0"/>
                 <a:cs typeface="Courier New" panose="02070309020205020404" pitchFamily="49" charset="0"/>
               </a:rPr>
-              <a:t>/ Actual trajectory</a:t>
+              <a:t>/ Kalman Filter</a:t>
+            </a:r>
+          </a:p>
+          <a:p>
+            <a:pPr marL="0" indent="0">
+              <a:buNone/>
+            </a:pPr>
+            <a:r>
+              <a:rPr lang="en-US" sz="1200" dirty="0">
+                <a:latin typeface="Courier New" panose="02070309020205020404" pitchFamily="49" charset="0"/>
+                <a:cs typeface="Courier New" panose="02070309020205020404" pitchFamily="49" charset="0"/>
+              </a:rPr>
+              <a:t>/ Initialization</a:t>
             </a:r>
           </a:p>
           <a:p>
@@ -10737,26 +10619,28 @@
                 <a:latin typeface="Courier New" panose="02070309020205020404" pitchFamily="49" charset="0"/>
                 <a:cs typeface="Courier New" panose="02070309020205020404" pitchFamily="49" charset="0"/>
               </a:rPr>
-              <a:t>atraj</a:t>
+              <a:t>x_est</a:t>
             </a:r>
             <a:r>
               <a:rPr lang="en-US" sz="1200" dirty="0">
                 <a:latin typeface="Courier New" panose="02070309020205020404" pitchFamily="49" charset="0"/>
                 <a:cs typeface="Courier New" panose="02070309020205020404" pitchFamily="49" charset="0"/>
               </a:rPr>
-              <a:t>:{[g;x0;y0;vx0;vy0;t]</a:t>
-            </a:r>
-          </a:p>
-          <a:p>
-            <a:pPr marL="0" indent="0">
-              <a:buNone/>
-            </a:pPr>
+              <a:t>:(2;count </a:t>
+            </a:r>
+            <a:r>
+              <a:rPr lang="en-US" sz="1200" dirty="0" err="1">
+                <a:latin typeface="Courier New" panose="02070309020205020404" pitchFamily="49" charset="0"/>
+                <a:cs typeface="Courier New" panose="02070309020205020404" pitchFamily="49" charset="0"/>
+              </a:rPr>
+              <a:t>fxrates</a:t>
+            </a:r>
             <a:r>
               <a:rPr lang="en-US" sz="1200" dirty="0">
                 <a:latin typeface="Courier New" panose="02070309020205020404" pitchFamily="49" charset="0"/>
                 <a:cs typeface="Courier New" panose="02070309020205020404" pitchFamily="49" charset="0"/>
               </a:rPr>
-              <a:t>  x:x0+vx0*t;               / x pos</a:t>
+              <a:t>)#0f;</a:t>
             </a:r>
           </a:p>
           <a:p>
@@ -10768,7 +10652,7 @@
                 <a:latin typeface="Courier New" panose="02070309020205020404" pitchFamily="49" charset="0"/>
                 <a:cs typeface="Courier New" panose="02070309020205020404" pitchFamily="49" charset="0"/>
               </a:rPr>
-              <a:t>  y:-[y0+vy0*t;0.5*g*t*t];  / y pos y0+vy0*t-0.5*g*t^2</a:t>
+              <a:t>P:"f"$1000*id 2;     / State Covariance matrix</a:t>
             </a:r>
           </a:p>
           <a:p>
@@ -10780,7 +10664,7 @@
                 <a:latin typeface="Courier New" panose="02070309020205020404" pitchFamily="49" charset="0"/>
                 <a:cs typeface="Courier New" panose="02070309020205020404" pitchFamily="49" charset="0"/>
               </a:rPr>
-              <a:t>  vx:vx0;                   / x vel (no air resistance)</a:t>
+              <a:t>R:"f"$1 1#5;         / Measurement Noise Covariance</a:t>
             </a:r>
           </a:p>
           <a:p>
@@ -10792,7 +10676,7 @@
                 <a:latin typeface="Courier New" panose="02070309020205020404" pitchFamily="49" charset="0"/>
                 <a:cs typeface="Courier New" panose="02070309020205020404" pitchFamily="49" charset="0"/>
               </a:rPr>
-              <a:t>  vy:vy0-g*t;               / y vel (gravity but no air res)</a:t>
+              <a:t>Q:"f"$2 2#.001;      / Process Noise Covariance</a:t>
             </a:r>
           </a:p>
           <a:p>
@@ -10804,80 +10688,45 @@
                 <a:latin typeface="Courier New" panose="02070309020205020404" pitchFamily="49" charset="0"/>
                 <a:cs typeface="Courier New" panose="02070309020205020404" pitchFamily="49" charset="0"/>
               </a:rPr>
-              <a:t>  (</a:t>
+              <a:t>F:"f"$2 2#1 1 0 1;   / State Transition Matrix</a:t>
+            </a:r>
+          </a:p>
+          <a:p>
+            <a:pPr marL="0" indent="0">
+              <a:buNone/>
+            </a:pPr>
+            <a:r>
+              <a:rPr lang="en-US" sz="1200" dirty="0">
+                <a:latin typeface="Courier New" panose="02070309020205020404" pitchFamily="49" charset="0"/>
+                <a:cs typeface="Courier New" panose="02070309020205020404" pitchFamily="49" charset="0"/>
+              </a:rPr>
+              <a:t>H:"f"$1 2#1 0;       / Measurement Matrix (spread)</a:t>
+            </a:r>
+          </a:p>
+          <a:p>
+            <a:pPr marL="0" indent="0">
+              <a:buNone/>
+            </a:pPr>
+            <a:r>
+              <a:rPr lang="en-US" sz="1200" dirty="0">
+                <a:latin typeface="Courier New" panose="02070309020205020404" pitchFamily="49" charset="0"/>
+                <a:cs typeface="Courier New" panose="02070309020205020404" pitchFamily="49" charset="0"/>
+              </a:rPr>
+              <a:t>G:(2;1;count </a:t>
             </a:r>
             <a:r>
               <a:rPr lang="en-US" sz="1200" dirty="0" err="1">
                 <a:latin typeface="Courier New" panose="02070309020205020404" pitchFamily="49" charset="0"/>
                 <a:cs typeface="Courier New" panose="02070309020205020404" pitchFamily="49" charset="0"/>
               </a:rPr>
-              <a:t>x;y;vx;vy</a:t>
+              <a:t>fxrates</a:t>
             </a:r>
             <a:r>
               <a:rPr lang="en-US" sz="1200" dirty="0">
                 <a:latin typeface="Courier New" panose="02070309020205020404" pitchFamily="49" charset="0"/>
                 <a:cs typeface="Courier New" panose="02070309020205020404" pitchFamily="49" charset="0"/>
               </a:rPr>
-              <a:t>)};</a:t>
-            </a:r>
-          </a:p>
-          <a:p>
-            <a:pPr marL="0" indent="0">
-              <a:buNone/>
-            </a:pPr>
-            <a:r>
-              <a:rPr lang="en-US" sz="1200" dirty="0" err="1">
-                <a:latin typeface="Courier New" panose="02070309020205020404" pitchFamily="49" charset="0"/>
-                <a:cs typeface="Courier New" panose="02070309020205020404" pitchFamily="49" charset="0"/>
-              </a:rPr>
-              <a:t>act_traj:atraj</a:t>
-            </a:r>
-            <a:r>
-              <a:rPr lang="en-US" sz="1200" dirty="0">
-                <a:latin typeface="Courier New" panose="02070309020205020404" pitchFamily="49" charset="0"/>
-                <a:cs typeface="Courier New" panose="02070309020205020404" pitchFamily="49" charset="0"/>
-              </a:rPr>
-              <a:t>[g;x0;y0;vx0;vy0;];</a:t>
-            </a:r>
-          </a:p>
-          <a:p>
-            <a:pPr marL="0" indent="0">
-              <a:buNone/>
-            </a:pPr>
-            <a:endParaRPr lang="en-US" sz="1200" dirty="0">
-              <a:latin typeface="Courier New" panose="02070309020205020404" pitchFamily="49" charset="0"/>
-              <a:cs typeface="Courier New" panose="02070309020205020404" pitchFamily="49" charset="0"/>
-            </a:endParaRPr>
-          </a:p>
-          <a:p>
-            <a:pPr marL="0" indent="0">
-              <a:buNone/>
-            </a:pPr>
-            <a:r>
-              <a:rPr lang="en-US" sz="1200" dirty="0">
-                <a:latin typeface="Courier New" panose="02070309020205020404" pitchFamily="49" charset="0"/>
-                <a:cs typeface="Courier New" panose="02070309020205020404" pitchFamily="49" charset="0"/>
-              </a:rPr>
-              <a:t>/ Simulate actual trajectory</a:t>
-            </a:r>
-          </a:p>
-          <a:p>
-            <a:pPr marL="0" indent="0">
-              <a:buNone/>
-            </a:pPr>
-            <a:r>
-              <a:rPr lang="en-US" sz="1200" dirty="0" err="1">
-                <a:latin typeface="Courier New" panose="02070309020205020404" pitchFamily="49" charset="0"/>
-                <a:cs typeface="Courier New" panose="02070309020205020404" pitchFamily="49" charset="0"/>
-              </a:rPr>
-              <a:t>true_traj:act_traj</a:t>
-            </a:r>
-            <a:r>
-              <a:rPr lang="en-US" sz="1200" dirty="0">
-                <a:latin typeface="Courier New" panose="02070309020205020404" pitchFamily="49" charset="0"/>
-                <a:cs typeface="Courier New" panose="02070309020205020404" pitchFamily="49" charset="0"/>
-              </a:rPr>
-              <a:t>[times];  / use the projection</a:t>
+              <a:t>)#0f;</a:t>
             </a:r>
           </a:p>
           <a:p>
@@ -10980,7 +10829,7 @@
                 <a:latin typeface="Courier New" panose="02070309020205020404" pitchFamily="49" charset="0"/>
                 <a:cs typeface="Courier New" panose="02070309020205020404" pitchFamily="49" charset="0"/>
               </a:rPr>
-              <a:t>/ Simulate measurements</a:t>
+              <a:t>/ KF Prediction Step</a:t>
             </a:r>
           </a:p>
           <a:p>
@@ -10992,29 +10841,22 @@
                 <a:latin typeface="Courier New" panose="02070309020205020404" pitchFamily="49" charset="0"/>
                 <a:cs typeface="Courier New" panose="02070309020205020404" pitchFamily="49" charset="0"/>
               </a:rPr>
-              <a:t>pos_meas_noise:1.0;  / standard dev of position measurements</a:t>
-            </a:r>
-          </a:p>
-          <a:p>
-            <a:pPr marL="0" indent="0">
-              <a:buNone/>
-            </a:pPr>
+              <a:t>// Predict next state using </a:t>
+            </a:r>
+            <a:r>
+              <a:rPr lang="en-US" sz="1200" dirty="0" err="1">
+                <a:latin typeface="Courier New" panose="02070309020205020404" pitchFamily="49" charset="0"/>
+                <a:cs typeface="Courier New" panose="02070309020205020404" pitchFamily="49" charset="0"/>
+              </a:rPr>
+              <a:t>prev</a:t>
+            </a:r>
             <a:r>
               <a:rPr lang="en-US" sz="1200" dirty="0">
                 <a:latin typeface="Courier New" panose="02070309020205020404" pitchFamily="49" charset="0"/>
                 <a:cs typeface="Courier New" panose="02070309020205020404" pitchFamily="49" charset="0"/>
               </a:rPr>
-              <a:t>vel_meas_noise:0.5;  / standard dev of velocity measurements</a:t>
-            </a:r>
-          </a:p>
-          <a:p>
-            <a:pPr marL="0" indent="0">
-              <a:buNone/>
-            </a:pPr>
-            <a:endParaRPr lang="en-US" sz="1200" dirty="0">
-              <a:latin typeface="Courier New" panose="02070309020205020404" pitchFamily="49" charset="0"/>
-              <a:cs typeface="Courier New" panose="02070309020205020404" pitchFamily="49" charset="0"/>
-            </a:endParaRPr>
+              <a:t> state and the F, state transition matrix</a:t>
+            </a:r>
           </a:p>
           <a:p>
             <a:pPr marL="0" indent="0">
@@ -11025,33 +10867,40 @@
                 <a:latin typeface="Courier New" panose="02070309020205020404" pitchFamily="49" charset="0"/>
                 <a:cs typeface="Courier New" panose="02070309020205020404" pitchFamily="49" charset="0"/>
               </a:rPr>
-              <a:t>/ Use Nick </a:t>
-            </a:r>
+              <a:t>// Predict state uncertainty (update P, covariance matrix using Q, process noise</a:t>
+            </a:r>
+          </a:p>
+          <a:p>
+            <a:pPr marL="0" indent="0">
+              <a:buNone/>
+            </a:pPr>
             <a:r>
               <a:rPr lang="en-US" sz="1200" dirty="0" err="1">
                 <a:latin typeface="Courier New" panose="02070309020205020404" pitchFamily="49" charset="0"/>
                 <a:cs typeface="Courier New" panose="02070309020205020404" pitchFamily="49" charset="0"/>
               </a:rPr>
-              <a:t>Psaris</a:t>
+              <a:t>predictState</a:t>
             </a:r>
             <a:r>
               <a:rPr lang="en-US" sz="1200" dirty="0">
                 <a:latin typeface="Courier New" panose="02070309020205020404" pitchFamily="49" charset="0"/>
                 <a:cs typeface="Courier New" panose="02070309020205020404" pitchFamily="49" charset="0"/>
               </a:rPr>
-              <a:t> Box Muller algorithm for </a:t>
-            </a:r>
-          </a:p>
-          <a:p>
-            <a:pPr marL="0" indent="0">
-              <a:buNone/>
-            </a:pPr>
+              <a:t>:{[</a:t>
+            </a:r>
+            <a:r>
+              <a:rPr lang="en-US" sz="1200" dirty="0" err="1">
+                <a:latin typeface="Courier New" panose="02070309020205020404" pitchFamily="49" charset="0"/>
+                <a:cs typeface="Courier New" panose="02070309020205020404" pitchFamily="49" charset="0"/>
+              </a:rPr>
+              <a:t>F;ps;P;Q</a:t>
+            </a:r>
             <a:r>
               <a:rPr lang="en-US" sz="1200" dirty="0">
                 <a:latin typeface="Courier New" panose="02070309020205020404" pitchFamily="49" charset="0"/>
                 <a:cs typeface="Courier New" panose="02070309020205020404" pitchFamily="49" charset="0"/>
               </a:rPr>
-              <a:t>/ generating pairs of independent, standard normally distributed</a:t>
+              <a:t>]</a:t>
             </a:r>
           </a:p>
           <a:p>
@@ -11063,26 +10912,21 @@
                 <a:latin typeface="Courier New" panose="02070309020205020404" pitchFamily="49" charset="0"/>
                 <a:cs typeface="Courier New" panose="02070309020205020404" pitchFamily="49" charset="0"/>
               </a:rPr>
-              <a:t>/ random variables from uniformly distributed random variables</a:t>
-            </a:r>
-          </a:p>
-          <a:p>
-            <a:pPr marL="0" indent="0">
-              <a:buNone/>
-            </a:pPr>
+              <a:t>  </a:t>
+            </a:r>
             <a:r>
               <a:rPr lang="en-US" sz="1200" dirty="0" err="1">
                 <a:latin typeface="Courier New" panose="02070309020205020404" pitchFamily="49" charset="0"/>
                 <a:cs typeface="Courier New" panose="02070309020205020404" pitchFamily="49" charset="0"/>
               </a:rPr>
-              <a:t>meas_traj:true_traj</a:t>
+              <a:t>ns:F$ps</a:t>
             </a:r>
             <a:r>
               <a:rPr lang="en-US" sz="1200" dirty="0">
                 <a:latin typeface="Courier New" panose="02070309020205020404" pitchFamily="49" charset="0"/>
                 <a:cs typeface="Courier New" panose="02070309020205020404" pitchFamily="49" charset="0"/>
               </a:rPr>
-              <a:t>+</a:t>
+              <a:t>;                / predicted next state</a:t>
             </a:r>
           </a:p>
           <a:p>
@@ -11094,33 +10938,73 @@
                 <a:latin typeface="Courier New" panose="02070309020205020404" pitchFamily="49" charset="0"/>
                 <a:cs typeface="Courier New" panose="02070309020205020404" pitchFamily="49" charset="0"/>
               </a:rPr>
-              <a:t>  *[(</a:t>
+              <a:t>  </a:t>
             </a:r>
             <a:r>
               <a:rPr lang="en-US" sz="1200" dirty="0" err="1">
                 <a:latin typeface="Courier New" panose="02070309020205020404" pitchFamily="49" charset="0"/>
                 <a:cs typeface="Courier New" panose="02070309020205020404" pitchFamily="49" charset="0"/>
               </a:rPr>
-              <a:t>pos_meas_noise;vel_meas_noise</a:t>
+              <a:t>nP</a:t>
             </a:r>
             <a:r>
               <a:rPr lang="en-US" sz="1200" dirty="0">
                 <a:latin typeface="Courier New" panose="02070309020205020404" pitchFamily="49" charset="0"/>
                 <a:cs typeface="Courier New" panose="02070309020205020404" pitchFamily="49" charset="0"/>
               </a:rPr>
-              <a:t>)0 0 1 1;]  / scale std dev</a:t>
-            </a:r>
-          </a:p>
-          <a:p>
-            <a:pPr marL="0" indent="0">
-              <a:buNone/>
-            </a:pPr>
+              <a:t>:$[F;$[</a:t>
+            </a:r>
+            <a:r>
+              <a:rPr lang="en-US" sz="1200" dirty="0" err="1">
+                <a:latin typeface="Courier New" panose="02070309020205020404" pitchFamily="49" charset="0"/>
+                <a:cs typeface="Courier New" panose="02070309020205020404" pitchFamily="49" charset="0"/>
+              </a:rPr>
+              <a:t>P;flip</a:t>
+            </a:r>
             <a:r>
               <a:rPr lang="en-US" sz="1200" dirty="0">
                 <a:latin typeface="Courier New" panose="02070309020205020404" pitchFamily="49" charset="0"/>
                 <a:cs typeface="Courier New" panose="02070309020205020404" pitchFamily="49" charset="0"/>
               </a:rPr>
-              <a:t>  (4 0N)#.stat.bm*[4;count times]?1f;         / measurement errors</a:t>
+              <a:t> F]]+Q;  / predicted next P</a:t>
+            </a:r>
+          </a:p>
+          <a:p>
+            <a:pPr marL="0" indent="0">
+              <a:buNone/>
+            </a:pPr>
+            <a:r>
+              <a:rPr lang="en-US" sz="1200" dirty="0">
+                <a:latin typeface="Courier New" panose="02070309020205020404" pitchFamily="49" charset="0"/>
+                <a:cs typeface="Courier New" panose="02070309020205020404" pitchFamily="49" charset="0"/>
+              </a:rPr>
+              <a:t>  (</a:t>
+            </a:r>
+            <a:r>
+              <a:rPr lang="en-US" sz="1200" dirty="0" err="1">
+                <a:latin typeface="Courier New" panose="02070309020205020404" pitchFamily="49" charset="0"/>
+                <a:cs typeface="Courier New" panose="02070309020205020404" pitchFamily="49" charset="0"/>
+              </a:rPr>
+              <a:t>ns;nP</a:t>
+            </a:r>
+            <a:r>
+              <a:rPr lang="en-US" sz="1200" dirty="0">
+                <a:latin typeface="Courier New" panose="02070309020205020404" pitchFamily="49" charset="0"/>
+                <a:cs typeface="Courier New" panose="02070309020205020404" pitchFamily="49" charset="0"/>
+              </a:rPr>
+              <a:t>)</a:t>
+            </a:r>
+          </a:p>
+          <a:p>
+            <a:pPr marL="0" indent="0">
+              <a:buNone/>
+            </a:pPr>
+            <a:r>
+              <a:rPr lang="en-US" sz="1200" dirty="0">
+                <a:latin typeface="Courier New" panose="02070309020205020404" pitchFamily="49" charset="0"/>
+                <a:cs typeface="Courier New" panose="02070309020205020404" pitchFamily="49" charset="0"/>
+              </a:rPr>
+              <a:t>  };</a:t>
             </a:r>
           </a:p>
           <a:p>
@@ -11165,84 +11049,45 @@
                 <a:latin typeface="Courier New" panose="02070309020205020404" pitchFamily="49" charset="0"/>
                 <a:cs typeface="Courier New" panose="02070309020205020404" pitchFamily="49" charset="0"/>
               </a:rPr>
-              <a:t>id:{(2#x)#1,x#0};  / Identity matrix from </a:t>
-            </a:r>
+              <a:t>// Kalman Gain (K) weight of measurement vs prediction</a:t>
+            </a:r>
+          </a:p>
+          <a:p>
+            <a:pPr marL="0" indent="0">
+              <a:buNone/>
+            </a:pPr>
+            <a:r>
+              <a:rPr lang="en-US" sz="1200" dirty="0">
+                <a:latin typeface="Courier New" panose="02070309020205020404" pitchFamily="49" charset="0"/>
+                <a:cs typeface="Courier New" panose="02070309020205020404" pitchFamily="49" charset="0"/>
+              </a:rPr>
+              <a:t>// done in the update step</a:t>
+            </a:r>
+          </a:p>
+          <a:p>
+            <a:pPr marL="0" indent="0">
+              <a:buNone/>
+            </a:pPr>
             <a:r>
               <a:rPr lang="en-US" sz="1200" dirty="0" err="1">
                 <a:latin typeface="Courier New" panose="02070309020205020404" pitchFamily="49" charset="0"/>
                 <a:cs typeface="Courier New" panose="02070309020205020404" pitchFamily="49" charset="0"/>
               </a:rPr>
-              <a:t>qphrasebook</a:t>
-            </a:r>
-            <a:endParaRPr lang="en-US" sz="1200" dirty="0">
-              <a:latin typeface="Courier New" panose="02070309020205020404" pitchFamily="49" charset="0"/>
-              <a:cs typeface="Courier New" panose="02070309020205020404" pitchFamily="49" charset="0"/>
-            </a:endParaRPr>
-          </a:p>
-          <a:p>
-            <a:pPr marL="0" indent="0">
-              <a:buNone/>
-            </a:pPr>
-            <a:endParaRPr lang="en-US" sz="1200" dirty="0">
-              <a:latin typeface="Courier New" panose="02070309020205020404" pitchFamily="49" charset="0"/>
-              <a:cs typeface="Courier New" panose="02070309020205020404" pitchFamily="49" charset="0"/>
-            </a:endParaRPr>
-          </a:p>
-          <a:p>
-            <a:pPr marL="0" indent="0">
-              <a:buNone/>
-            </a:pPr>
+              <a:t>computeKalmanGain</a:t>
+            </a:r>
             <a:r>
               <a:rPr lang="en-US" sz="1200" dirty="0">
                 <a:latin typeface="Courier New" panose="02070309020205020404" pitchFamily="49" charset="0"/>
                 <a:cs typeface="Courier New" panose="02070309020205020404" pitchFamily="49" charset="0"/>
               </a:rPr>
-              <a:t>/ Kalman Filter</a:t>
-            </a:r>
-          </a:p>
-          <a:p>
-            <a:pPr marL="0" indent="0">
-              <a:buNone/>
-            </a:pPr>
-            <a:r>
-              <a:rPr lang="en-US" sz="1200" dirty="0">
-                <a:latin typeface="Courier New" panose="02070309020205020404" pitchFamily="49" charset="0"/>
-                <a:cs typeface="Courier New" panose="02070309020205020404" pitchFamily="49" charset="0"/>
-              </a:rPr>
-              <a:t>/ Initialization</a:t>
-            </a:r>
-          </a:p>
-          <a:p>
-            <a:pPr marL="0" indent="0">
-              <a:buNone/>
-            </a:pPr>
-            <a:r>
-              <a:rPr lang="en-US" sz="1200" dirty="0">
-                <a:latin typeface="Courier New" panose="02070309020205020404" pitchFamily="49" charset="0"/>
-                <a:cs typeface="Courier New" panose="02070309020205020404" pitchFamily="49" charset="0"/>
-              </a:rPr>
-              <a:t>/ State vector [x, y, </a:t>
+              <a:t>:{[</a:t>
             </a:r>
             <a:r>
               <a:rPr lang="en-US" sz="1200" dirty="0" err="1">
                 <a:latin typeface="Courier New" panose="02070309020205020404" pitchFamily="49" charset="0"/>
                 <a:cs typeface="Courier New" panose="02070309020205020404" pitchFamily="49" charset="0"/>
               </a:rPr>
-              <a:t>vx</a:t>
-            </a:r>
-            <a:r>
-              <a:rPr lang="en-US" sz="1200" dirty="0">
-                <a:latin typeface="Courier New" panose="02070309020205020404" pitchFamily="49" charset="0"/>
-                <a:cs typeface="Courier New" panose="02070309020205020404" pitchFamily="49" charset="0"/>
-              </a:rPr>
-              <a:t>, </a:t>
-            </a:r>
-            <a:r>
-              <a:rPr lang="en-US" sz="1200" dirty="0" err="1">
-                <a:latin typeface="Courier New" panose="02070309020205020404" pitchFamily="49" charset="0"/>
-                <a:cs typeface="Courier New" panose="02070309020205020404" pitchFamily="49" charset="0"/>
-              </a:rPr>
-              <a:t>vy</a:t>
+              <a:t>H;pP;R</a:t>
             </a:r>
             <a:r>
               <a:rPr lang="en-US" sz="1200" dirty="0">
@@ -11257,18 +11102,25 @@
               <a:buNone/>
             </a:pPr>
             <a:r>
+              <a:rPr lang="en-US" sz="1200" dirty="0">
+                <a:latin typeface="Courier New" panose="02070309020205020404" pitchFamily="49" charset="0"/>
+                <a:cs typeface="Courier New" panose="02070309020205020404" pitchFamily="49" charset="0"/>
+              </a:rPr>
+              <a:t>  S:$[H;$[</a:t>
+            </a:r>
+            <a:r>
               <a:rPr lang="en-US" sz="1200" dirty="0" err="1">
                 <a:latin typeface="Courier New" panose="02070309020205020404" pitchFamily="49" charset="0"/>
                 <a:cs typeface="Courier New" panose="02070309020205020404" pitchFamily="49" charset="0"/>
               </a:rPr>
-              <a:t>x_est</a:t>
+              <a:t>pP;flip</a:t>
             </a:r>
             <a:r>
               <a:rPr lang="en-US" sz="1200" dirty="0">
                 <a:latin typeface="Courier New" panose="02070309020205020404" pitchFamily="49" charset="0"/>
                 <a:cs typeface="Courier New" panose="02070309020205020404" pitchFamily="49" charset="0"/>
               </a:rPr>
-              <a:t>:(4;count times)#0f;</a:t>
+              <a:t> H]]+R;   / intermediate matrix for inversion</a:t>
             </a:r>
           </a:p>
           <a:p>
@@ -11280,119 +11132,47 @@
                 <a:latin typeface="Courier New" panose="02070309020205020404" pitchFamily="49" charset="0"/>
                 <a:cs typeface="Courier New" panose="02070309020205020404" pitchFamily="49" charset="0"/>
               </a:rPr>
-              <a:t>P:"f"$id 4;       / State Covariance matrix</a:t>
-            </a:r>
-          </a:p>
-          <a:p>
-            <a:pPr marL="0" indent="0">
-              <a:buNone/>
-            </a:pPr>
+              <a:t>  K:$[</a:t>
+            </a:r>
+            <a:r>
+              <a:rPr lang="en-US" sz="1200" dirty="0" err="1">
+                <a:latin typeface="Courier New" panose="02070309020205020404" pitchFamily="49" charset="0"/>
+                <a:cs typeface="Courier New" panose="02070309020205020404" pitchFamily="49" charset="0"/>
+              </a:rPr>
+              <a:t>pP</a:t>
+            </a:r>
             <a:r>
               <a:rPr lang="en-US" sz="1200" dirty="0">
                 <a:latin typeface="Courier New" panose="02070309020205020404" pitchFamily="49" charset="0"/>
                 <a:cs typeface="Courier New" panose="02070309020205020404" pitchFamily="49" charset="0"/>
               </a:rPr>
-              <a:t>R:*[(pos_meas_noise;vel_meas_noise)0 0 1 1;]</a:t>
-            </a:r>
-          </a:p>
-          <a:p>
-            <a:pPr marL="0" indent="0">
-              <a:buNone/>
-            </a:pPr>
+              <a:t>;$[flip </a:t>
+            </a:r>
+            <a:r>
+              <a:rPr lang="en-US" sz="1200" dirty="0" err="1">
+                <a:latin typeface="Courier New" panose="02070309020205020404" pitchFamily="49" charset="0"/>
+                <a:cs typeface="Courier New" panose="02070309020205020404" pitchFamily="49" charset="0"/>
+              </a:rPr>
+              <a:t>H;inv</a:t>
+            </a:r>
             <a:r>
               <a:rPr lang="en-US" sz="1200" dirty="0">
                 <a:latin typeface="Courier New" panose="02070309020205020404" pitchFamily="49" charset="0"/>
                 <a:cs typeface="Courier New" panose="02070309020205020404" pitchFamily="49" charset="0"/>
               </a:rPr>
-              <a:t>  "</a:t>
-            </a:r>
-            <a:r>
-              <a:rPr lang="en-US" sz="1200" dirty="0" err="1">
-                <a:latin typeface="Courier New" panose="02070309020205020404" pitchFamily="49" charset="0"/>
-                <a:cs typeface="Courier New" panose="02070309020205020404" pitchFamily="49" charset="0"/>
-              </a:rPr>
-              <a:t>f"$id</a:t>
-            </a:r>
+              <a:t> S]]  / inv uses LU decomposition</a:t>
+            </a:r>
+          </a:p>
+          <a:p>
+            <a:pPr marL="0" indent="0">
+              <a:buNone/>
+            </a:pPr>
             <a:r>
               <a:rPr lang="en-US" sz="1200" dirty="0">
                 <a:latin typeface="Courier New" panose="02070309020205020404" pitchFamily="49" charset="0"/>
                 <a:cs typeface="Courier New" panose="02070309020205020404" pitchFamily="49" charset="0"/>
               </a:rPr>
-              <a:t> 4;       / Measurement Noise Covariance</a:t>
-            </a:r>
-          </a:p>
-          <a:p>
-            <a:pPr marL="0" indent="0">
-              <a:buNone/>
-            </a:pPr>
-            <a:r>
-              <a:rPr lang="en-US" sz="1200" dirty="0">
-                <a:latin typeface="Courier New" panose="02070309020205020404" pitchFamily="49" charset="0"/>
-                <a:cs typeface="Courier New" panose="02070309020205020404" pitchFamily="49" charset="0"/>
-              </a:rPr>
-              <a:t>Q:0.005*"</a:t>
-            </a:r>
-            <a:r>
-              <a:rPr lang="en-US" sz="1200" dirty="0" err="1">
-                <a:latin typeface="Courier New" panose="02070309020205020404" pitchFamily="49" charset="0"/>
-                <a:cs typeface="Courier New" panose="02070309020205020404" pitchFamily="49" charset="0"/>
-              </a:rPr>
-              <a:t>f"$id</a:t>
-            </a:r>
-            <a:r>
-              <a:rPr lang="en-US" sz="1200" dirty="0">
-                <a:latin typeface="Courier New" panose="02070309020205020404" pitchFamily="49" charset="0"/>
-                <a:cs typeface="Courier New" panose="02070309020205020404" pitchFamily="49" charset="0"/>
-              </a:rPr>
-              <a:t> 4; / Process Noise Covariance</a:t>
-            </a:r>
-          </a:p>
-          <a:p>
-            <a:pPr marL="0" indent="0">
-              <a:buNone/>
-            </a:pPr>
-            <a:r>
-              <a:rPr lang="en-US" sz="1200" dirty="0">
-                <a:latin typeface="Courier New" panose="02070309020205020404" pitchFamily="49" charset="0"/>
-                <a:cs typeface="Courier New" panose="02070309020205020404" pitchFamily="49" charset="0"/>
-              </a:rPr>
-              <a:t>F:"f"$id 4;       / State Transition Matrix</a:t>
-            </a:r>
-          </a:p>
-          <a:p>
-            <a:pPr marL="0" indent="0">
-              <a:buNone/>
-            </a:pPr>
-            <a:r>
-              <a:rPr lang="en-US" sz="1200" dirty="0">
-                <a:latin typeface="Courier New" panose="02070309020205020404" pitchFamily="49" charset="0"/>
-                <a:cs typeface="Courier New" panose="02070309020205020404" pitchFamily="49" charset="0"/>
-              </a:rPr>
-              <a:t>F:(@[F 0;2;+;dt];@[F 1;3;+;dt];F 2;F 3);</a:t>
-            </a:r>
-          </a:p>
-          <a:p>
-            <a:pPr marL="0" indent="0">
-              <a:buNone/>
-            </a:pPr>
-            <a:r>
-              <a:rPr lang="en-US" sz="1200" dirty="0">
-                <a:latin typeface="Courier New" panose="02070309020205020404" pitchFamily="49" charset="0"/>
-                <a:cs typeface="Courier New" panose="02070309020205020404" pitchFamily="49" charset="0"/>
-              </a:rPr>
-              <a:t>H:"f"$id 4;       / Measurement Matrix (pos and vel)</a:t>
-            </a:r>
-          </a:p>
-          <a:p>
-            <a:pPr marL="0" indent="0">
-              <a:buNone/>
-            </a:pPr>
-            <a:r>
-              <a:rPr lang="en-US" sz="1200" dirty="0">
-                <a:latin typeface="Courier New" panose="02070309020205020404" pitchFamily="49" charset="0"/>
-                <a:cs typeface="Courier New" panose="02070309020205020404" pitchFamily="49" charset="0"/>
-              </a:rPr>
-              <a:t>G:(4;4;count times)#0f;</a:t>
+              <a:t>  };</a:t>
             </a:r>
           </a:p>
         </p:txBody>
@@ -11497,7 +11277,7 @@
                 <a:latin typeface="Courier New" panose="02070309020205020404" pitchFamily="49" charset="0"/>
                 <a:cs typeface="Courier New" panose="02070309020205020404" pitchFamily="49" charset="0"/>
               </a:rPr>
-              <a:t>/ KF Prediction Step</a:t>
+              <a:t>/ KF Update Step</a:t>
             </a:r>
           </a:p>
           <a:p>
@@ -11509,45 +11289,43 @@
                 <a:latin typeface="Courier New" panose="02070309020205020404" pitchFamily="49" charset="0"/>
                 <a:cs typeface="Courier New" panose="02070309020205020404" pitchFamily="49" charset="0"/>
               </a:rPr>
-              <a:t>// Predict next state using </a:t>
-            </a:r>
+              <a:t>// Update corrects predicted state with new measurement</a:t>
+            </a:r>
+          </a:p>
+          <a:p>
+            <a:pPr marL="0" indent="0">
+              <a:buNone/>
+            </a:pPr>
+            <a:r>
+              <a:rPr lang="en-US" sz="1200" dirty="0">
+                <a:latin typeface="Courier New" panose="02070309020205020404" pitchFamily="49" charset="0"/>
+                <a:cs typeface="Courier New" panose="02070309020205020404" pitchFamily="49" charset="0"/>
+              </a:rPr>
+              <a:t>// Kalman Gain (K) adjusts predicted state based on the measurement residual</a:t>
+            </a:r>
+          </a:p>
+          <a:p>
+            <a:pPr marL="0" indent="0">
+              <a:buNone/>
+            </a:pPr>
+            <a:r>
+              <a:rPr lang="en-US" sz="1200" dirty="0">
+                <a:latin typeface="Courier New" panose="02070309020205020404" pitchFamily="49" charset="0"/>
+                <a:cs typeface="Courier New" panose="02070309020205020404" pitchFamily="49" charset="0"/>
+              </a:rPr>
+              <a:t>// Update state estimate and uncertainty (covariance)</a:t>
+            </a:r>
+          </a:p>
+          <a:p>
+            <a:pPr marL="0" indent="0">
+              <a:buNone/>
+            </a:pPr>
             <a:r>
               <a:rPr lang="en-US" sz="1200" dirty="0" err="1">
                 <a:latin typeface="Courier New" panose="02070309020205020404" pitchFamily="49" charset="0"/>
                 <a:cs typeface="Courier New" panose="02070309020205020404" pitchFamily="49" charset="0"/>
               </a:rPr>
-              <a:t>prev</a:t>
-            </a:r>
-            <a:r>
-              <a:rPr lang="en-US" sz="1200" dirty="0">
-                <a:latin typeface="Courier New" panose="02070309020205020404" pitchFamily="49" charset="0"/>
-                <a:cs typeface="Courier New" panose="02070309020205020404" pitchFamily="49" charset="0"/>
-              </a:rPr>
-              <a:t> state and the F, state transition matrix</a:t>
-            </a:r>
-          </a:p>
-          <a:p>
-            <a:pPr marL="0" indent="0">
-              <a:buNone/>
-            </a:pPr>
-            <a:r>
-              <a:rPr lang="en-US" sz="1200" dirty="0">
-                <a:latin typeface="Courier New" panose="02070309020205020404" pitchFamily="49" charset="0"/>
-                <a:cs typeface="Courier New" panose="02070309020205020404" pitchFamily="49" charset="0"/>
-              </a:rPr>
-              <a:t>// Predict state uncertainty (update P, covariance matrix using Q, process noise</a:t>
-            </a:r>
-          </a:p>
-          <a:p>
-            <a:pPr marL="0" indent="0">
-              <a:buNone/>
-            </a:pPr>
-            <a:r>
-              <a:rPr lang="en-US" sz="1200" dirty="0" err="1">
-                <a:latin typeface="Courier New" panose="02070309020205020404" pitchFamily="49" charset="0"/>
-                <a:cs typeface="Courier New" panose="02070309020205020404" pitchFamily="49" charset="0"/>
-              </a:rPr>
-              <a:t>predictState</a:t>
+              <a:t>updateStateEstimate</a:t>
             </a:r>
             <a:r>
               <a:rPr lang="en-US" sz="1200" dirty="0">
@@ -11561,7 +11339,7 @@
                 <a:latin typeface="Courier New" panose="02070309020205020404" pitchFamily="49" charset="0"/>
                 <a:cs typeface="Courier New" panose="02070309020205020404" pitchFamily="49" charset="0"/>
               </a:rPr>
-              <a:t>F;ps;P;Q</a:t>
+              <a:t>H;pP;R;ms;ps</a:t>
             </a:r>
             <a:r>
               <a:rPr lang="en-US" sz="1200" dirty="0">
@@ -11580,21 +11358,7 @@
                 <a:latin typeface="Courier New" panose="02070309020205020404" pitchFamily="49" charset="0"/>
                 <a:cs typeface="Courier New" panose="02070309020205020404" pitchFamily="49" charset="0"/>
               </a:rPr>
-              <a:t>  </a:t>
-            </a:r>
-            <a:r>
-              <a:rPr lang="en-US" sz="1200" dirty="0" err="1">
-                <a:latin typeface="Courier New" panose="02070309020205020404" pitchFamily="49" charset="0"/>
-                <a:cs typeface="Courier New" panose="02070309020205020404" pitchFamily="49" charset="0"/>
-              </a:rPr>
-              <a:t>ns:F$ps</a:t>
-            </a:r>
-            <a:r>
-              <a:rPr lang="en-US" sz="1200" dirty="0">
-                <a:latin typeface="Courier New" panose="02070309020205020404" pitchFamily="49" charset="0"/>
-                <a:cs typeface="Courier New" panose="02070309020205020404" pitchFamily="49" charset="0"/>
-              </a:rPr>
-              <a:t>;                / predicted next state</a:t>
+              <a:t>  id:{(2#x)#1,x#0};</a:t>
             </a:r>
           </a:p>
           <a:p>
@@ -11613,28 +11377,178 @@
                 <a:latin typeface="Courier New" panose="02070309020205020404" pitchFamily="49" charset="0"/>
                 <a:cs typeface="Courier New" panose="02070309020205020404" pitchFamily="49" charset="0"/>
               </a:rPr>
-              <a:t>nP</a:t>
+              <a:t>I:"f"$id</a:t>
             </a:r>
             <a:r>
               <a:rPr lang="en-US" sz="1200" dirty="0">
                 <a:latin typeface="Courier New" panose="02070309020205020404" pitchFamily="49" charset="0"/>
                 <a:cs typeface="Courier New" panose="02070309020205020404" pitchFamily="49" charset="0"/>
               </a:rPr>
-              <a:t>:$[F;$[</a:t>
+              <a:t> 2;    / Identity Matrix</a:t>
+            </a:r>
+          </a:p>
+          <a:p>
+            <a:pPr marL="0" indent="0">
+              <a:buNone/>
+            </a:pPr>
+            <a:r>
+              <a:rPr lang="en-US" sz="1200" dirty="0">
+                <a:latin typeface="Courier New" panose="02070309020205020404" pitchFamily="49" charset="0"/>
+                <a:cs typeface="Courier New" panose="02070309020205020404" pitchFamily="49" charset="0"/>
+              </a:rPr>
+              <a:t>  </a:t>
             </a:r>
             <a:r>
               <a:rPr lang="en-US" sz="1200" dirty="0" err="1">
                 <a:latin typeface="Courier New" panose="02070309020205020404" pitchFamily="49" charset="0"/>
                 <a:cs typeface="Courier New" panose="02070309020205020404" pitchFamily="49" charset="0"/>
               </a:rPr>
-              <a:t>P;flip</a:t>
+              <a:t>K:computeKalmanGain</a:t>
             </a:r>
             <a:r>
               <a:rPr lang="en-US" sz="1200" dirty="0">
                 <a:latin typeface="Courier New" panose="02070309020205020404" pitchFamily="49" charset="0"/>
                 <a:cs typeface="Courier New" panose="02070309020205020404" pitchFamily="49" charset="0"/>
               </a:rPr>
-              <a:t> F]]+Q;  / predicted next P</a:t>
+              <a:t>[</a:t>
+            </a:r>
+            <a:r>
+              <a:rPr lang="en-US" sz="1200" dirty="0" err="1">
+                <a:latin typeface="Courier New" panose="02070309020205020404" pitchFamily="49" charset="0"/>
+                <a:cs typeface="Courier New" panose="02070309020205020404" pitchFamily="49" charset="0"/>
+              </a:rPr>
+              <a:t>H;pP;R</a:t>
+            </a:r>
+            <a:r>
+              <a:rPr lang="en-US" sz="1200" dirty="0">
+                <a:latin typeface="Courier New" panose="02070309020205020404" pitchFamily="49" charset="0"/>
+                <a:cs typeface="Courier New" panose="02070309020205020404" pitchFamily="49" charset="0"/>
+              </a:rPr>
+              <a:t>];</a:t>
+            </a:r>
+          </a:p>
+          <a:p>
+            <a:pPr marL="0" indent="0">
+              <a:buNone/>
+            </a:pPr>
+            <a:endParaRPr lang="en-US" sz="1200" dirty="0">
+              <a:latin typeface="Courier New" panose="02070309020205020404" pitchFamily="49" charset="0"/>
+              <a:cs typeface="Courier New" panose="02070309020205020404" pitchFamily="49" charset="0"/>
+            </a:endParaRPr>
+          </a:p>
+          <a:p>
+            <a:pPr marL="0" indent="0">
+              <a:buNone/>
+            </a:pPr>
+            <a:r>
+              <a:rPr lang="en-US" sz="1200" dirty="0">
+                <a:latin typeface="Courier New" panose="02070309020205020404" pitchFamily="49" charset="0"/>
+                <a:cs typeface="Courier New" panose="02070309020205020404" pitchFamily="49" charset="0"/>
+              </a:rPr>
+              <a:t>  </a:t>
+            </a:r>
+            <a:r>
+              <a:rPr lang="en-US" sz="1200" dirty="0" err="1">
+                <a:latin typeface="Courier New" panose="02070309020205020404" pitchFamily="49" charset="0"/>
+                <a:cs typeface="Courier New" panose="02070309020205020404" pitchFamily="49" charset="0"/>
+              </a:rPr>
+              <a:t>y:ms</a:t>
+            </a:r>
+            <a:r>
+              <a:rPr lang="en-US" sz="1200" dirty="0">
+                <a:latin typeface="Courier New" panose="02070309020205020404" pitchFamily="49" charset="0"/>
+                <a:cs typeface="Courier New" panose="02070309020205020404" pitchFamily="49" charset="0"/>
+              </a:rPr>
+              <a:t>-$[</a:t>
+            </a:r>
+            <a:r>
+              <a:rPr lang="en-US" sz="1200" dirty="0" err="1">
+                <a:latin typeface="Courier New" panose="02070309020205020404" pitchFamily="49" charset="0"/>
+                <a:cs typeface="Courier New" panose="02070309020205020404" pitchFamily="49" charset="0"/>
+              </a:rPr>
+              <a:t>H;ps</a:t>
+            </a:r>
+            <a:r>
+              <a:rPr lang="en-US" sz="1200" dirty="0">
+                <a:latin typeface="Courier New" panose="02070309020205020404" pitchFamily="49" charset="0"/>
+                <a:cs typeface="Courier New" panose="02070309020205020404" pitchFamily="49" charset="0"/>
+              </a:rPr>
+              <a:t>];  / measurement residuals</a:t>
+            </a:r>
+          </a:p>
+          <a:p>
+            <a:pPr marL="0" indent="0">
+              <a:buNone/>
+            </a:pPr>
+            <a:r>
+              <a:rPr lang="en-US" sz="1200" dirty="0">
+                <a:latin typeface="Courier New" panose="02070309020205020404" pitchFamily="49" charset="0"/>
+                <a:cs typeface="Courier New" panose="02070309020205020404" pitchFamily="49" charset="0"/>
+              </a:rPr>
+              <a:t>  </a:t>
+            </a:r>
+            <a:r>
+              <a:rPr lang="en-US" sz="1200" dirty="0" err="1">
+                <a:latin typeface="Courier New" panose="02070309020205020404" pitchFamily="49" charset="0"/>
+                <a:cs typeface="Courier New" panose="02070309020205020404" pitchFamily="49" charset="0"/>
+              </a:rPr>
+              <a:t>es:ps</a:t>
+            </a:r>
+            <a:r>
+              <a:rPr lang="en-US" sz="1200" dirty="0">
+                <a:latin typeface="Courier New" panose="02070309020205020404" pitchFamily="49" charset="0"/>
+                <a:cs typeface="Courier New" panose="02070309020205020404" pitchFamily="49" charset="0"/>
+              </a:rPr>
+              <a:t>+$[</a:t>
+            </a:r>
+            <a:r>
+              <a:rPr lang="en-US" sz="1200" dirty="0" err="1">
+                <a:latin typeface="Courier New" panose="02070309020205020404" pitchFamily="49" charset="0"/>
+                <a:cs typeface="Courier New" panose="02070309020205020404" pitchFamily="49" charset="0"/>
+              </a:rPr>
+              <a:t>K;y</a:t>
+            </a:r>
+            <a:r>
+              <a:rPr lang="en-US" sz="1200" dirty="0">
+                <a:latin typeface="Courier New" panose="02070309020205020404" pitchFamily="49" charset="0"/>
+                <a:cs typeface="Courier New" panose="02070309020205020404" pitchFamily="49" charset="0"/>
+              </a:rPr>
+              <a:t>];  / new state estimate</a:t>
+            </a:r>
+          </a:p>
+          <a:p>
+            <a:pPr marL="0" indent="0">
+              <a:buNone/>
+            </a:pPr>
+            <a:endParaRPr lang="en-US" sz="1200" dirty="0">
+              <a:latin typeface="Courier New" panose="02070309020205020404" pitchFamily="49" charset="0"/>
+              <a:cs typeface="Courier New" panose="02070309020205020404" pitchFamily="49" charset="0"/>
+            </a:endParaRPr>
+          </a:p>
+          <a:p>
+            <a:pPr marL="0" indent="0">
+              <a:buNone/>
+            </a:pPr>
+            <a:r>
+              <a:rPr lang="en-US" sz="1200" dirty="0">
+                <a:latin typeface="Courier New" panose="02070309020205020404" pitchFamily="49" charset="0"/>
+                <a:cs typeface="Courier New" panose="02070309020205020404" pitchFamily="49" charset="0"/>
+              </a:rPr>
+              <a:t>  P:$[I-$[K;H];</a:t>
+            </a:r>
+            <a:r>
+              <a:rPr lang="en-US" sz="1200" dirty="0" err="1">
+                <a:latin typeface="Courier New" panose="02070309020205020404" pitchFamily="49" charset="0"/>
+                <a:cs typeface="Courier New" panose="02070309020205020404" pitchFamily="49" charset="0"/>
+              </a:rPr>
+              <a:t>pP</a:t>
+            </a:r>
+            <a:r>
+              <a:rPr lang="en-US" sz="1200" dirty="0">
+                <a:latin typeface="Courier New" panose="02070309020205020404" pitchFamily="49" charset="0"/>
+                <a:cs typeface="Courier New" panose="02070309020205020404" pitchFamily="49" charset="0"/>
+              </a:rPr>
+              <a:t>];</a:t>
             </a:r>
           </a:p>
           <a:p>
@@ -11653,7 +11567,7 @@
                 <a:latin typeface="Courier New" panose="02070309020205020404" pitchFamily="49" charset="0"/>
                 <a:cs typeface="Courier New" panose="02070309020205020404" pitchFamily="49" charset="0"/>
               </a:rPr>
-              <a:t>ns;nP</a:t>
+              <a:t>K;es;P</a:t>
             </a:r>
             <a:r>
               <a:rPr lang="en-US" sz="1200" dirty="0">
@@ -11674,140 +11588,6 @@
               </a:rPr>
               <a:t>  };</a:t>
             </a:r>
-          </a:p>
-          <a:p>
-            <a:pPr marL="0" indent="0">
-              <a:buNone/>
-            </a:pPr>
-            <a:endParaRPr lang="en-US" sz="1200" dirty="0">
-              <a:latin typeface="Courier New" panose="02070309020205020404" pitchFamily="49" charset="0"/>
-              <a:cs typeface="Courier New" panose="02070309020205020404" pitchFamily="49" charset="0"/>
-            </a:endParaRPr>
-          </a:p>
-          <a:p>
-            <a:pPr marL="0" indent="0">
-              <a:buNone/>
-            </a:pPr>
-            <a:r>
-              <a:rPr lang="en-US" sz="1200" dirty="0">
-                <a:latin typeface="Courier New" panose="02070309020205020404" pitchFamily="49" charset="0"/>
-                <a:cs typeface="Courier New" panose="02070309020205020404" pitchFamily="49" charset="0"/>
-              </a:rPr>
-              <a:t>// Kalman Gain (K) weight of measurement vs prediction</a:t>
-            </a:r>
-          </a:p>
-          <a:p>
-            <a:pPr marL="0" indent="0">
-              <a:buNone/>
-            </a:pPr>
-            <a:r>
-              <a:rPr lang="en-US" sz="1200" dirty="0">
-                <a:latin typeface="Courier New" panose="02070309020205020404" pitchFamily="49" charset="0"/>
-                <a:cs typeface="Courier New" panose="02070309020205020404" pitchFamily="49" charset="0"/>
-              </a:rPr>
-              <a:t>// done in the update step</a:t>
-            </a:r>
-          </a:p>
-          <a:p>
-            <a:pPr marL="0" indent="0">
-              <a:buNone/>
-            </a:pPr>
-            <a:r>
-              <a:rPr lang="en-US" sz="1200" dirty="0" err="1">
-                <a:latin typeface="Courier New" panose="02070309020205020404" pitchFamily="49" charset="0"/>
-                <a:cs typeface="Courier New" panose="02070309020205020404" pitchFamily="49" charset="0"/>
-              </a:rPr>
-              <a:t>computeKalmanGain</a:t>
-            </a:r>
-            <a:r>
-              <a:rPr lang="en-US" sz="1200" dirty="0">
-                <a:latin typeface="Courier New" panose="02070309020205020404" pitchFamily="49" charset="0"/>
-                <a:cs typeface="Courier New" panose="02070309020205020404" pitchFamily="49" charset="0"/>
-              </a:rPr>
-              <a:t>:{[</a:t>
-            </a:r>
-            <a:r>
-              <a:rPr lang="en-US" sz="1200" dirty="0" err="1">
-                <a:latin typeface="Courier New" panose="02070309020205020404" pitchFamily="49" charset="0"/>
-                <a:cs typeface="Courier New" panose="02070309020205020404" pitchFamily="49" charset="0"/>
-              </a:rPr>
-              <a:t>H;pP;R</a:t>
-            </a:r>
-            <a:r>
-              <a:rPr lang="en-US" sz="1200" dirty="0">
-                <a:latin typeface="Courier New" panose="02070309020205020404" pitchFamily="49" charset="0"/>
-                <a:cs typeface="Courier New" panose="02070309020205020404" pitchFamily="49" charset="0"/>
-              </a:rPr>
-              <a:t>]</a:t>
-            </a:r>
-          </a:p>
-          <a:p>
-            <a:pPr marL="0" indent="0">
-              <a:buNone/>
-            </a:pPr>
-            <a:r>
-              <a:rPr lang="en-US" sz="1200" dirty="0">
-                <a:latin typeface="Courier New" panose="02070309020205020404" pitchFamily="49" charset="0"/>
-                <a:cs typeface="Courier New" panose="02070309020205020404" pitchFamily="49" charset="0"/>
-              </a:rPr>
-              <a:t>  S:$[H;$[pP;flip H]]+R;   / intermediate matrix for inversion</a:t>
-            </a:r>
-          </a:p>
-          <a:p>
-            <a:pPr marL="0" indent="0">
-              <a:buNone/>
-            </a:pPr>
-            <a:r>
-              <a:rPr lang="en-US" sz="1200" dirty="0">
-                <a:latin typeface="Courier New" panose="02070309020205020404" pitchFamily="49" charset="0"/>
-                <a:cs typeface="Courier New" panose="02070309020205020404" pitchFamily="49" charset="0"/>
-              </a:rPr>
-              <a:t>  K:$[pP;$[flip </a:t>
-            </a:r>
-            <a:r>
-              <a:rPr lang="en-US" sz="1200" dirty="0" err="1">
-                <a:latin typeface="Courier New" panose="02070309020205020404" pitchFamily="49" charset="0"/>
-                <a:cs typeface="Courier New" panose="02070309020205020404" pitchFamily="49" charset="0"/>
-              </a:rPr>
-              <a:t>H;inv</a:t>
-            </a:r>
-            <a:r>
-              <a:rPr lang="en-US" sz="1200" dirty="0">
-                <a:latin typeface="Courier New" panose="02070309020205020404" pitchFamily="49" charset="0"/>
-                <a:cs typeface="Courier New" panose="02070309020205020404" pitchFamily="49" charset="0"/>
-              </a:rPr>
-              <a:t> S]]  / inv uses LU decomposition</a:t>
-            </a:r>
-          </a:p>
-          <a:p>
-            <a:pPr marL="0" indent="0">
-              <a:buNone/>
-            </a:pPr>
-            <a:r>
-              <a:rPr lang="en-US" sz="1200" dirty="0">
-                <a:latin typeface="Courier New" panose="02070309020205020404" pitchFamily="49" charset="0"/>
-                <a:cs typeface="Courier New" panose="02070309020205020404" pitchFamily="49" charset="0"/>
-              </a:rPr>
-              <a:t>  };</a:t>
-            </a:r>
-          </a:p>
-          <a:p>
-            <a:pPr marL="0" indent="0">
-              <a:buNone/>
-            </a:pPr>
-            <a:endParaRPr lang="en-US" sz="1200" dirty="0">
-              <a:latin typeface="Courier New" panose="02070309020205020404" pitchFamily="49" charset="0"/>
-              <a:cs typeface="Courier New" panose="02070309020205020404" pitchFamily="49" charset="0"/>
-            </a:endParaRPr>
-          </a:p>
-          <a:p>
-            <a:pPr marL="0" indent="0">
-              <a:buNone/>
-            </a:pPr>
-            <a:endParaRPr lang="en-US" sz="1200" dirty="0">
-              <a:latin typeface="Courier New" panose="02070309020205020404" pitchFamily="49" charset="0"/>
-              <a:cs typeface="Courier New" panose="02070309020205020404" pitchFamily="49" charset="0"/>
-            </a:endParaRPr>
           </a:p>
         </p:txBody>
       </p:sp>
@@ -11847,7 +11627,7 @@
                 <a:latin typeface="Courier New" panose="02070309020205020404" pitchFamily="49" charset="0"/>
                 <a:cs typeface="Courier New" panose="02070309020205020404" pitchFamily="49" charset="0"/>
               </a:rPr>
-              <a:t>/ KF Update Step</a:t>
+              <a:t>idx:0;</a:t>
             </a:r>
           </a:p>
           <a:p>
@@ -11859,76 +11639,106 @@
                 <a:latin typeface="Courier New" panose="02070309020205020404" pitchFamily="49" charset="0"/>
                 <a:cs typeface="Courier New" panose="02070309020205020404" pitchFamily="49" charset="0"/>
               </a:rPr>
-              <a:t>// Update corrects predicted state with new measurement</a:t>
+              <a:t>res:();</a:t>
             </a:r>
           </a:p>
           <a:p>
             <a:pPr marL="0" indent="0">
               <a:buNone/>
             </a:pPr>
+            <a:r>
+              <a:rPr lang="en-US" sz="1200" dirty="0" err="1">
+                <a:latin typeface="Courier New" panose="02070309020205020404" pitchFamily="49" charset="0"/>
+                <a:cs typeface="Courier New" panose="02070309020205020404" pitchFamily="49" charset="0"/>
+              </a:rPr>
+              <a:t>ps</a:t>
+            </a:r>
             <a:r>
               <a:rPr lang="en-US" sz="1200" dirty="0">
                 <a:latin typeface="Courier New" panose="02070309020205020404" pitchFamily="49" charset="0"/>
                 <a:cs typeface="Courier New" panose="02070309020205020404" pitchFamily="49" charset="0"/>
               </a:rPr>
-              <a:t>// Kalman Gain (K) adjusts predicted state based on the measurement residual</a:t>
-            </a:r>
-          </a:p>
-          <a:p>
-            <a:pPr marL="0" indent="0">
-              <a:buNone/>
-            </a:pPr>
+              <a:t>:(); </a:t>
+            </a:r>
+            <a:r>
+              <a:rPr lang="en-US" sz="1200" dirty="0" err="1">
+                <a:latin typeface="Courier New" panose="02070309020205020404" pitchFamily="49" charset="0"/>
+                <a:cs typeface="Courier New" panose="02070309020205020404" pitchFamily="49" charset="0"/>
+              </a:rPr>
+              <a:t>pP</a:t>
+            </a:r>
             <a:r>
               <a:rPr lang="en-US" sz="1200" dirty="0">
                 <a:latin typeface="Courier New" panose="02070309020205020404" pitchFamily="49" charset="0"/>
                 <a:cs typeface="Courier New" panose="02070309020205020404" pitchFamily="49" charset="0"/>
               </a:rPr>
-              <a:t>// Update state estimate and uncertainty (covariance)</a:t>
+              <a:t>:();</a:t>
             </a:r>
           </a:p>
           <a:p>
             <a:pPr marL="0" indent="0">
               <a:buNone/>
             </a:pPr>
+            <a:r>
+              <a:rPr lang="en-US" sz="1200" dirty="0">
+                <a:latin typeface="Courier New" panose="02070309020205020404" pitchFamily="49" charset="0"/>
+                <a:cs typeface="Courier New" panose="02070309020205020404" pitchFamily="49" charset="0"/>
+              </a:rPr>
+              <a:t>es:(); </a:t>
+            </a:r>
             <a:r>
               <a:rPr lang="en-US" sz="1200" dirty="0" err="1">
                 <a:latin typeface="Courier New" panose="02070309020205020404" pitchFamily="49" charset="0"/>
                 <a:cs typeface="Courier New" panose="02070309020205020404" pitchFamily="49" charset="0"/>
               </a:rPr>
-              <a:t>updateStateEstimate</a:t>
+              <a:t>cP</a:t>
             </a:r>
             <a:r>
               <a:rPr lang="en-US" sz="1200" dirty="0">
                 <a:latin typeface="Courier New" panose="02070309020205020404" pitchFamily="49" charset="0"/>
                 <a:cs typeface="Courier New" panose="02070309020205020404" pitchFamily="49" charset="0"/>
               </a:rPr>
-              <a:t>:{[</a:t>
+              <a:t>:();</a:t>
+            </a:r>
+          </a:p>
+          <a:p>
+            <a:pPr marL="0" indent="0">
+              <a:buNone/>
+            </a:pPr>
+            <a:r>
+              <a:rPr lang="en-US" sz="1200" dirty="0">
+                <a:latin typeface="Courier New" panose="02070309020205020404" pitchFamily="49" charset="0"/>
+                <a:cs typeface="Courier New" panose="02070309020205020404" pitchFamily="49" charset="0"/>
+              </a:rPr>
+              <a:t>while[</a:t>
             </a:r>
             <a:r>
               <a:rPr lang="en-US" sz="1200" dirty="0" err="1">
                 <a:latin typeface="Courier New" panose="02070309020205020404" pitchFamily="49" charset="0"/>
                 <a:cs typeface="Courier New" panose="02070309020205020404" pitchFamily="49" charset="0"/>
               </a:rPr>
-              <a:t>H;pP;R;ms;ps</a:t>
+              <a:t>idx</a:t>
             </a:r>
             <a:r>
               <a:rPr lang="en-US" sz="1200" dirty="0">
                 <a:latin typeface="Courier New" panose="02070309020205020404" pitchFamily="49" charset="0"/>
                 <a:cs typeface="Courier New" panose="02070309020205020404" pitchFamily="49" charset="0"/>
               </a:rPr>
-              <a:t>]</a:t>
-            </a:r>
-          </a:p>
-          <a:p>
-            <a:pPr marL="0" indent="0">
-              <a:buNone/>
-            </a:pPr>
+              <a:t>&lt;-1+count </a:t>
+            </a:r>
+            <a:r>
+              <a:rPr lang="en-US" sz="1200" dirty="0" err="1">
+                <a:latin typeface="Courier New" panose="02070309020205020404" pitchFamily="49" charset="0"/>
+                <a:cs typeface="Courier New" panose="02070309020205020404" pitchFamily="49" charset="0"/>
+              </a:rPr>
+              <a:t>fxrates</a:t>
+            </a:r>
             <a:r>
               <a:rPr lang="en-US" sz="1200" dirty="0">
                 <a:latin typeface="Courier New" panose="02070309020205020404" pitchFamily="49" charset="0"/>
                 <a:cs typeface="Courier New" panose="02070309020205020404" pitchFamily="49" charset="0"/>
               </a:rPr>
-              <a:t>  id:{(2#x)#1,x#0};</a:t>
+              <a:t>;</a:t>
             </a:r>
           </a:p>
           <a:p>
@@ -11940,19 +11750,275 @@
                 <a:latin typeface="Courier New" panose="02070309020205020404" pitchFamily="49" charset="0"/>
                 <a:cs typeface="Courier New" panose="02070309020205020404" pitchFamily="49" charset="0"/>
               </a:rPr>
-              <a:t>  I:"f"$id 4;    / Identity Matrix</a:t>
-            </a:r>
-          </a:p>
-          <a:p>
-            <a:pPr marL="0" indent="0">
-              <a:buNone/>
-            </a:pPr>
+              <a:t>  </a:t>
+            </a:r>
+            <a:r>
+              <a:rPr lang="en-US" sz="1200" dirty="0" err="1">
+                <a:latin typeface="Courier New" panose="02070309020205020404" pitchFamily="49" charset="0"/>
+                <a:cs typeface="Courier New" panose="02070309020205020404" pitchFamily="49" charset="0"/>
+              </a:rPr>
+              <a:t>idx</a:t>
+            </a:r>
             <a:r>
               <a:rPr lang="en-US" sz="1200" dirty="0">
                 <a:latin typeface="Courier New" panose="02070309020205020404" pitchFamily="49" charset="0"/>
                 <a:cs typeface="Courier New" panose="02070309020205020404" pitchFamily="49" charset="0"/>
               </a:rPr>
-              <a:t>  K:computeKalmanGain[H;pP;R];</a:t>
+              <a:t>+:1;</a:t>
+            </a:r>
+          </a:p>
+          <a:p>
+            <a:pPr marL="0" indent="0">
+              <a:buNone/>
+            </a:pPr>
+            <a:r>
+              <a:rPr lang="en-US" sz="1200" dirty="0">
+                <a:latin typeface="Courier New" panose="02070309020205020404" pitchFamily="49" charset="0"/>
+                <a:cs typeface="Courier New" panose="02070309020205020404" pitchFamily="49" charset="0"/>
+              </a:rPr>
+              <a:t>  show </a:t>
+            </a:r>
+            <a:r>
+              <a:rPr lang="en-US" sz="1200" dirty="0" err="1">
+                <a:latin typeface="Courier New" panose="02070309020205020404" pitchFamily="49" charset="0"/>
+                <a:cs typeface="Courier New" panose="02070309020205020404" pitchFamily="49" charset="0"/>
+              </a:rPr>
+              <a:t>idx</a:t>
+            </a:r>
+            <a:r>
+              <a:rPr lang="en-US" sz="1200" dirty="0">
+                <a:latin typeface="Courier New" panose="02070309020205020404" pitchFamily="49" charset="0"/>
+                <a:cs typeface="Courier New" panose="02070309020205020404" pitchFamily="49" charset="0"/>
+              </a:rPr>
+              <a:t>;</a:t>
+            </a:r>
+          </a:p>
+          <a:p>
+            <a:pPr marL="0" indent="0">
+              <a:buNone/>
+            </a:pPr>
+            <a:r>
+              <a:rPr lang="en-US" sz="1200" dirty="0">
+                <a:latin typeface="Courier New" panose="02070309020205020404" pitchFamily="49" charset="0"/>
+                <a:cs typeface="Courier New" panose="02070309020205020404" pitchFamily="49" charset="0"/>
+              </a:rPr>
+              <a:t>  </a:t>
+            </a:r>
+            <a:r>
+              <a:rPr lang="en-US" sz="1200" dirty="0" err="1">
+                <a:latin typeface="Courier New" panose="02070309020205020404" pitchFamily="49" charset="0"/>
+                <a:cs typeface="Courier New" panose="02070309020205020404" pitchFamily="49" charset="0"/>
+              </a:rPr>
+              <a:t>res:predictState</a:t>
+            </a:r>
+            <a:r>
+              <a:rPr lang="en-US" sz="1200" dirty="0">
+                <a:latin typeface="Courier New" panose="02070309020205020404" pitchFamily="49" charset="0"/>
+                <a:cs typeface="Courier New" panose="02070309020205020404" pitchFamily="49" charset="0"/>
+              </a:rPr>
+              <a:t>[</a:t>
+            </a:r>
+            <a:r>
+              <a:rPr lang="en-US" sz="1200" dirty="0" err="1">
+                <a:latin typeface="Courier New" panose="02070309020205020404" pitchFamily="49" charset="0"/>
+                <a:cs typeface="Courier New" panose="02070309020205020404" pitchFamily="49" charset="0"/>
+              </a:rPr>
+              <a:t>F;x_est</a:t>
+            </a:r>
+            <a:r>
+              <a:rPr lang="en-US" sz="1200" dirty="0">
+                <a:latin typeface="Courier New" panose="02070309020205020404" pitchFamily="49" charset="0"/>
+                <a:cs typeface="Courier New" panose="02070309020205020404" pitchFamily="49" charset="0"/>
+              </a:rPr>
+              <a:t>[;idx-1];P;Q];</a:t>
+            </a:r>
+          </a:p>
+          <a:p>
+            <a:pPr marL="0" indent="0">
+              <a:buNone/>
+            </a:pPr>
+            <a:r>
+              <a:rPr lang="en-US" sz="1200" dirty="0">
+                <a:latin typeface="Courier New" panose="02070309020205020404" pitchFamily="49" charset="0"/>
+                <a:cs typeface="Courier New" panose="02070309020205020404" pitchFamily="49" charset="0"/>
+              </a:rPr>
+              <a:t>  </a:t>
+            </a:r>
+            <a:r>
+              <a:rPr lang="en-US" sz="1200" dirty="0" err="1">
+                <a:latin typeface="Courier New" panose="02070309020205020404" pitchFamily="49" charset="0"/>
+                <a:cs typeface="Courier New" panose="02070309020205020404" pitchFamily="49" charset="0"/>
+              </a:rPr>
+              <a:t>ps:res</a:t>
+            </a:r>
+            <a:r>
+              <a:rPr lang="en-US" sz="1200" dirty="0">
+                <a:latin typeface="Courier New" panose="02070309020205020404" pitchFamily="49" charset="0"/>
+                <a:cs typeface="Courier New" panose="02070309020205020404" pitchFamily="49" charset="0"/>
+              </a:rPr>
+              <a:t> 0; </a:t>
+            </a:r>
+            <a:r>
+              <a:rPr lang="en-US" sz="1200" dirty="0" err="1">
+                <a:latin typeface="Courier New" panose="02070309020205020404" pitchFamily="49" charset="0"/>
+                <a:cs typeface="Courier New" panose="02070309020205020404" pitchFamily="49" charset="0"/>
+              </a:rPr>
+              <a:t>pP:P:res</a:t>
+            </a:r>
+            <a:r>
+              <a:rPr lang="en-US" sz="1200" dirty="0">
+                <a:latin typeface="Courier New" panose="02070309020205020404" pitchFamily="49" charset="0"/>
+                <a:cs typeface="Courier New" panose="02070309020205020404" pitchFamily="49" charset="0"/>
+              </a:rPr>
+              <a:t> 1;</a:t>
+            </a:r>
+          </a:p>
+          <a:p>
+            <a:pPr marL="0" indent="0">
+              <a:buNone/>
+            </a:pPr>
+            <a:r>
+              <a:rPr lang="en-US" sz="1200" dirty="0">
+                <a:latin typeface="Courier New" panose="02070309020205020404" pitchFamily="49" charset="0"/>
+                <a:cs typeface="Courier New" panose="02070309020205020404" pitchFamily="49" charset="0"/>
+              </a:rPr>
+              <a:t>  </a:t>
+            </a:r>
+            <a:r>
+              <a:rPr lang="en-US" sz="1200" dirty="0" err="1">
+                <a:latin typeface="Courier New" panose="02070309020205020404" pitchFamily="49" charset="0"/>
+                <a:cs typeface="Courier New" panose="02070309020205020404" pitchFamily="49" charset="0"/>
+              </a:rPr>
+              <a:t>res:updateStateEstimate</a:t>
+            </a:r>
+            <a:r>
+              <a:rPr lang="en-US" sz="1200" dirty="0">
+                <a:latin typeface="Courier New" panose="02070309020205020404" pitchFamily="49" charset="0"/>
+                <a:cs typeface="Courier New" panose="02070309020205020404" pitchFamily="49" charset="0"/>
+              </a:rPr>
+              <a:t>[</a:t>
+            </a:r>
+            <a:r>
+              <a:rPr lang="en-US" sz="1200" dirty="0" err="1">
+                <a:latin typeface="Courier New" panose="02070309020205020404" pitchFamily="49" charset="0"/>
+                <a:cs typeface="Courier New" panose="02070309020205020404" pitchFamily="49" charset="0"/>
+              </a:rPr>
+              <a:t>H;pP;R;spread</a:t>
+            </a:r>
+            <a:r>
+              <a:rPr lang="en-US" sz="1200" dirty="0">
+                <a:latin typeface="Courier New" panose="02070309020205020404" pitchFamily="49" charset="0"/>
+                <a:cs typeface="Courier New" panose="02070309020205020404" pitchFamily="49" charset="0"/>
+              </a:rPr>
+              <a:t>[</a:t>
+            </a:r>
+            <a:r>
+              <a:rPr lang="en-US" sz="1200" dirty="0" err="1">
+                <a:latin typeface="Courier New" panose="02070309020205020404" pitchFamily="49" charset="0"/>
+                <a:cs typeface="Courier New" panose="02070309020205020404" pitchFamily="49" charset="0"/>
+              </a:rPr>
+              <a:t>idx</a:t>
+            </a:r>
+            <a:r>
+              <a:rPr lang="en-US" sz="1200" dirty="0">
+                <a:latin typeface="Courier New" panose="02070309020205020404" pitchFamily="49" charset="0"/>
+                <a:cs typeface="Courier New" panose="02070309020205020404" pitchFamily="49" charset="0"/>
+              </a:rPr>
+              <a:t>];</a:t>
+            </a:r>
+            <a:r>
+              <a:rPr lang="en-US" sz="1200" dirty="0" err="1">
+                <a:latin typeface="Courier New" panose="02070309020205020404" pitchFamily="49" charset="0"/>
+                <a:cs typeface="Courier New" panose="02070309020205020404" pitchFamily="49" charset="0"/>
+              </a:rPr>
+              <a:t>ps</a:t>
+            </a:r>
+            <a:r>
+              <a:rPr lang="en-US" sz="1200" dirty="0">
+                <a:latin typeface="Courier New" panose="02070309020205020404" pitchFamily="49" charset="0"/>
+                <a:cs typeface="Courier New" panose="02070309020205020404" pitchFamily="49" charset="0"/>
+              </a:rPr>
+              <a:t>];</a:t>
+            </a:r>
+          </a:p>
+          <a:p>
+            <a:pPr marL="0" indent="0">
+              <a:buNone/>
+            </a:pPr>
+            <a:r>
+              <a:rPr lang="en-US" sz="1200" dirty="0">
+                <a:latin typeface="Courier New" panose="02070309020205020404" pitchFamily="49" charset="0"/>
+                <a:cs typeface="Courier New" panose="02070309020205020404" pitchFamily="49" charset="0"/>
+              </a:rPr>
+              <a:t>  G[;;</a:t>
+            </a:r>
+            <a:r>
+              <a:rPr lang="en-US" sz="1200" dirty="0" err="1">
+                <a:latin typeface="Courier New" panose="02070309020205020404" pitchFamily="49" charset="0"/>
+                <a:cs typeface="Courier New" panose="02070309020205020404" pitchFamily="49" charset="0"/>
+              </a:rPr>
+              <a:t>idx</a:t>
+            </a:r>
+            <a:r>
+              <a:rPr lang="en-US" sz="1200" dirty="0">
+                <a:latin typeface="Courier New" panose="02070309020205020404" pitchFamily="49" charset="0"/>
+                <a:cs typeface="Courier New" panose="02070309020205020404" pitchFamily="49" charset="0"/>
+              </a:rPr>
+              <a:t>]:res 0; </a:t>
+            </a:r>
+            <a:r>
+              <a:rPr lang="en-US" sz="1200" dirty="0" err="1">
+                <a:latin typeface="Courier New" panose="02070309020205020404" pitchFamily="49" charset="0"/>
+                <a:cs typeface="Courier New" panose="02070309020205020404" pitchFamily="49" charset="0"/>
+              </a:rPr>
+              <a:t>x_est</a:t>
+            </a:r>
+            <a:r>
+              <a:rPr lang="en-US" sz="1200" dirty="0">
+                <a:latin typeface="Courier New" panose="02070309020205020404" pitchFamily="49" charset="0"/>
+                <a:cs typeface="Courier New" panose="02070309020205020404" pitchFamily="49" charset="0"/>
+              </a:rPr>
+              <a:t>[;</a:t>
+            </a:r>
+            <a:r>
+              <a:rPr lang="en-US" sz="1200" dirty="0" err="1">
+                <a:latin typeface="Courier New" panose="02070309020205020404" pitchFamily="49" charset="0"/>
+                <a:cs typeface="Courier New" panose="02070309020205020404" pitchFamily="49" charset="0"/>
+              </a:rPr>
+              <a:t>idx</a:t>
+            </a:r>
+            <a:r>
+              <a:rPr lang="en-US" sz="1200" dirty="0">
+                <a:latin typeface="Courier New" panose="02070309020205020404" pitchFamily="49" charset="0"/>
+                <a:cs typeface="Courier New" panose="02070309020205020404" pitchFamily="49" charset="0"/>
+              </a:rPr>
+              <a:t>]:res 1; </a:t>
+            </a:r>
+            <a:r>
+              <a:rPr lang="en-US" sz="1200" dirty="0" err="1">
+                <a:latin typeface="Courier New" panose="02070309020205020404" pitchFamily="49" charset="0"/>
+                <a:cs typeface="Courier New" panose="02070309020205020404" pitchFamily="49" charset="0"/>
+              </a:rPr>
+              <a:t>P:res</a:t>
+            </a:r>
+            <a:r>
+              <a:rPr lang="en-US" sz="1200" dirty="0">
+                <a:latin typeface="Courier New" panose="02070309020205020404" pitchFamily="49" charset="0"/>
+                <a:cs typeface="Courier New" panose="02070309020205020404" pitchFamily="49" charset="0"/>
+              </a:rPr>
+              <a:t> 2;</a:t>
+            </a:r>
+          </a:p>
+          <a:p>
+            <a:pPr marL="0" indent="0">
+              <a:buNone/>
+            </a:pPr>
+            <a:r>
+              <a:rPr lang="en-US" sz="1200" dirty="0">
+                <a:latin typeface="Courier New" panose="02070309020205020404" pitchFamily="49" charset="0"/>
+                <a:cs typeface="Courier New" panose="02070309020205020404" pitchFamily="49" charset="0"/>
+              </a:rPr>
+              <a:t>  ];</a:t>
             </a:r>
           </a:p>
           <a:p>
@@ -11969,121 +12035,58 @@
               <a:buNone/>
             </a:pPr>
             <a:r>
+              <a:rPr lang="en-US" sz="1200" dirty="0" err="1">
+                <a:latin typeface="Courier New" panose="02070309020205020404" pitchFamily="49" charset="0"/>
+                <a:cs typeface="Courier New" panose="02070309020205020404" pitchFamily="49" charset="0"/>
+              </a:rPr>
+              <a:t>fx_out</a:t>
+            </a:r>
+            <a:r>
               <a:rPr lang="en-US" sz="1200" dirty="0">
                 <a:latin typeface="Courier New" panose="02070309020205020404" pitchFamily="49" charset="0"/>
                 <a:cs typeface="Courier New" panose="02070309020205020404" pitchFamily="49" charset="0"/>
               </a:rPr>
-              <a:t>  y:ms-$[H;ps];  / measurement residuals</a:t>
-            </a:r>
-          </a:p>
-          <a:p>
-            <a:pPr marL="0" indent="0">
-              <a:buNone/>
-            </a:pPr>
+              <a:t>:![0;fxrates],'flip `</a:t>
+            </a:r>
+            <a:r>
+              <a:rPr lang="en-US" sz="1200" dirty="0" err="1">
+                <a:latin typeface="Courier New" panose="02070309020205020404" pitchFamily="49" charset="0"/>
+                <a:cs typeface="Courier New" panose="02070309020205020404" pitchFamily="49" charset="0"/>
+              </a:rPr>
+              <a:t>spread`velocity!x_est</a:t>
+            </a:r>
             <a:r>
               <a:rPr lang="en-US" sz="1200" dirty="0">
                 <a:latin typeface="Courier New" panose="02070309020205020404" pitchFamily="49" charset="0"/>
                 <a:cs typeface="Courier New" panose="02070309020205020404" pitchFamily="49" charset="0"/>
               </a:rPr>
-              <a:t>  </a:t>
+              <a:t>;</a:t>
+            </a:r>
+          </a:p>
+          <a:p>
+            <a:pPr marL="0" indent="0">
+              <a:buNone/>
+            </a:pPr>
+            <a:r>
+              <a:rPr lang="en-US" sz="1200" dirty="0">
+                <a:latin typeface="Courier New" panose="02070309020205020404" pitchFamily="49" charset="0"/>
+                <a:cs typeface="Courier New" panose="02070309020205020404" pitchFamily="49" charset="0"/>
+              </a:rPr>
+              <a:t>save `:</a:t>
             </a:r>
             <a:r>
               <a:rPr lang="en-US" sz="1200" dirty="0" err="1">
                 <a:latin typeface="Courier New" panose="02070309020205020404" pitchFamily="49" charset="0"/>
                 <a:cs typeface="Courier New" panose="02070309020205020404" pitchFamily="49" charset="0"/>
               </a:rPr>
-              <a:t>es:ps</a:t>
+              <a:t>fx_out.csv</a:t>
             </a:r>
             <a:r>
               <a:rPr lang="en-US" sz="1200" dirty="0">
                 <a:latin typeface="Courier New" panose="02070309020205020404" pitchFamily="49" charset="0"/>
                 <a:cs typeface="Courier New" panose="02070309020205020404" pitchFamily="49" charset="0"/>
               </a:rPr>
-              <a:t>+$[</a:t>
-            </a:r>
-            <a:r>
-              <a:rPr lang="en-US" sz="1200" dirty="0" err="1">
-                <a:latin typeface="Courier New" panose="02070309020205020404" pitchFamily="49" charset="0"/>
-                <a:cs typeface="Courier New" panose="02070309020205020404" pitchFamily="49" charset="0"/>
-              </a:rPr>
-              <a:t>K;y</a:t>
-            </a:r>
-            <a:r>
-              <a:rPr lang="en-US" sz="1200" dirty="0">
-                <a:latin typeface="Courier New" panose="02070309020205020404" pitchFamily="49" charset="0"/>
-                <a:cs typeface="Courier New" panose="02070309020205020404" pitchFamily="49" charset="0"/>
-              </a:rPr>
-              <a:t>];  / new state </a:t>
-            </a:r>
-            <a:r>
-              <a:rPr lang="en-US" sz="1200" dirty="0" err="1">
-                <a:latin typeface="Courier New" panose="02070309020205020404" pitchFamily="49" charset="0"/>
-                <a:cs typeface="Courier New" panose="02070309020205020404" pitchFamily="49" charset="0"/>
-              </a:rPr>
-              <a:t>estimat</a:t>
-            </a:r>
-            <a:endParaRPr lang="en-US" sz="1200" dirty="0">
-              <a:latin typeface="Courier New" panose="02070309020205020404" pitchFamily="49" charset="0"/>
-              <a:cs typeface="Courier New" panose="02070309020205020404" pitchFamily="49" charset="0"/>
-            </a:endParaRPr>
-          </a:p>
-          <a:p>
-            <a:pPr marL="0" indent="0">
-              <a:buNone/>
-            </a:pPr>
-            <a:endParaRPr lang="en-US" sz="1200" dirty="0">
-              <a:latin typeface="Courier New" panose="02070309020205020404" pitchFamily="49" charset="0"/>
-              <a:cs typeface="Courier New" panose="02070309020205020404" pitchFamily="49" charset="0"/>
-            </a:endParaRPr>
-          </a:p>
-          <a:p>
-            <a:pPr marL="0" indent="0">
-              <a:buNone/>
-            </a:pPr>
-            <a:r>
-              <a:rPr lang="en-US" sz="1200" dirty="0">
-                <a:latin typeface="Courier New" panose="02070309020205020404" pitchFamily="49" charset="0"/>
-                <a:cs typeface="Courier New" panose="02070309020205020404" pitchFamily="49" charset="0"/>
-              </a:rPr>
-              <a:t>  P:$[I-$[K;H];pP];</a:t>
-            </a:r>
-          </a:p>
-          <a:p>
-            <a:pPr marL="0" indent="0">
-              <a:buNone/>
-            </a:pPr>
-            <a:r>
-              <a:rPr lang="en-US" sz="1200" dirty="0">
-                <a:latin typeface="Courier New" panose="02070309020205020404" pitchFamily="49" charset="0"/>
-                <a:cs typeface="Courier New" panose="02070309020205020404" pitchFamily="49" charset="0"/>
-              </a:rPr>
-              <a:t>  (</a:t>
-            </a:r>
-            <a:r>
-              <a:rPr lang="en-US" sz="1200" dirty="0" err="1">
-                <a:latin typeface="Courier New" panose="02070309020205020404" pitchFamily="49" charset="0"/>
-                <a:cs typeface="Courier New" panose="02070309020205020404" pitchFamily="49" charset="0"/>
-              </a:rPr>
-              <a:t>K;es;P</a:t>
-            </a:r>
-            <a:r>
-              <a:rPr lang="en-US" sz="1200" dirty="0">
-                <a:latin typeface="Courier New" panose="02070309020205020404" pitchFamily="49" charset="0"/>
-                <a:cs typeface="Courier New" panose="02070309020205020404" pitchFamily="49" charset="0"/>
-              </a:rPr>
-              <a:t>)</a:t>
-            </a:r>
-          </a:p>
-          <a:p>
-            <a:pPr marL="0" indent="0">
-              <a:buNone/>
-            </a:pPr>
-            <a:r>
-              <a:rPr lang="en-US" sz="1200" dirty="0">
-                <a:latin typeface="Courier New" panose="02070309020205020404" pitchFamily="49" charset="0"/>
-                <a:cs typeface="Courier New" panose="02070309020205020404" pitchFamily="49" charset="0"/>
-              </a:rPr>
-              <a:t>  };</a:t>
+              <a:t>;</a:t>
             </a:r>
           </a:p>
         </p:txBody>
@@ -12102,733 +12105,6 @@
 </file>
 
 <file path=ppt/slides/slide17.xml><?xml version="1.0" encoding="utf-8"?>
-<p:sld xmlns:a="http://schemas.openxmlformats.org/drawingml/2006/main" xmlns:r="http://schemas.openxmlformats.org/officeDocument/2006/relationships" xmlns:p="http://schemas.openxmlformats.org/presentationml/2006/main">
-  <p:cSld>
-    <p:spTree>
-      <p:nvGrpSpPr>
-        <p:cNvPr id="1" name="">
-          <a:extLst>
-            <a:ext uri="{FF2B5EF4-FFF2-40B4-BE49-F238E27FC236}">
-              <a16:creationId xmlns:a16="http://schemas.microsoft.com/office/drawing/2014/main" id="{A5B602AE-3B46-7282-B3AC-50065CC620EA}"/>
-            </a:ext>
-          </a:extLst>
-        </p:cNvPr>
-        <p:cNvGrpSpPr/>
-        <p:nvPr/>
-      </p:nvGrpSpPr>
-      <p:grpSpPr>
-        <a:xfrm>
-          <a:off x="0" y="0"/>
-          <a:ext cx="0" cy="0"/>
-          <a:chOff x="0" y="0"/>
-          <a:chExt cx="0" cy="0"/>
-        </a:xfrm>
-      </p:grpSpPr>
-      <p:sp>
-        <p:nvSpPr>
-          <p:cNvPr id="2" name="Title 1">
-            <a:extLst>
-              <a:ext uri="{FF2B5EF4-FFF2-40B4-BE49-F238E27FC236}">
-                <a16:creationId xmlns:a16="http://schemas.microsoft.com/office/drawing/2014/main" id="{F0CE6DCA-1AB5-21B2-2CCC-B975B6B50268}"/>
-              </a:ext>
-            </a:extLst>
-          </p:cNvPr>
-          <p:cNvSpPr>
-            <a:spLocks noGrp="1"/>
-          </p:cNvSpPr>
-          <p:nvPr>
-            <p:ph type="title"/>
-          </p:nvPr>
-        </p:nvSpPr>
-        <p:spPr/>
-        <p:txBody>
-          <a:bodyPr/>
-          <a:lstStyle/>
-          <a:p>
-            <a:r>
-              <a:rPr lang="en-US" dirty="0"/>
-              <a:t>q/KDB+ Code</a:t>
-            </a:r>
-          </a:p>
-        </p:txBody>
-      </p:sp>
-      <p:sp>
-        <p:nvSpPr>
-          <p:cNvPr id="3" name="Content Placeholder 2">
-            <a:extLst>
-              <a:ext uri="{FF2B5EF4-FFF2-40B4-BE49-F238E27FC236}">
-                <a16:creationId xmlns:a16="http://schemas.microsoft.com/office/drawing/2014/main" id="{5B057E8E-46F6-CD65-965D-89B46CCB098D}"/>
-              </a:ext>
-            </a:extLst>
-          </p:cNvPr>
-          <p:cNvSpPr>
-            <a:spLocks noGrp="1"/>
-          </p:cNvSpPr>
-          <p:nvPr>
-            <p:ph sz="half" idx="1"/>
-          </p:nvPr>
-        </p:nvSpPr>
-        <p:spPr/>
-        <p:txBody>
-          <a:bodyPr>
-            <a:noAutofit/>
-          </a:bodyPr>
-          <a:lstStyle/>
-          <a:p>
-            <a:pPr marL="0" indent="0">
-              <a:buNone/>
-            </a:pPr>
-            <a:r>
-              <a:rPr lang="en-US" sz="1200" dirty="0">
-                <a:latin typeface="Courier New" panose="02070309020205020404" pitchFamily="49" charset="0"/>
-                <a:cs typeface="Courier New" panose="02070309020205020404" pitchFamily="49" charset="0"/>
-              </a:rPr>
-              <a:t>// Run the Kalman Filter</a:t>
-            </a:r>
-          </a:p>
-          <a:p>
-            <a:pPr marL="0" indent="0">
-              <a:buNone/>
-            </a:pPr>
-            <a:r>
-              <a:rPr lang="en-US" sz="1200" dirty="0">
-                <a:latin typeface="Courier New" panose="02070309020205020404" pitchFamily="49" charset="0"/>
-                <a:cs typeface="Courier New" panose="02070309020205020404" pitchFamily="49" charset="0"/>
-              </a:rPr>
-              <a:t>idx:0;</a:t>
-            </a:r>
-          </a:p>
-          <a:p>
-            <a:pPr marL="0" indent="0">
-              <a:buNone/>
-            </a:pPr>
-            <a:r>
-              <a:rPr lang="en-US" sz="1200" dirty="0">
-                <a:latin typeface="Courier New" panose="02070309020205020404" pitchFamily="49" charset="0"/>
-                <a:cs typeface="Courier New" panose="02070309020205020404" pitchFamily="49" charset="0"/>
-              </a:rPr>
-              <a:t>res:();</a:t>
-            </a:r>
-          </a:p>
-          <a:p>
-            <a:pPr marL="0" indent="0">
-              <a:buNone/>
-            </a:pPr>
-            <a:r>
-              <a:rPr lang="en-US" sz="1200" dirty="0" err="1">
-                <a:latin typeface="Courier New" panose="02070309020205020404" pitchFamily="49" charset="0"/>
-                <a:cs typeface="Courier New" panose="02070309020205020404" pitchFamily="49" charset="0"/>
-              </a:rPr>
-              <a:t>ps</a:t>
-            </a:r>
-            <a:r>
-              <a:rPr lang="en-US" sz="1200" dirty="0">
-                <a:latin typeface="Courier New" panose="02070309020205020404" pitchFamily="49" charset="0"/>
-                <a:cs typeface="Courier New" panose="02070309020205020404" pitchFamily="49" charset="0"/>
-              </a:rPr>
-              <a:t>:(); </a:t>
-            </a:r>
-            <a:r>
-              <a:rPr lang="en-US" sz="1200" dirty="0" err="1">
-                <a:latin typeface="Courier New" panose="02070309020205020404" pitchFamily="49" charset="0"/>
-                <a:cs typeface="Courier New" panose="02070309020205020404" pitchFamily="49" charset="0"/>
-              </a:rPr>
-              <a:t>pP</a:t>
-            </a:r>
-            <a:r>
-              <a:rPr lang="en-US" sz="1200" dirty="0">
-                <a:latin typeface="Courier New" panose="02070309020205020404" pitchFamily="49" charset="0"/>
-                <a:cs typeface="Courier New" panose="02070309020205020404" pitchFamily="49" charset="0"/>
-              </a:rPr>
-              <a:t>:();</a:t>
-            </a:r>
-          </a:p>
-          <a:p>
-            <a:pPr marL="0" indent="0">
-              <a:buNone/>
-            </a:pPr>
-            <a:r>
-              <a:rPr lang="en-US" sz="1200" dirty="0">
-                <a:latin typeface="Courier New" panose="02070309020205020404" pitchFamily="49" charset="0"/>
-                <a:cs typeface="Courier New" panose="02070309020205020404" pitchFamily="49" charset="0"/>
-              </a:rPr>
-              <a:t>es:(); </a:t>
-            </a:r>
-            <a:r>
-              <a:rPr lang="en-US" sz="1200" dirty="0" err="1">
-                <a:latin typeface="Courier New" panose="02070309020205020404" pitchFamily="49" charset="0"/>
-                <a:cs typeface="Courier New" panose="02070309020205020404" pitchFamily="49" charset="0"/>
-              </a:rPr>
-              <a:t>cP</a:t>
-            </a:r>
-            <a:r>
-              <a:rPr lang="en-US" sz="1200" dirty="0">
-                <a:latin typeface="Courier New" panose="02070309020205020404" pitchFamily="49" charset="0"/>
-                <a:cs typeface="Courier New" panose="02070309020205020404" pitchFamily="49" charset="0"/>
-              </a:rPr>
-              <a:t>:();</a:t>
-            </a:r>
-          </a:p>
-          <a:p>
-            <a:pPr marL="0" indent="0">
-              <a:buNone/>
-            </a:pPr>
-            <a:r>
-              <a:rPr lang="en-US" sz="1200" dirty="0">
-                <a:latin typeface="Courier New" panose="02070309020205020404" pitchFamily="49" charset="0"/>
-                <a:cs typeface="Courier New" panose="02070309020205020404" pitchFamily="49" charset="0"/>
-              </a:rPr>
-              <a:t>while[</a:t>
-            </a:r>
-            <a:r>
-              <a:rPr lang="en-US" sz="1200" dirty="0" err="1">
-                <a:latin typeface="Courier New" panose="02070309020205020404" pitchFamily="49" charset="0"/>
-                <a:cs typeface="Courier New" panose="02070309020205020404" pitchFamily="49" charset="0"/>
-              </a:rPr>
-              <a:t>idx</a:t>
-            </a:r>
-            <a:r>
-              <a:rPr lang="en-US" sz="1200" dirty="0">
-                <a:latin typeface="Courier New" panose="02070309020205020404" pitchFamily="49" charset="0"/>
-                <a:cs typeface="Courier New" panose="02070309020205020404" pitchFamily="49" charset="0"/>
-              </a:rPr>
-              <a:t>&lt;-1+count times;</a:t>
-            </a:r>
-          </a:p>
-          <a:p>
-            <a:pPr marL="0" indent="0">
-              <a:buNone/>
-            </a:pPr>
-            <a:r>
-              <a:rPr lang="en-US" sz="1200" dirty="0" err="1">
-                <a:latin typeface="Courier New" panose="02070309020205020404" pitchFamily="49" charset="0"/>
-                <a:cs typeface="Courier New" panose="02070309020205020404" pitchFamily="49" charset="0"/>
-              </a:rPr>
-              <a:t>idx</a:t>
-            </a:r>
-            <a:r>
-              <a:rPr lang="en-US" sz="1200" dirty="0">
-                <a:latin typeface="Courier New" panose="02070309020205020404" pitchFamily="49" charset="0"/>
-                <a:cs typeface="Courier New" panose="02070309020205020404" pitchFamily="49" charset="0"/>
-              </a:rPr>
-              <a:t>+:1;</a:t>
-            </a:r>
-          </a:p>
-          <a:p>
-            <a:pPr marL="0" indent="0">
-              <a:buNone/>
-            </a:pPr>
-            <a:r>
-              <a:rPr lang="en-US" sz="1200" dirty="0">
-                <a:latin typeface="Courier New" panose="02070309020205020404" pitchFamily="49" charset="0"/>
-                <a:cs typeface="Courier New" panose="02070309020205020404" pitchFamily="49" charset="0"/>
-              </a:rPr>
-              <a:t>  </a:t>
-            </a:r>
-            <a:r>
-              <a:rPr lang="en-US" sz="1200" dirty="0" err="1">
-                <a:latin typeface="Courier New" panose="02070309020205020404" pitchFamily="49" charset="0"/>
-                <a:cs typeface="Courier New" panose="02070309020205020404" pitchFamily="49" charset="0"/>
-              </a:rPr>
-              <a:t>res:predictState</a:t>
-            </a:r>
-            <a:r>
-              <a:rPr lang="en-US" sz="1200" dirty="0">
-                <a:latin typeface="Courier New" panose="02070309020205020404" pitchFamily="49" charset="0"/>
-                <a:cs typeface="Courier New" panose="02070309020205020404" pitchFamily="49" charset="0"/>
-              </a:rPr>
-              <a:t>[</a:t>
-            </a:r>
-            <a:r>
-              <a:rPr lang="en-US" sz="1200" dirty="0" err="1">
-                <a:latin typeface="Courier New" panose="02070309020205020404" pitchFamily="49" charset="0"/>
-                <a:cs typeface="Courier New" panose="02070309020205020404" pitchFamily="49" charset="0"/>
-              </a:rPr>
-              <a:t>F;x_est</a:t>
-            </a:r>
-            <a:r>
-              <a:rPr lang="en-US" sz="1200" dirty="0">
-                <a:latin typeface="Courier New" panose="02070309020205020404" pitchFamily="49" charset="0"/>
-                <a:cs typeface="Courier New" panose="02070309020205020404" pitchFamily="49" charset="0"/>
-              </a:rPr>
-              <a:t>[;idx-1];P;Q];</a:t>
-            </a:r>
-          </a:p>
-          <a:p>
-            <a:pPr marL="0" indent="0">
-              <a:buNone/>
-            </a:pPr>
-            <a:r>
-              <a:rPr lang="en-US" sz="1200" dirty="0">
-                <a:latin typeface="Courier New" panose="02070309020205020404" pitchFamily="49" charset="0"/>
-                <a:cs typeface="Courier New" panose="02070309020205020404" pitchFamily="49" charset="0"/>
-              </a:rPr>
-              <a:t>  </a:t>
-            </a:r>
-            <a:r>
-              <a:rPr lang="en-US" sz="1200" dirty="0" err="1">
-                <a:latin typeface="Courier New" panose="02070309020205020404" pitchFamily="49" charset="0"/>
-                <a:cs typeface="Courier New" panose="02070309020205020404" pitchFamily="49" charset="0"/>
-              </a:rPr>
-              <a:t>ps:res</a:t>
-            </a:r>
-            <a:r>
-              <a:rPr lang="en-US" sz="1200" dirty="0">
-                <a:latin typeface="Courier New" panose="02070309020205020404" pitchFamily="49" charset="0"/>
-                <a:cs typeface="Courier New" panose="02070309020205020404" pitchFamily="49" charset="0"/>
-              </a:rPr>
-              <a:t> 0; </a:t>
-            </a:r>
-            <a:r>
-              <a:rPr lang="en-US" sz="1200" dirty="0" err="1">
-                <a:latin typeface="Courier New" panose="02070309020205020404" pitchFamily="49" charset="0"/>
-                <a:cs typeface="Courier New" panose="02070309020205020404" pitchFamily="49" charset="0"/>
-              </a:rPr>
-              <a:t>pP:P:res</a:t>
-            </a:r>
-            <a:r>
-              <a:rPr lang="en-US" sz="1200" dirty="0">
-                <a:latin typeface="Courier New" panose="02070309020205020404" pitchFamily="49" charset="0"/>
-                <a:cs typeface="Courier New" panose="02070309020205020404" pitchFamily="49" charset="0"/>
-              </a:rPr>
-              <a:t> 1;</a:t>
-            </a:r>
-          </a:p>
-          <a:p>
-            <a:pPr marL="0" indent="0">
-              <a:buNone/>
-            </a:pPr>
-            <a:r>
-              <a:rPr lang="en-US" sz="1200" dirty="0">
-                <a:latin typeface="Courier New" panose="02070309020205020404" pitchFamily="49" charset="0"/>
-                <a:cs typeface="Courier New" panose="02070309020205020404" pitchFamily="49" charset="0"/>
-              </a:rPr>
-              <a:t>  </a:t>
-            </a:r>
-            <a:r>
-              <a:rPr lang="en-US" sz="1200" dirty="0" err="1">
-                <a:latin typeface="Courier New" panose="02070309020205020404" pitchFamily="49" charset="0"/>
-                <a:cs typeface="Courier New" panose="02070309020205020404" pitchFamily="49" charset="0"/>
-              </a:rPr>
-              <a:t>res:updateStateEstimate</a:t>
-            </a:r>
-            <a:r>
-              <a:rPr lang="en-US" sz="1200" dirty="0">
-                <a:latin typeface="Courier New" panose="02070309020205020404" pitchFamily="49" charset="0"/>
-                <a:cs typeface="Courier New" panose="02070309020205020404" pitchFamily="49" charset="0"/>
-              </a:rPr>
-              <a:t>[</a:t>
-            </a:r>
-            <a:r>
-              <a:rPr lang="en-US" sz="1200" dirty="0" err="1">
-                <a:latin typeface="Courier New" panose="02070309020205020404" pitchFamily="49" charset="0"/>
-                <a:cs typeface="Courier New" panose="02070309020205020404" pitchFamily="49" charset="0"/>
-              </a:rPr>
-              <a:t>H;pP;R;meas_traj</a:t>
-            </a:r>
-            <a:r>
-              <a:rPr lang="en-US" sz="1200" dirty="0">
-                <a:latin typeface="Courier New" panose="02070309020205020404" pitchFamily="49" charset="0"/>
-                <a:cs typeface="Courier New" panose="02070309020205020404" pitchFamily="49" charset="0"/>
-              </a:rPr>
-              <a:t>[;</a:t>
-            </a:r>
-            <a:r>
-              <a:rPr lang="en-US" sz="1200" dirty="0" err="1">
-                <a:latin typeface="Courier New" panose="02070309020205020404" pitchFamily="49" charset="0"/>
-                <a:cs typeface="Courier New" panose="02070309020205020404" pitchFamily="49" charset="0"/>
-              </a:rPr>
-              <a:t>idx</a:t>
-            </a:r>
-            <a:r>
-              <a:rPr lang="en-US" sz="1200" dirty="0">
-                <a:latin typeface="Courier New" panose="02070309020205020404" pitchFamily="49" charset="0"/>
-                <a:cs typeface="Courier New" panose="02070309020205020404" pitchFamily="49" charset="0"/>
-              </a:rPr>
-              <a:t>];</a:t>
-            </a:r>
-            <a:r>
-              <a:rPr lang="en-US" sz="1200" dirty="0" err="1">
-                <a:latin typeface="Courier New" panose="02070309020205020404" pitchFamily="49" charset="0"/>
-                <a:cs typeface="Courier New" panose="02070309020205020404" pitchFamily="49" charset="0"/>
-              </a:rPr>
-              <a:t>ps</a:t>
-            </a:r>
-            <a:r>
-              <a:rPr lang="en-US" sz="1200" dirty="0">
-                <a:latin typeface="Courier New" panose="02070309020205020404" pitchFamily="49" charset="0"/>
-                <a:cs typeface="Courier New" panose="02070309020205020404" pitchFamily="49" charset="0"/>
-              </a:rPr>
-              <a:t>];</a:t>
-            </a:r>
-          </a:p>
-          <a:p>
-            <a:pPr marL="0" indent="0">
-              <a:buNone/>
-            </a:pPr>
-            <a:r>
-              <a:rPr lang="en-US" sz="1200" dirty="0">
-                <a:latin typeface="Courier New" panose="02070309020205020404" pitchFamily="49" charset="0"/>
-                <a:cs typeface="Courier New" panose="02070309020205020404" pitchFamily="49" charset="0"/>
-              </a:rPr>
-              <a:t>  G[;;</a:t>
-            </a:r>
-            <a:r>
-              <a:rPr lang="en-US" sz="1200" dirty="0" err="1">
-                <a:latin typeface="Courier New" panose="02070309020205020404" pitchFamily="49" charset="0"/>
-                <a:cs typeface="Courier New" panose="02070309020205020404" pitchFamily="49" charset="0"/>
-              </a:rPr>
-              <a:t>idx</a:t>
-            </a:r>
-            <a:r>
-              <a:rPr lang="en-US" sz="1200" dirty="0">
-                <a:latin typeface="Courier New" panose="02070309020205020404" pitchFamily="49" charset="0"/>
-                <a:cs typeface="Courier New" panose="02070309020205020404" pitchFamily="49" charset="0"/>
-              </a:rPr>
-              <a:t>]:res 0; </a:t>
-            </a:r>
-            <a:r>
-              <a:rPr lang="en-US" sz="1200" dirty="0" err="1">
-                <a:latin typeface="Courier New" panose="02070309020205020404" pitchFamily="49" charset="0"/>
-                <a:cs typeface="Courier New" panose="02070309020205020404" pitchFamily="49" charset="0"/>
-              </a:rPr>
-              <a:t>x_est</a:t>
-            </a:r>
-            <a:r>
-              <a:rPr lang="en-US" sz="1200" dirty="0">
-                <a:latin typeface="Courier New" panose="02070309020205020404" pitchFamily="49" charset="0"/>
-                <a:cs typeface="Courier New" panose="02070309020205020404" pitchFamily="49" charset="0"/>
-              </a:rPr>
-              <a:t>[;</a:t>
-            </a:r>
-            <a:r>
-              <a:rPr lang="en-US" sz="1200" dirty="0" err="1">
-                <a:latin typeface="Courier New" panose="02070309020205020404" pitchFamily="49" charset="0"/>
-                <a:cs typeface="Courier New" panose="02070309020205020404" pitchFamily="49" charset="0"/>
-              </a:rPr>
-              <a:t>idx</a:t>
-            </a:r>
-            <a:r>
-              <a:rPr lang="en-US" sz="1200" dirty="0">
-                <a:latin typeface="Courier New" panose="02070309020205020404" pitchFamily="49" charset="0"/>
-                <a:cs typeface="Courier New" panose="02070309020205020404" pitchFamily="49" charset="0"/>
-              </a:rPr>
-              <a:t>]:res 1; P:res 2;</a:t>
-            </a:r>
-          </a:p>
-          <a:p>
-            <a:pPr marL="0" indent="0">
-              <a:buNone/>
-            </a:pPr>
-            <a:r>
-              <a:rPr lang="en-US" sz="1200" dirty="0">
-                <a:latin typeface="Courier New" panose="02070309020205020404" pitchFamily="49" charset="0"/>
-                <a:cs typeface="Courier New" panose="02070309020205020404" pitchFamily="49" charset="0"/>
-              </a:rPr>
-              <a:t>  ];</a:t>
-            </a:r>
-          </a:p>
-          <a:p>
-            <a:pPr marL="0" indent="0">
-              <a:buNone/>
-            </a:pPr>
-            <a:endParaRPr lang="en-US" sz="1200" dirty="0">
-              <a:latin typeface="Courier New" panose="02070309020205020404" pitchFamily="49" charset="0"/>
-              <a:cs typeface="Courier New" panose="02070309020205020404" pitchFamily="49" charset="0"/>
-            </a:endParaRPr>
-          </a:p>
-        </p:txBody>
-      </p:sp>
-      <p:sp>
-        <p:nvSpPr>
-          <p:cNvPr id="4" name="Content Placeholder 3">
-            <a:extLst>
-              <a:ext uri="{FF2B5EF4-FFF2-40B4-BE49-F238E27FC236}">
-                <a16:creationId xmlns:a16="http://schemas.microsoft.com/office/drawing/2014/main" id="{4ADB74D9-A304-7D73-ACAF-D373659960DC}"/>
-              </a:ext>
-            </a:extLst>
-          </p:cNvPr>
-          <p:cNvSpPr>
-            <a:spLocks noGrp="1"/>
-          </p:cNvSpPr>
-          <p:nvPr>
-            <p:ph sz="half" idx="2"/>
-          </p:nvPr>
-        </p:nvSpPr>
-        <p:spPr/>
-        <p:txBody>
-          <a:bodyPr>
-            <a:noAutofit/>
-          </a:bodyPr>
-          <a:lstStyle/>
-          <a:p>
-            <a:pPr marL="0" indent="0">
-              <a:buNone/>
-            </a:pPr>
-            <a:r>
-              <a:rPr lang="en-US" sz="1200" dirty="0">
-                <a:latin typeface="Courier New" panose="02070309020205020404" pitchFamily="49" charset="0"/>
-                <a:cs typeface="Courier New" panose="02070309020205020404" pitchFamily="49" charset="0"/>
-              </a:rPr>
-              <a:t>// Create table(s) for visualization</a:t>
-            </a:r>
-          </a:p>
-          <a:p>
-            <a:pPr marL="0" indent="0">
-              <a:buNone/>
-            </a:pPr>
-            <a:r>
-              <a:rPr lang="en-US" sz="1200" dirty="0" err="1">
-                <a:latin typeface="Courier New" panose="02070309020205020404" pitchFamily="49" charset="0"/>
-                <a:cs typeface="Courier New" panose="02070309020205020404" pitchFamily="49" charset="0"/>
-              </a:rPr>
-              <a:t>tms:flip</a:t>
-            </a:r>
-            <a:r>
-              <a:rPr lang="en-US" sz="1200" dirty="0">
-                <a:latin typeface="Courier New" panose="02070309020205020404" pitchFamily="49" charset="0"/>
-                <a:cs typeface="Courier New" panose="02070309020205020404" pitchFamily="49" charset="0"/>
-              </a:rPr>
-              <a:t> ![enlist `</a:t>
-            </a:r>
-            <a:r>
-              <a:rPr lang="en-US" sz="1200" dirty="0" err="1">
-                <a:latin typeface="Courier New" panose="02070309020205020404" pitchFamily="49" charset="0"/>
-                <a:cs typeface="Courier New" panose="02070309020205020404" pitchFamily="49" charset="0"/>
-              </a:rPr>
-              <a:t>time;enlist</a:t>
-            </a:r>
-            <a:r>
-              <a:rPr lang="en-US" sz="1200" dirty="0">
-                <a:latin typeface="Courier New" panose="02070309020205020404" pitchFamily="49" charset="0"/>
-                <a:cs typeface="Courier New" panose="02070309020205020404" pitchFamily="49" charset="0"/>
-              </a:rPr>
-              <a:t> times];</a:t>
-            </a:r>
-          </a:p>
-          <a:p>
-            <a:pPr marL="0" indent="0">
-              <a:buNone/>
-            </a:pPr>
-            <a:r>
-              <a:rPr lang="en-US" sz="1200" dirty="0" err="1">
-                <a:latin typeface="Courier New" panose="02070309020205020404" pitchFamily="49" charset="0"/>
-                <a:cs typeface="Courier New" panose="02070309020205020404" pitchFamily="49" charset="0"/>
-              </a:rPr>
-              <a:t>est:flip</a:t>
-            </a:r>
-            <a:r>
-              <a:rPr lang="en-US" sz="1200" dirty="0">
-                <a:latin typeface="Courier New" panose="02070309020205020404" pitchFamily="49" charset="0"/>
-                <a:cs typeface="Courier New" panose="02070309020205020404" pitchFamily="49" charset="0"/>
-              </a:rPr>
-              <a:t> ![`</a:t>
-            </a:r>
-            <a:r>
-              <a:rPr lang="en-US" sz="1200" dirty="0" err="1">
-                <a:latin typeface="Courier New" panose="02070309020205020404" pitchFamily="49" charset="0"/>
-                <a:cs typeface="Courier New" panose="02070309020205020404" pitchFamily="49" charset="0"/>
-              </a:rPr>
-              <a:t>x`y`xv`yv;x_est</a:t>
-            </a:r>
-            <a:r>
-              <a:rPr lang="en-US" sz="1200" dirty="0">
-                <a:latin typeface="Courier New" panose="02070309020205020404" pitchFamily="49" charset="0"/>
-                <a:cs typeface="Courier New" panose="02070309020205020404" pitchFamily="49" charset="0"/>
-              </a:rPr>
-              <a:t>];</a:t>
-            </a:r>
-          </a:p>
-          <a:p>
-            <a:pPr marL="0" indent="0">
-              <a:buNone/>
-            </a:pPr>
-            <a:r>
-              <a:rPr lang="en-US" sz="1200" dirty="0" err="1">
-                <a:latin typeface="Courier New" panose="02070309020205020404" pitchFamily="49" charset="0"/>
-                <a:cs typeface="Courier New" panose="02070309020205020404" pitchFamily="49" charset="0"/>
-              </a:rPr>
-              <a:t>true:flip</a:t>
-            </a:r>
-            <a:r>
-              <a:rPr lang="en-US" sz="1200" dirty="0">
-                <a:latin typeface="Courier New" panose="02070309020205020404" pitchFamily="49" charset="0"/>
-                <a:cs typeface="Courier New" panose="02070309020205020404" pitchFamily="49" charset="0"/>
-              </a:rPr>
-              <a:t> `</a:t>
-            </a:r>
-            <a:r>
-              <a:rPr lang="en-US" sz="1200" dirty="0" err="1">
-                <a:latin typeface="Courier New" panose="02070309020205020404" pitchFamily="49" charset="0"/>
-                <a:cs typeface="Courier New" panose="02070309020205020404" pitchFamily="49" charset="0"/>
-              </a:rPr>
-              <a:t>truex`truey`truexv`trueyv!true_traj</a:t>
-            </a:r>
-            <a:r>
-              <a:rPr lang="en-US" sz="1200" dirty="0">
-                <a:latin typeface="Courier New" panose="02070309020205020404" pitchFamily="49" charset="0"/>
-                <a:cs typeface="Courier New" panose="02070309020205020404" pitchFamily="49" charset="0"/>
-              </a:rPr>
-              <a:t>;</a:t>
-            </a:r>
-          </a:p>
-          <a:p>
-            <a:pPr marL="0" indent="0">
-              <a:buNone/>
-            </a:pPr>
-            <a:r>
-              <a:rPr lang="en-US" sz="1200" dirty="0" err="1">
-                <a:latin typeface="Courier New" panose="02070309020205020404" pitchFamily="49" charset="0"/>
-                <a:cs typeface="Courier New" panose="02070309020205020404" pitchFamily="49" charset="0"/>
-              </a:rPr>
-              <a:t>meas:flip</a:t>
-            </a:r>
-            <a:r>
-              <a:rPr lang="en-US" sz="1200" dirty="0">
-                <a:latin typeface="Courier New" panose="02070309020205020404" pitchFamily="49" charset="0"/>
-                <a:cs typeface="Courier New" panose="02070309020205020404" pitchFamily="49" charset="0"/>
-              </a:rPr>
-              <a:t> `</a:t>
-            </a:r>
-            <a:r>
-              <a:rPr lang="en-US" sz="1200" dirty="0" err="1">
-                <a:latin typeface="Courier New" panose="02070309020205020404" pitchFamily="49" charset="0"/>
-                <a:cs typeface="Courier New" panose="02070309020205020404" pitchFamily="49" charset="0"/>
-              </a:rPr>
-              <a:t>measx`measy`measxv`measyv!meas_traj</a:t>
-            </a:r>
-            <a:r>
-              <a:rPr lang="en-US" sz="1200" dirty="0">
-                <a:latin typeface="Courier New" panose="02070309020205020404" pitchFamily="49" charset="0"/>
-                <a:cs typeface="Courier New" panose="02070309020205020404" pitchFamily="49" charset="0"/>
-              </a:rPr>
-              <a:t>;</a:t>
-            </a:r>
-          </a:p>
-          <a:p>
-            <a:pPr marL="0" indent="0">
-              <a:buNone/>
-            </a:pPr>
-            <a:r>
-              <a:rPr lang="en-US" sz="1200" dirty="0" err="1">
-                <a:latin typeface="Courier New" panose="02070309020205020404" pitchFamily="49" charset="0"/>
-                <a:cs typeface="Courier New" panose="02070309020205020404" pitchFamily="49" charset="0"/>
-              </a:rPr>
-              <a:t>kgains:flip</a:t>
-            </a:r>
-            <a:r>
-              <a:rPr lang="en-US" sz="1200" dirty="0">
-                <a:latin typeface="Courier New" panose="02070309020205020404" pitchFamily="49" charset="0"/>
-                <a:cs typeface="Courier New" panose="02070309020205020404" pitchFamily="49" charset="0"/>
-              </a:rPr>
-              <a:t> `</a:t>
-            </a:r>
-            <a:r>
-              <a:rPr lang="en-US" sz="1200" dirty="0" err="1">
-                <a:latin typeface="Courier New" panose="02070309020205020404" pitchFamily="49" charset="0"/>
-                <a:cs typeface="Courier New" panose="02070309020205020404" pitchFamily="49" charset="0"/>
-              </a:rPr>
-              <a:t>gainx`gainy`gainxv`gainyv</a:t>
-            </a:r>
-            <a:r>
-              <a:rPr lang="en-US" sz="1200" dirty="0">
-                <a:latin typeface="Courier New" panose="02070309020205020404" pitchFamily="49" charset="0"/>
-                <a:cs typeface="Courier New" panose="02070309020205020404" pitchFamily="49" charset="0"/>
-              </a:rPr>
-              <a:t>!{G[</a:t>
-            </a:r>
-            <a:r>
-              <a:rPr lang="en-US" sz="1200" dirty="0" err="1">
-                <a:latin typeface="Courier New" panose="02070309020205020404" pitchFamily="49" charset="0"/>
-                <a:cs typeface="Courier New" panose="02070309020205020404" pitchFamily="49" charset="0"/>
-              </a:rPr>
-              <a:t>x;x</a:t>
-            </a:r>
-            <a:r>
-              <a:rPr lang="en-US" sz="1200" dirty="0">
-                <a:latin typeface="Courier New" panose="02070309020205020404" pitchFamily="49" charset="0"/>
-                <a:cs typeface="Courier New" panose="02070309020205020404" pitchFamily="49" charset="0"/>
-              </a:rPr>
-              <a:t>;::]} each </a:t>
-            </a:r>
-            <a:r>
-              <a:rPr lang="en-US" sz="1200" dirty="0" err="1">
-                <a:latin typeface="Courier New" panose="02070309020205020404" pitchFamily="49" charset="0"/>
-                <a:cs typeface="Courier New" panose="02070309020205020404" pitchFamily="49" charset="0"/>
-              </a:rPr>
-              <a:t>til</a:t>
-            </a:r>
-            <a:r>
-              <a:rPr lang="en-US" sz="1200" dirty="0">
-                <a:latin typeface="Courier New" panose="02070309020205020404" pitchFamily="49" charset="0"/>
-                <a:cs typeface="Courier New" panose="02070309020205020404" pitchFamily="49" charset="0"/>
-              </a:rPr>
-              <a:t> 4;</a:t>
-            </a:r>
-          </a:p>
-          <a:p>
-            <a:pPr marL="0" indent="0">
-              <a:buNone/>
-            </a:pPr>
-            <a:r>
-              <a:rPr lang="en-US" sz="1200" dirty="0">
-                <a:latin typeface="Courier New" panose="02070309020205020404" pitchFamily="49" charset="0"/>
-                <a:cs typeface="Courier New" panose="02070309020205020404" pitchFamily="49" charset="0"/>
-              </a:rPr>
-              <a:t>data:(,')over(</a:t>
-            </a:r>
-            <a:r>
-              <a:rPr lang="en-US" sz="1200" dirty="0" err="1">
-                <a:latin typeface="Courier New" panose="02070309020205020404" pitchFamily="49" charset="0"/>
-                <a:cs typeface="Courier New" panose="02070309020205020404" pitchFamily="49" charset="0"/>
-              </a:rPr>
-              <a:t>tms;est;true;meas;kgains</a:t>
-            </a:r>
-            <a:r>
-              <a:rPr lang="en-US" sz="1200" dirty="0">
-                <a:latin typeface="Courier New" panose="02070309020205020404" pitchFamily="49" charset="0"/>
-                <a:cs typeface="Courier New" panose="02070309020205020404" pitchFamily="49" charset="0"/>
-              </a:rPr>
-              <a:t>);</a:t>
-            </a:r>
-          </a:p>
-          <a:p>
-            <a:pPr marL="0" indent="0">
-              <a:buNone/>
-            </a:pPr>
-            <a:r>
-              <a:rPr lang="en-US" sz="1200" dirty="0">
-                <a:latin typeface="Courier New" panose="02070309020205020404" pitchFamily="49" charset="0"/>
-                <a:cs typeface="Courier New" panose="02070309020205020404" pitchFamily="49" charset="0"/>
-              </a:rPr>
-              <a:t>save `:./data.csv;</a:t>
-            </a:r>
-          </a:p>
-          <a:p>
-            <a:pPr marL="0" indent="0">
-              <a:buNone/>
-            </a:pPr>
-            <a:endParaRPr lang="en-US" sz="1200" dirty="0">
-              <a:latin typeface="Courier New" panose="02070309020205020404" pitchFamily="49" charset="0"/>
-              <a:cs typeface="Courier New" panose="02070309020205020404" pitchFamily="49" charset="0"/>
-            </a:endParaRPr>
-          </a:p>
-        </p:txBody>
-      </p:sp>
-    </p:spTree>
-    <p:extLst>
-      <p:ext uri="{BB962C8B-B14F-4D97-AF65-F5344CB8AC3E}">
-        <p14:creationId xmlns:p14="http://schemas.microsoft.com/office/powerpoint/2010/main" val="2328818871"/>
-      </p:ext>
-    </p:extLst>
-  </p:cSld>
-  <p:clrMapOvr>
-    <a:masterClrMapping/>
-  </p:clrMapOvr>
-</p:sld>
-</file>
-
-<file path=ppt/slides/slide18.xml><?xml version="1.0" encoding="utf-8"?>
 <p:sld xmlns:a="http://schemas.openxmlformats.org/drawingml/2006/main" xmlns:r="http://schemas.openxmlformats.org/officeDocument/2006/relationships" xmlns:p="http://schemas.openxmlformats.org/presentationml/2006/main" show="0">
   <p:cSld>
     <p:spTree>
@@ -13043,7 +12319,7 @@
 </p:sld>
 </file>
 
-<file path=ppt/slides/slide19.xml><?xml version="1.0" encoding="utf-8"?>
+<file path=ppt/slides/slide18.xml><?xml version="1.0" encoding="utf-8"?>
 <p:sld xmlns:a="http://schemas.openxmlformats.org/drawingml/2006/main" xmlns:r="http://schemas.openxmlformats.org/officeDocument/2006/relationships" xmlns:p="http://schemas.openxmlformats.org/presentationml/2006/main">
   <p:cSld>
     <p:spTree>
@@ -13753,8 +13029,8 @@
           </a:p>
         </p:txBody>
       </p:sp>
-      <mc:AlternateContent xmlns:mc="http://schemas.openxmlformats.org/markup-compatibility/2006">
-        <mc:Choice xmlns:a14="http://schemas.microsoft.com/office/drawing/2010/main" Requires="a14">
+      <mc:AlternateContent xmlns:mc="http://schemas.openxmlformats.org/markup-compatibility/2006" xmlns:a14="http://schemas.microsoft.com/office/drawing/2010/main">
+        <mc:Choice Requires="a14">
           <p:sp>
             <p:nvSpPr>
               <p:cNvPr id="9" name="Content Placeholder 8">
@@ -14141,7 +13417,7 @@
             </p:txBody>
           </p:sp>
         </mc:Choice>
-        <mc:Fallback>
+        <mc:Fallback xmlns="">
           <p:sp>
             <p:nvSpPr>
               <p:cNvPr id="9" name="Content Placeholder 8">

</xml_diff>